<commit_message>
Rebuilt Appendix F PPT
</commit_message>
<xml_diff>
--- a/src/HBB-Overlays-ARM v0.2.pptx
+++ b/src/HBB-Overlays-ARM v0.2.pptx
@@ -2927,7 +2927,7 @@
         </p:nvGrpSpPr>
         <p:grpSpPr>
           <a:xfrm>
-            <a:off x="2811144" y="5550732"/>
+            <a:off x="2567304" y="6546412"/>
             <a:ext cx="5862244" cy="1197475"/>
             <a:chOff x="1827289" y="5632838"/>
             <a:chExt cx="5862244" cy="1197475"/>
@@ -3039,8 +3039,8 @@
           </p:nvSpPr>
           <p:spPr>
             <a:xfrm>
-              <a:off x="3295885" y="6388345"/>
-              <a:ext cx="1014701" cy="425758"/>
+              <a:off x="3132381" y="6388345"/>
+              <a:ext cx="1341714" cy="425758"/>
             </a:xfrm>
             <a:prstGeom prst="rect">
               <a:avLst/>
@@ -3079,7 +3079,7 @@
                     <a:srgbClr val="BAF0FF"/>
                   </a:solidFill>
                 </a:rPr>
-                <a:t>Source</a:t>
+                <a:t>Datatype*</a:t>
               </a:r>
               <a:endParaRPr dirty="0">
                 <a:solidFill>
@@ -3152,8 +3152,8 @@
           </p:nvSpPr>
           <p:spPr>
             <a:xfrm rot="20160000">
-              <a:off x="5001085" y="6097269"/>
-              <a:ext cx="1300036" cy="348813"/>
+              <a:off x="4601138" y="6097269"/>
+              <a:ext cx="2099935" cy="348813"/>
             </a:xfrm>
             <a:prstGeom prst="rect">
               <a:avLst/>
@@ -3189,7 +3189,7 @@
                     <a:srgbClr val="BAF0FF"/>
                   </a:solidFill>
                 </a:rPr>
-                <a:t>&lt;datatypes&gt;</a:t>
+                <a:t>&lt;internal datatypes&gt;</a:t>
               </a:r>
               <a:endParaRPr dirty="0">
                 <a:solidFill>
@@ -3214,7 +3214,7 @@
         </p:nvGrpSpPr>
         <p:grpSpPr>
           <a:xfrm>
-            <a:off x="3805197" y="1967937"/>
+            <a:off x="3744237" y="2450537"/>
             <a:ext cx="5862244" cy="1197475"/>
             <a:chOff x="2674236" y="2762016"/>
             <a:chExt cx="5862244" cy="1197475"/>
@@ -3396,7 +3396,7 @@
             <a:p>
               <a:r>
                 <a:rPr lang="en-CA" dirty="0"/>
-                <a:t>Business Schema</a:t>
+                <a:t>Base Schema*</a:t>
               </a:r>
               <a:endParaRPr dirty="0"/>
             </a:p>
@@ -3416,8 +3416,8 @@
           </p:nvSpPr>
           <p:spPr>
             <a:xfrm rot="20160000">
-              <a:off x="6018227" y="3050608"/>
-              <a:ext cx="1756891" cy="348813"/>
+              <a:off x="5536200" y="3091248"/>
+              <a:ext cx="2558393" cy="348813"/>
             </a:xfrm>
             <a:prstGeom prst="rect">
               <a:avLst/>
@@ -3460,7 +3460,7 @@
                     <a:srgbClr val="5E5E5E"/>
                   </a:solidFill>
                 </a:rPr>
-                <a:t>base elements</a:t>
+                <a:t>internal attribute name</a:t>
               </a:r>
               <a:r>
                 <a:rPr dirty="0">
@@ -3474,83 +3474,104 @@
           </p:txBody>
         </p:sp>
       </p:grpSp>
-      <p:sp>
-        <p:nvSpPr>
-          <p:cNvPr id="169" name="Line"/>
-          <p:cNvSpPr/>
+      <p:grpSp>
+        <p:nvGrpSpPr>
+          <p:cNvPr id="2" name="Group 1">
+            <a:extLst>
+              <a:ext uri="{FF2B5EF4-FFF2-40B4-BE49-F238E27FC236}">
+                <a16:creationId xmlns:a16="http://schemas.microsoft.com/office/drawing/2014/main" id="{E5DD09C4-4D9B-4452-A033-6868C4F1B428}"/>
+              </a:ext>
+            </a:extLst>
+          </p:cNvPr>
+          <p:cNvGrpSpPr/>
           <p:nvPr/>
-        </p:nvSpPr>
-        <p:spPr>
-          <a:xfrm flipV="1">
-            <a:off x="9996570" y="714622"/>
-            <a:ext cx="1718" cy="2511399"/>
+        </p:nvGrpSpPr>
+        <p:grpSpPr>
+          <a:xfrm>
+            <a:off x="10079792" y="811141"/>
+            <a:ext cx="674969" cy="2714672"/>
+            <a:chOff x="9978192" y="695571"/>
+            <a:chExt cx="674969" cy="2714672"/>
           </a:xfrm>
-          <a:prstGeom prst="line">
-            <a:avLst/>
-          </a:prstGeom>
-          <a:ln w="25400">
-            <a:solidFill>
-              <a:srgbClr val="000000"/>
-            </a:solidFill>
-            <a:miter lim="400000"/>
-            <a:headEnd type="triangle"/>
-            <a:tailEnd type="triangle"/>
-          </a:ln>
-        </p:spPr>
-        <p:txBody>
-          <a:bodyPr lIns="45718" tIns="45718" rIns="45718" bIns="45718"/>
-          <a:lstStyle/>
-          <a:p>
-            <a:endParaRPr/>
-          </a:p>
-        </p:txBody>
-      </p:sp>
-      <p:sp>
-        <p:nvSpPr>
-          <p:cNvPr id="170" name="Optional Logic"/>
-          <p:cNvSpPr txBox="1"/>
-          <p:nvPr/>
-        </p:nvSpPr>
-        <p:spPr>
-          <a:xfrm rot="16200000">
-            <a:off x="9736349" y="1701270"/>
-            <a:ext cx="1177033" cy="656590"/>
-          </a:xfrm>
-          <a:prstGeom prst="rect">
-            <a:avLst/>
-          </a:prstGeom>
-          <a:ln w="12700">
-            <a:miter lim="400000"/>
-          </a:ln>
-          <a:extLst>
-            <a:ext uri="{C572A759-6A51-4108-AA02-DFA0A04FC94B}">
-              <ma14:wrappingTextBoxFlag xmlns:ma14="http://schemas.microsoft.com/office/mac/drawingml/2011/main" xmlns:a14="http://schemas.microsoft.com/office/drawing/2010/main" xmlns:m="http://schemas.openxmlformats.org/officeDocument/2006/math" xmlns="" val="1"/>
-            </a:ext>
-          </a:extLst>
-        </p:spPr>
-        <p:txBody>
-          <a:bodyPr lIns="50800" tIns="50800" rIns="50800" bIns="50800" anchor="ctr">
-            <a:spAutoFit/>
-          </a:bodyPr>
-          <a:lstStyle>
-            <a:lvl1pPr>
-              <a:defRPr sz="1800" b="1">
-                <a:latin typeface="+mn-lt"/>
-                <a:ea typeface="+mn-ea"/>
-                <a:cs typeface="+mn-cs"/>
-                <a:sym typeface="Helvetica Neue"/>
-              </a:defRPr>
-            </a:lvl1pPr>
-          </a:lstStyle>
-          <a:p>
-            <a:r>
-              <a:rPr lang="en-CA" dirty="0"/>
-              <a:t>Business Layer</a:t>
-            </a:r>
-            <a:endParaRPr dirty="0"/>
-          </a:p>
-        </p:txBody>
-      </p:sp>
+        </p:grpSpPr>
+        <p:sp>
+          <p:nvSpPr>
+            <p:cNvPr id="169" name="Line"/>
+            <p:cNvSpPr/>
+            <p:nvPr/>
+          </p:nvSpPr>
+          <p:spPr>
+            <a:xfrm flipV="1">
+              <a:off x="9978192" y="695571"/>
+              <a:ext cx="20096" cy="2714672"/>
+            </a:xfrm>
+            <a:prstGeom prst="line">
+              <a:avLst/>
+            </a:prstGeom>
+            <a:ln w="25400">
+              <a:solidFill>
+                <a:srgbClr val="000000"/>
+              </a:solidFill>
+              <a:miter lim="400000"/>
+              <a:headEnd type="triangle"/>
+              <a:tailEnd type="triangle"/>
+            </a:ln>
+          </p:spPr>
+          <p:txBody>
+            <a:bodyPr lIns="45718" tIns="45718" rIns="45718" bIns="45718"/>
+            <a:lstStyle/>
+            <a:p>
+              <a:endParaRPr/>
+            </a:p>
+          </p:txBody>
+        </p:sp>
+        <p:sp>
+          <p:nvSpPr>
+            <p:cNvPr id="170" name="Optional Logic"/>
+            <p:cNvSpPr txBox="1"/>
+            <p:nvPr/>
+          </p:nvSpPr>
+          <p:spPr>
+            <a:xfrm rot="16200000">
+              <a:off x="9736349" y="1739370"/>
+              <a:ext cx="1177033" cy="656590"/>
+            </a:xfrm>
+            <a:prstGeom prst="rect">
+              <a:avLst/>
+            </a:prstGeom>
+            <a:ln w="12700">
+              <a:miter lim="400000"/>
+            </a:ln>
+            <a:extLst>
+              <a:ext uri="{C572A759-6A51-4108-AA02-DFA0A04FC94B}">
+                <ma14:wrappingTextBoxFlag xmlns:ma14="http://schemas.microsoft.com/office/mac/drawingml/2011/main" xmlns:a14="http://schemas.microsoft.com/office/drawing/2010/main" xmlns:m="http://schemas.openxmlformats.org/officeDocument/2006/math" xmlns="" val="1"/>
+              </a:ext>
+            </a:extLst>
+          </p:spPr>
+          <p:txBody>
+            <a:bodyPr lIns="50800" tIns="50800" rIns="50800" bIns="50800" anchor="ctr">
+              <a:spAutoFit/>
+            </a:bodyPr>
+            <a:lstStyle>
+              <a:lvl1pPr>
+                <a:defRPr sz="1800" b="1">
+                  <a:latin typeface="+mn-lt"/>
+                  <a:ea typeface="+mn-ea"/>
+                  <a:cs typeface="+mn-cs"/>
+                  <a:sym typeface="Helvetica Neue"/>
+                </a:defRPr>
+              </a:lvl1pPr>
+            </a:lstStyle>
+            <a:p>
+              <a:r>
+                <a:rPr lang="en-CA" dirty="0"/>
+                <a:t>Business Layer</a:t>
+              </a:r>
+              <a:endParaRPr dirty="0"/>
+            </a:p>
+          </p:txBody>
+        </p:sp>
+      </p:grpSp>
       <p:sp>
         <p:nvSpPr>
           <p:cNvPr id="177" name="Double Arrow"/>
@@ -3558,9 +3579,9 @@
           <p:nvPr/>
         </p:nvSpPr>
         <p:spPr>
-          <a:xfrm rot="17133864">
-            <a:off x="-2060761" y="4604280"/>
-            <a:ext cx="9094296" cy="1122106"/>
+          <a:xfrm rot="17263724">
+            <a:off x="-2070144" y="4611406"/>
+            <a:ext cx="9109091" cy="1122106"/>
           </a:xfrm>
           <a:prstGeom prst="leftRightArrow">
             <a:avLst>
@@ -3697,7 +3718,7 @@
         </p:nvGrpSpPr>
         <p:grpSpPr>
           <a:xfrm>
-            <a:off x="4025259" y="1343630"/>
+            <a:off x="3964299" y="1864330"/>
             <a:ext cx="5862244" cy="1197475"/>
             <a:chOff x="2858201" y="2101616"/>
             <a:chExt cx="5862244" cy="1197475"/>
@@ -3833,7 +3854,7 @@
             <a:p>
               <a:r>
                 <a:rPr lang="en-CA" dirty="0"/>
-                <a:t>Consent Schema</a:t>
+                <a:t>Source</a:t>
               </a:r>
               <a:endParaRPr dirty="0"/>
             </a:p>
@@ -3896,8 +3917,8 @@
           </p:nvSpPr>
           <p:spPr>
             <a:xfrm rot="20160000">
-              <a:off x="5876939" y="2492010"/>
-              <a:ext cx="1938031" cy="348813"/>
+              <a:off x="5430503" y="2492010"/>
+              <a:ext cx="2830904" cy="348813"/>
             </a:xfrm>
             <a:prstGeom prst="rect">
               <a:avLst/>
@@ -3940,7 +3961,7 @@
                     <a:srgbClr val="5E5E5E"/>
                   </a:solidFill>
                 </a:rPr>
-                <a:t>granted consent</a:t>
+                <a:t>external attribute schema</a:t>
               </a:r>
               <a:r>
                 <a:rPr dirty="0">
@@ -3950,169 +3971,6 @@
                 </a:rPr>
                 <a:t>&gt;</a:t>
               </a:r>
-            </a:p>
-          </p:txBody>
-        </p:sp>
-      </p:grpSp>
-      <p:grpSp>
-        <p:nvGrpSpPr>
-          <p:cNvPr id="7" name="Group 6">
-            <a:extLst>
-              <a:ext uri="{FF2B5EF4-FFF2-40B4-BE49-F238E27FC236}">
-                <a16:creationId xmlns:a16="http://schemas.microsoft.com/office/drawing/2014/main" id="{2B1C1D47-DF85-46B4-B691-01ED6BAA2A52}"/>
-              </a:ext>
-            </a:extLst>
-          </p:cNvPr>
-          <p:cNvGrpSpPr/>
-          <p:nvPr/>
-        </p:nvGrpSpPr>
-        <p:grpSpPr>
-          <a:xfrm>
-            <a:off x="4075650" y="786161"/>
-            <a:ext cx="5862244" cy="1197475"/>
-            <a:chOff x="2948638" y="1544156"/>
-            <a:chExt cx="5862244" cy="1197475"/>
-          </a:xfrm>
-        </p:grpSpPr>
-        <p:sp>
-          <p:nvSpPr>
-            <p:cNvPr id="46" name="Shape">
-              <a:extLst>
-                <a:ext uri="{FF2B5EF4-FFF2-40B4-BE49-F238E27FC236}">
-                  <a16:creationId xmlns:a16="http://schemas.microsoft.com/office/drawing/2014/main" id="{9B48E475-7EBA-45A1-98CC-76A92F99CEAB}"/>
-                </a:ext>
-              </a:extLst>
-            </p:cNvPr>
-            <p:cNvSpPr/>
-            <p:nvPr/>
-          </p:nvSpPr>
-          <p:spPr>
-            <a:xfrm rot="20874979">
-              <a:off x="2948638" y="1544156"/>
-              <a:ext cx="5862244" cy="1197475"/>
-            </a:xfrm>
-            <a:custGeom>
-              <a:avLst/>
-              <a:gdLst/>
-              <a:ahLst/>
-              <a:cxnLst>
-                <a:cxn ang="0">
-                  <a:pos x="wd2" y="hd2"/>
-                </a:cxn>
-                <a:cxn ang="5400000">
-                  <a:pos x="wd2" y="hd2"/>
-                </a:cxn>
-                <a:cxn ang="10800000">
-                  <a:pos x="wd2" y="hd2"/>
-                </a:cxn>
-                <a:cxn ang="16200000">
-                  <a:pos x="wd2" y="hd2"/>
-                </a:cxn>
-              </a:cxnLst>
-              <a:rect l="0" t="0" r="r" b="b"/>
-              <a:pathLst>
-                <a:path w="21600" h="21600" extrusionOk="0">
-                  <a:moveTo>
-                    <a:pt x="0" y="10800"/>
-                  </a:moveTo>
-                  <a:lnTo>
-                    <a:pt x="10800" y="21600"/>
-                  </a:lnTo>
-                  <a:lnTo>
-                    <a:pt x="21600" y="10800"/>
-                  </a:lnTo>
-                  <a:lnTo>
-                    <a:pt x="10800" y="0"/>
-                  </a:lnTo>
-                  <a:close/>
-                </a:path>
-              </a:pathLst>
-            </a:custGeom>
-            <a:solidFill>
-              <a:schemeClr val="accent4">
-                <a:lumMod val="40000"/>
-                <a:lumOff val="60000"/>
-              </a:schemeClr>
-            </a:solidFill>
-            <a:ln w="25400">
-              <a:solidFill>
-                <a:srgbClr val="5E5E5E"/>
-              </a:solidFill>
-              <a:miter lim="400000"/>
-            </a:ln>
-            <a:effectLst>
-              <a:outerShdw blurRad="63500" dist="129819" dir="5400000" rotWithShape="0">
-                <a:srgbClr val="000000">
-                  <a:alpha val="50000"/>
-                </a:srgbClr>
-              </a:outerShdw>
-            </a:effectLst>
-          </p:spPr>
-          <p:txBody>
-            <a:bodyPr lIns="50800" tIns="50800" rIns="50800" bIns="50800" anchor="ctr"/>
-            <a:lstStyle/>
-            <a:p>
-              <a:pPr>
-                <a:defRPr sz="2200">
-                  <a:solidFill>
-                    <a:srgbClr val="FFFFFF"/>
-                  </a:solidFill>
-                  <a:latin typeface="Helvetica Neue Medium"/>
-                  <a:ea typeface="Helvetica Neue Medium"/>
-                  <a:cs typeface="Helvetica Neue Medium"/>
-                  <a:sym typeface="Helvetica Neue Medium"/>
-                </a:defRPr>
-              </a:pPr>
-              <a:endParaRPr/>
-            </a:p>
-          </p:txBody>
-        </p:sp>
-        <p:sp>
-          <p:nvSpPr>
-            <p:cNvPr id="47" name="Oval">
-              <a:extLst>
-                <a:ext uri="{FF2B5EF4-FFF2-40B4-BE49-F238E27FC236}">
-                  <a16:creationId xmlns:a16="http://schemas.microsoft.com/office/drawing/2014/main" id="{5C98A301-AC7F-43B6-B5E1-6A5D071AA4E4}"/>
-                </a:ext>
-              </a:extLst>
-            </p:cNvPr>
-            <p:cNvSpPr/>
-            <p:nvPr/>
-          </p:nvSpPr>
-          <p:spPr>
-            <a:xfrm>
-              <a:off x="8080746" y="1592498"/>
-              <a:ext cx="272029" cy="96525"/>
-            </a:xfrm>
-            <a:prstGeom prst="ellipse">
-              <a:avLst/>
-            </a:prstGeom>
-            <a:solidFill>
-              <a:srgbClr val="FFFFFF"/>
-            </a:solidFill>
-            <a:ln w="25400">
-              <a:solidFill>
-                <a:srgbClr val="5E5E5E"/>
-              </a:solidFill>
-              <a:miter lim="400000"/>
-            </a:ln>
-          </p:spPr>
-          <p:txBody>
-            <a:bodyPr lIns="50800" tIns="50800" rIns="50800" bIns="50800" anchor="ctr"/>
-            <a:lstStyle/>
-            <a:p>
-              <a:pPr>
-                <a:defRPr sz="2200">
-                  <a:solidFill>
-                    <a:srgbClr val="FFFFFF"/>
-                  </a:solidFill>
-                  <a:latin typeface="Helvetica Neue Medium"/>
-                  <a:ea typeface="Helvetica Neue Medium"/>
-                  <a:cs typeface="Helvetica Neue Medium"/>
-                  <a:sym typeface="Helvetica Neue Medium"/>
-                </a:defRPr>
-              </a:pPr>
-              <a:endParaRPr/>
             </a:p>
           </p:txBody>
         </p:sp>
@@ -4131,7 +3989,7 @@
         </p:nvGrpSpPr>
         <p:grpSpPr>
           <a:xfrm>
-            <a:off x="2958250" y="4886885"/>
+            <a:off x="2714410" y="5882565"/>
             <a:ext cx="5862244" cy="1197475"/>
             <a:chOff x="1827289" y="5632838"/>
             <a:chExt cx="5862244" cy="1197475"/>
@@ -4356,8 +4214,8 @@
           </p:nvSpPr>
           <p:spPr>
             <a:xfrm rot="20160000">
-              <a:off x="4920133" y="6097269"/>
-              <a:ext cx="1461940" cy="348813"/>
+              <a:off x="4381402" y="6078219"/>
+              <a:ext cx="2729914" cy="348813"/>
             </a:xfrm>
             <a:prstGeom prst="rect">
               <a:avLst/>
@@ -4393,7 +4251,7 @@
                     <a:srgbClr val="BAF0FF"/>
                   </a:solidFill>
                 </a:rPr>
-                <a:t>&lt;localization&gt;</a:t>
+                <a:t>&lt;localized attribute labels&gt;</a:t>
               </a:r>
               <a:endParaRPr dirty="0">
                 <a:solidFill>
@@ -4418,7 +4276,7 @@
         </p:nvGrpSpPr>
         <p:grpSpPr>
           <a:xfrm>
-            <a:off x="3135071" y="4258268"/>
+            <a:off x="2891231" y="5253948"/>
             <a:ext cx="5862244" cy="1197475"/>
             <a:chOff x="2028173" y="4907969"/>
             <a:chExt cx="5862244" cy="1197475"/>
@@ -4620,8 +4478,8 @@
           </p:nvSpPr>
           <p:spPr>
             <a:xfrm rot="20160000">
-              <a:off x="5064912" y="5372400"/>
-              <a:ext cx="1574150" cy="348813"/>
+              <a:off x="4628771" y="5391450"/>
+              <a:ext cx="2636940" cy="348813"/>
             </a:xfrm>
             <a:prstGeom prst="rect">
               <a:avLst/>
@@ -4657,7 +4515,7 @@
                     <a:srgbClr val="5E5E5E"/>
                   </a:solidFill>
                 </a:rPr>
-                <a:t>&lt;presentation&gt;</a:t>
+                <a:t>&lt;field value presentation&gt;</a:t>
               </a:r>
               <a:endParaRPr dirty="0">
                 <a:solidFill>
@@ -4682,7 +4540,7 @@
         </p:nvGrpSpPr>
         <p:grpSpPr>
           <a:xfrm>
-            <a:off x="3280676" y="3688000"/>
+            <a:off x="3036836" y="4683680"/>
             <a:ext cx="5862244" cy="1197475"/>
             <a:chOff x="2221904" y="4193323"/>
             <a:chExt cx="5862244" cy="1197475"/>
@@ -4903,8 +4761,8 @@
           </p:nvSpPr>
           <p:spPr>
             <a:xfrm rot="20160000">
-              <a:off x="5081501" y="4657754"/>
-              <a:ext cx="1904367" cy="348813"/>
+              <a:off x="4883028" y="4638704"/>
+              <a:ext cx="2568011" cy="348813"/>
             </a:xfrm>
             <a:prstGeom prst="rect">
               <a:avLst/>
@@ -4940,7 +4798,7 @@
                     <a:srgbClr val="5E5E5E"/>
                   </a:solidFill>
                 </a:rPr>
-                <a:t>&lt;user experience&gt;</a:t>
+                <a:t>&lt;predefined field values&gt;</a:t>
               </a:r>
               <a:endParaRPr dirty="0">
                 <a:solidFill>
@@ -4965,10 +4823,10 @@
         </p:nvGrpSpPr>
         <p:grpSpPr>
           <a:xfrm>
-            <a:off x="9974331" y="3473375"/>
-            <a:ext cx="675755" cy="3402999"/>
-            <a:chOff x="8915559" y="4123076"/>
-            <a:chExt cx="675755" cy="3402999"/>
+            <a:off x="10095096" y="4083344"/>
+            <a:ext cx="656590" cy="3591396"/>
+            <a:chOff x="8934724" y="4733045"/>
+            <a:chExt cx="656590" cy="3591396"/>
           </a:xfrm>
         </p:grpSpPr>
         <p:sp>
@@ -4979,7 +4837,7 @@
           </p:nvSpPr>
           <p:spPr>
             <a:xfrm rot="16200000">
-              <a:off x="8292111" y="5622604"/>
+              <a:off x="8292111" y="6200128"/>
               <a:ext cx="1941815" cy="656590"/>
             </a:xfrm>
             <a:prstGeom prst="rect">
@@ -5030,9 +4888,9 @@
             <p:nvPr/>
           </p:nvSpPr>
           <p:spPr>
-            <a:xfrm flipV="1">
-              <a:off x="8915559" y="4123076"/>
-              <a:ext cx="3499" cy="3402999"/>
+            <a:xfrm flipH="1" flipV="1">
+              <a:off x="8954949" y="4733045"/>
+              <a:ext cx="0" cy="3591396"/>
             </a:xfrm>
             <a:prstGeom prst="line">
               <a:avLst/>
@@ -5069,10 +4927,10 @@
         </p:nvGrpSpPr>
         <p:grpSpPr>
           <a:xfrm>
-            <a:off x="9959297" y="7105159"/>
-            <a:ext cx="676893" cy="2511399"/>
-            <a:chOff x="11017638" y="2781360"/>
-            <a:chExt cx="676893" cy="2511399"/>
+            <a:off x="10081217" y="7789932"/>
+            <a:ext cx="676893" cy="1941815"/>
+            <a:chOff x="11017638" y="3466133"/>
+            <a:chExt cx="676893" cy="1941815"/>
           </a:xfrm>
         </p:grpSpPr>
         <p:sp>
@@ -5089,7 +4947,7 @@
           </p:nvSpPr>
           <p:spPr>
             <a:xfrm rot="16200000">
-              <a:off x="10395328" y="3722666"/>
+              <a:off x="10395328" y="4108746"/>
               <a:ext cx="1941815" cy="656590"/>
             </a:xfrm>
             <a:prstGeom prst="rect">
@@ -5141,8 +4999,8 @@
           </p:nvSpPr>
           <p:spPr>
             <a:xfrm flipV="1">
-              <a:off x="11017638" y="2781360"/>
-              <a:ext cx="1718" cy="2511399"/>
+              <a:off x="11017638" y="3573671"/>
+              <a:ext cx="15034" cy="1719087"/>
             </a:xfrm>
             <a:prstGeom prst="line">
               <a:avLst/>
@@ -5161,283 +5019,6 @@
             <a:lstStyle/>
             <a:p>
               <a:endParaRPr/>
-            </a:p>
-          </p:txBody>
-        </p:sp>
-      </p:grpSp>
-      <p:grpSp>
-        <p:nvGrpSpPr>
-          <p:cNvPr id="92" name="Group 91">
-            <a:extLst>
-              <a:ext uri="{FF2B5EF4-FFF2-40B4-BE49-F238E27FC236}">
-                <a16:creationId xmlns:a16="http://schemas.microsoft.com/office/drawing/2014/main" id="{B1814C12-3733-4E84-8AB6-C887054A06B9}"/>
-              </a:ext>
-            </a:extLst>
-          </p:cNvPr>
-          <p:cNvGrpSpPr/>
-          <p:nvPr/>
-        </p:nvGrpSpPr>
-        <p:grpSpPr>
-          <a:xfrm>
-            <a:off x="2054915" y="8377648"/>
-            <a:ext cx="5862244" cy="1197475"/>
-            <a:chOff x="2674236" y="2762016"/>
-            <a:chExt cx="5862244" cy="1197475"/>
-          </a:xfrm>
-        </p:grpSpPr>
-        <p:sp>
-          <p:nvSpPr>
-            <p:cNvPr id="93" name="Shape">
-              <a:extLst>
-                <a:ext uri="{FF2B5EF4-FFF2-40B4-BE49-F238E27FC236}">
-                  <a16:creationId xmlns:a16="http://schemas.microsoft.com/office/drawing/2014/main" id="{2DC25940-4672-4188-8B4E-00A03553FFF6}"/>
-                </a:ext>
-              </a:extLst>
-            </p:cNvPr>
-            <p:cNvSpPr/>
-            <p:nvPr/>
-          </p:nvSpPr>
-          <p:spPr>
-            <a:xfrm rot="20874979">
-              <a:off x="2674236" y="2762016"/>
-              <a:ext cx="5862244" cy="1197475"/>
-            </a:xfrm>
-            <a:custGeom>
-              <a:avLst/>
-              <a:gdLst/>
-              <a:ahLst/>
-              <a:cxnLst>
-                <a:cxn ang="0">
-                  <a:pos x="wd2" y="hd2"/>
-                </a:cxn>
-                <a:cxn ang="5400000">
-                  <a:pos x="wd2" y="hd2"/>
-                </a:cxn>
-                <a:cxn ang="10800000">
-                  <a:pos x="wd2" y="hd2"/>
-                </a:cxn>
-                <a:cxn ang="16200000">
-                  <a:pos x="wd2" y="hd2"/>
-                </a:cxn>
-              </a:cxnLst>
-              <a:rect l="0" t="0" r="r" b="b"/>
-              <a:pathLst>
-                <a:path w="21600" h="21600" extrusionOk="0">
-                  <a:moveTo>
-                    <a:pt x="0" y="10800"/>
-                  </a:moveTo>
-                  <a:lnTo>
-                    <a:pt x="10800" y="21600"/>
-                  </a:lnTo>
-                  <a:lnTo>
-                    <a:pt x="21600" y="10800"/>
-                  </a:lnTo>
-                  <a:lnTo>
-                    <a:pt x="10800" y="0"/>
-                  </a:lnTo>
-                  <a:close/>
-                </a:path>
-              </a:pathLst>
-            </a:custGeom>
-            <a:solidFill>
-              <a:schemeClr val="accent3">
-                <a:lumMod val="50000"/>
-              </a:schemeClr>
-            </a:solidFill>
-            <a:ln w="25400">
-              <a:solidFill>
-                <a:srgbClr val="5E5E5E"/>
-              </a:solidFill>
-              <a:miter lim="400000"/>
-            </a:ln>
-            <a:effectLst>
-              <a:outerShdw blurRad="63500" dist="131478" dir="5400000" rotWithShape="0">
-                <a:srgbClr val="000000">
-                  <a:alpha val="50000"/>
-                </a:srgbClr>
-              </a:outerShdw>
-            </a:effectLst>
-          </p:spPr>
-          <p:txBody>
-            <a:bodyPr lIns="50800" tIns="50800" rIns="50800" bIns="50800" anchor="ctr"/>
-            <a:lstStyle/>
-            <a:p>
-              <a:pPr>
-                <a:defRPr sz="2200">
-                  <a:solidFill>
-                    <a:srgbClr val="FFFFFF"/>
-                  </a:solidFill>
-                  <a:latin typeface="Helvetica Neue Medium"/>
-                  <a:ea typeface="Helvetica Neue Medium"/>
-                  <a:cs typeface="Helvetica Neue Medium"/>
-                  <a:sym typeface="Helvetica Neue Medium"/>
-                </a:defRPr>
-              </a:pPr>
-              <a:endParaRPr>
-                <a:solidFill>
-                  <a:srgbClr val="BAF0FF"/>
-                </a:solidFill>
-              </a:endParaRPr>
-            </a:p>
-          </p:txBody>
-        </p:sp>
-        <p:sp>
-          <p:nvSpPr>
-            <p:cNvPr id="94" name="Oval">
-              <a:extLst>
-                <a:ext uri="{FF2B5EF4-FFF2-40B4-BE49-F238E27FC236}">
-                  <a16:creationId xmlns:a16="http://schemas.microsoft.com/office/drawing/2014/main" id="{79D630BF-4BB8-4BC8-AF0A-142DCC8B0BCB}"/>
-                </a:ext>
-              </a:extLst>
-            </p:cNvPr>
-            <p:cNvSpPr/>
-            <p:nvPr/>
-          </p:nvSpPr>
-          <p:spPr>
-            <a:xfrm>
-              <a:off x="7763088" y="2798330"/>
-              <a:ext cx="272031" cy="96525"/>
-            </a:xfrm>
-            <a:prstGeom prst="ellipse">
-              <a:avLst/>
-            </a:prstGeom>
-            <a:solidFill>
-              <a:srgbClr val="FFFFFF"/>
-            </a:solidFill>
-            <a:ln w="25400">
-              <a:solidFill>
-                <a:srgbClr val="5E5E5E"/>
-              </a:solidFill>
-              <a:miter lim="400000"/>
-            </a:ln>
-          </p:spPr>
-          <p:txBody>
-            <a:bodyPr lIns="50800" tIns="50800" rIns="50800" bIns="50800" anchor="ctr"/>
-            <a:lstStyle/>
-            <a:p>
-              <a:pPr>
-                <a:defRPr sz="2200">
-                  <a:solidFill>
-                    <a:srgbClr val="FFFFFF"/>
-                  </a:solidFill>
-                  <a:latin typeface="Helvetica Neue Medium"/>
-                  <a:ea typeface="Helvetica Neue Medium"/>
-                  <a:cs typeface="Helvetica Neue Medium"/>
-                  <a:sym typeface="Helvetica Neue Medium"/>
-                </a:defRPr>
-              </a:pPr>
-              <a:endParaRPr>
-                <a:solidFill>
-                  <a:srgbClr val="BAF0FF"/>
-                </a:solidFill>
-              </a:endParaRPr>
-            </a:p>
-          </p:txBody>
-        </p:sp>
-        <p:sp>
-          <p:nvSpPr>
-            <p:cNvPr id="95" name="Subset">
-              <a:extLst>
-                <a:ext uri="{FF2B5EF4-FFF2-40B4-BE49-F238E27FC236}">
-                  <a16:creationId xmlns:a16="http://schemas.microsoft.com/office/drawing/2014/main" id="{4A8D72BD-3734-4D90-A3F3-0876DCBD8F0C}"/>
-                </a:ext>
-              </a:extLst>
-            </p:cNvPr>
-            <p:cNvSpPr txBox="1"/>
-            <p:nvPr/>
-          </p:nvSpPr>
-          <p:spPr>
-            <a:xfrm>
-              <a:off x="3381991" y="3486354"/>
-              <a:ext cx="2647127" cy="425758"/>
-            </a:xfrm>
-            <a:prstGeom prst="rect">
-              <a:avLst/>
-            </a:prstGeom>
-            <a:ln w="12700">
-              <a:miter lim="400000"/>
-            </a:ln>
-            <a:extLst>
-              <a:ext uri="{C572A759-6A51-4108-AA02-DFA0A04FC94B}">
-                <ma14:wrappingTextBoxFlag xmlns:ma14="http://schemas.microsoft.com/office/mac/drawingml/2011/main" xmlns:a14="http://schemas.microsoft.com/office/drawing/2010/main" xmlns:m="http://schemas.openxmlformats.org/officeDocument/2006/math" xmlns="" val="1"/>
-              </a:ext>
-            </a:extLst>
-          </p:spPr>
-          <p:txBody>
-            <a:bodyPr wrap="square" lIns="50800" tIns="50800" rIns="50800" bIns="50800" anchor="ctr">
-              <a:spAutoFit/>
-            </a:bodyPr>
-            <a:lstStyle>
-              <a:lvl1pPr>
-                <a:defRPr sz="2100" b="1" i="1">
-                  <a:solidFill>
-                    <a:srgbClr val="5E5E5E"/>
-                  </a:solidFill>
-                  <a:latin typeface="+mn-lt"/>
-                  <a:ea typeface="+mn-ea"/>
-                  <a:cs typeface="+mn-cs"/>
-                  <a:sym typeface="Helvetica Neue"/>
-                </a:defRPr>
-              </a:lvl1pPr>
-            </a:lstStyle>
-            <a:p>
-              <a:endParaRPr dirty="0">
-                <a:solidFill>
-                  <a:srgbClr val="BAF0FF"/>
-                </a:solidFill>
-              </a:endParaRPr>
-            </a:p>
-          </p:txBody>
-        </p:sp>
-        <p:sp>
-          <p:nvSpPr>
-            <p:cNvPr id="96" name="&lt;encoding&gt;">
-              <a:extLst>
-                <a:ext uri="{FF2B5EF4-FFF2-40B4-BE49-F238E27FC236}">
-                  <a16:creationId xmlns:a16="http://schemas.microsoft.com/office/drawing/2014/main" id="{CD07B2A1-77CF-4FE4-85D1-F663BA6B664E}"/>
-                </a:ext>
-              </a:extLst>
-            </p:cNvPr>
-            <p:cNvSpPr txBox="1"/>
-            <p:nvPr/>
-          </p:nvSpPr>
-          <p:spPr>
-            <a:xfrm rot="20160000">
-              <a:off x="6845344" y="3050608"/>
-              <a:ext cx="102656" cy="348813"/>
-            </a:xfrm>
-            <a:prstGeom prst="rect">
-              <a:avLst/>
-            </a:prstGeom>
-            <a:ln w="12700">
-              <a:miter lim="400000"/>
-            </a:ln>
-            <a:extLst>
-              <a:ext uri="{C572A759-6A51-4108-AA02-DFA0A04FC94B}">
-                <ma14:wrappingTextBoxFlag xmlns:ma14="http://schemas.microsoft.com/office/mac/drawingml/2011/main" xmlns:a14="http://schemas.microsoft.com/office/drawing/2010/main" xmlns:m="http://schemas.openxmlformats.org/officeDocument/2006/math" xmlns="" val="1"/>
-              </a:ext>
-            </a:extLst>
-          </p:spPr>
-          <p:txBody>
-            <a:bodyPr wrap="none" lIns="50800" tIns="50800" rIns="50800" bIns="50800" anchor="ctr">
-              <a:spAutoFit/>
-            </a:bodyPr>
-            <a:lstStyle>
-              <a:lvl1pPr>
-                <a:defRPr sz="1600" b="1">
-                  <a:latin typeface="+mn-lt"/>
-                  <a:ea typeface="+mn-ea"/>
-                  <a:cs typeface="+mn-cs"/>
-                  <a:sym typeface="Helvetica Neue"/>
-                </a:defRPr>
-              </a:lvl1pPr>
-            </a:lstStyle>
-            <a:p>
-              <a:endParaRPr dirty="0">
-                <a:solidFill>
-                  <a:srgbClr val="BAF0FF"/>
-                </a:solidFill>
-              </a:endParaRPr>
             </a:p>
           </p:txBody>
         </p:sp>
@@ -5456,7 +5037,7 @@
         </p:nvGrpSpPr>
         <p:grpSpPr>
           <a:xfrm>
-            <a:off x="2274977" y="7753341"/>
+            <a:off x="2132737" y="8180061"/>
             <a:ext cx="5862244" cy="1197475"/>
             <a:chOff x="2858201" y="2101616"/>
             <a:chExt cx="5862244" cy="1197475"/>
@@ -5688,8 +5269,8 @@
           </p:nvSpPr>
           <p:spPr>
             <a:xfrm rot="20160000">
-              <a:off x="5884954" y="2320773"/>
-              <a:ext cx="1922001" cy="595035"/>
+              <a:off x="5549127" y="2320773"/>
+              <a:ext cx="2593659" cy="595035"/>
             </a:xfrm>
             <a:prstGeom prst="rect">
               <a:avLst/>
@@ -5724,22 +5305,17 @@
                     <a:srgbClr val="BAF0FF"/>
                   </a:solidFill>
                 </a:rPr>
-                <a:t>&lt;serialization,</a:t>
+                <a:t>&lt;serialization, signing, </a:t>
               </a:r>
-              <a:br>
-                <a:rPr lang="en-US" dirty="0">
-                  <a:solidFill>
-                    <a:srgbClr val="BAF0FF"/>
-                  </a:solidFill>
-                </a:rPr>
-              </a:br>
+            </a:p>
+            <a:p>
               <a:r>
                 <a:rPr lang="en-US" dirty="0">
                   <a:solidFill>
                     <a:srgbClr val="BAF0FF"/>
                   </a:solidFill>
                 </a:rPr>
-                <a:t>signing, securing&gt;</a:t>
+                <a:t>securing, char encoding&gt;</a:t>
               </a:r>
             </a:p>
           </p:txBody>
@@ -5747,10 +5323,10 @@
       </p:grpSp>
       <p:grpSp>
         <p:nvGrpSpPr>
-          <p:cNvPr id="102" name="Group 101">
+          <p:cNvPr id="66" name="Group 65">
             <a:extLst>
               <a:ext uri="{FF2B5EF4-FFF2-40B4-BE49-F238E27FC236}">
-                <a16:creationId xmlns:a16="http://schemas.microsoft.com/office/drawing/2014/main" id="{18B85B2B-8EE5-4C41-8FF7-DF41F7FF9AD0}"/>
+                <a16:creationId xmlns:a16="http://schemas.microsoft.com/office/drawing/2014/main" id="{1B9B924B-D351-4D8F-B326-6C4E3FD7A87D}"/>
               </a:ext>
             </a:extLst>
           </p:cNvPr>
@@ -5759,18 +5335,18 @@
         </p:nvGrpSpPr>
         <p:grpSpPr>
           <a:xfrm>
-            <a:off x="2325368" y="7123683"/>
+            <a:off x="3208286" y="4126150"/>
             <a:ext cx="5862244" cy="1197475"/>
-            <a:chOff x="2948638" y="1544156"/>
+            <a:chOff x="2221904" y="4193323"/>
             <a:chExt cx="5862244" cy="1197475"/>
           </a:xfrm>
         </p:grpSpPr>
         <p:sp>
           <p:nvSpPr>
-            <p:cNvPr id="103" name="Shape">
+            <p:cNvPr id="67" name="Shape">
               <a:extLst>
                 <a:ext uri="{FF2B5EF4-FFF2-40B4-BE49-F238E27FC236}">
-                  <a16:creationId xmlns:a16="http://schemas.microsoft.com/office/drawing/2014/main" id="{A20FC2BE-75A5-400C-9920-1C7FA18E5C2A}"/>
+                  <a16:creationId xmlns:a16="http://schemas.microsoft.com/office/drawing/2014/main" id="{DC59F998-D73F-4214-A654-1DEEC8674EB0}"/>
                 </a:ext>
               </a:extLst>
             </p:cNvPr>
@@ -5779,7 +5355,7 @@
           </p:nvSpPr>
           <p:spPr>
             <a:xfrm rot="20874979">
-              <a:off x="2948638" y="1544156"/>
+              <a:off x="2221904" y="4193323"/>
               <a:ext cx="5862244" cy="1197475"/>
             </a:xfrm>
             <a:custGeom>
@@ -5820,9 +5396,297 @@
               </a:pathLst>
             </a:custGeom>
             <a:solidFill>
-              <a:schemeClr val="accent3">
-                <a:lumMod val="60000"/>
-                <a:lumOff val="40000"/>
+              <a:schemeClr val="accent2">
+                <a:lumMod val="20000"/>
+                <a:lumOff val="80000"/>
+              </a:schemeClr>
+            </a:solidFill>
+            <a:ln w="25400">
+              <a:solidFill>
+                <a:srgbClr val="000000"/>
+              </a:solidFill>
+              <a:miter lim="400000"/>
+            </a:ln>
+            <a:effectLst>
+              <a:outerShdw blurRad="63500" dist="126055" dir="5400000" rotWithShape="0">
+                <a:srgbClr val="000000">
+                  <a:alpha val="50000"/>
+                </a:srgbClr>
+              </a:outerShdw>
+            </a:effectLst>
+          </p:spPr>
+          <p:txBody>
+            <a:bodyPr lIns="50800" tIns="50800" rIns="50800" bIns="50800" anchor="ctr"/>
+            <a:lstStyle/>
+            <a:p>
+              <a:pPr>
+                <a:defRPr sz="2200">
+                  <a:solidFill>
+                    <a:srgbClr val="FFFFFF"/>
+                  </a:solidFill>
+                  <a:latin typeface="Helvetica Neue Medium"/>
+                  <a:ea typeface="Helvetica Neue Medium"/>
+                  <a:cs typeface="Helvetica Neue Medium"/>
+                  <a:sym typeface="Helvetica Neue Medium"/>
+                </a:defRPr>
+              </a:pPr>
+              <a:endParaRPr/>
+            </a:p>
+          </p:txBody>
+        </p:sp>
+        <p:sp>
+          <p:nvSpPr>
+            <p:cNvPr id="68" name="Entry">
+              <a:extLst>
+                <a:ext uri="{FF2B5EF4-FFF2-40B4-BE49-F238E27FC236}">
+                  <a16:creationId xmlns:a16="http://schemas.microsoft.com/office/drawing/2014/main" id="{0A317BB0-1F8D-4B27-AF32-937A13B7B02D}"/>
+                </a:ext>
+              </a:extLst>
+            </p:cNvPr>
+            <p:cNvSpPr txBox="1"/>
+            <p:nvPr/>
+          </p:nvSpPr>
+          <p:spPr>
+            <a:xfrm>
+              <a:off x="3404361" y="4936798"/>
+              <a:ext cx="1586974" cy="425758"/>
+            </a:xfrm>
+            <a:prstGeom prst="rect">
+              <a:avLst/>
+            </a:prstGeom>
+            <a:noFill/>
+            <a:ln w="12700">
+              <a:miter lim="400000"/>
+            </a:ln>
+            <a:extLst>
+              <a:ext uri="{C572A759-6A51-4108-AA02-DFA0A04FC94B}">
+                <ma14:wrappingTextBoxFlag xmlns:ma14="http://schemas.microsoft.com/office/mac/drawingml/2011/main" xmlns:a14="http://schemas.microsoft.com/office/drawing/2010/main" xmlns:m="http://schemas.openxmlformats.org/officeDocument/2006/math" xmlns="" val="1"/>
+              </a:ext>
+            </a:extLst>
+          </p:spPr>
+          <p:txBody>
+            <a:bodyPr wrap="none" lIns="50800" tIns="50800" rIns="50800" bIns="50800" anchor="ctr">
+              <a:spAutoFit/>
+            </a:bodyPr>
+            <a:lstStyle>
+              <a:lvl1pPr>
+                <a:defRPr sz="2100" b="1" i="1">
+                  <a:solidFill>
+                    <a:srgbClr val="FFFFFF"/>
+                  </a:solidFill>
+                  <a:latin typeface="+mn-lt"/>
+                  <a:ea typeface="+mn-ea"/>
+                  <a:cs typeface="+mn-cs"/>
+                  <a:sym typeface="Helvetica Neue"/>
+                </a:defRPr>
+              </a:lvl1pPr>
+            </a:lstStyle>
+            <a:p>
+              <a:r>
+                <a:rPr lang="en-CA" dirty="0">
+                  <a:solidFill>
+                    <a:srgbClr val="5E5E5E"/>
+                  </a:solidFill>
+                </a:rPr>
+                <a:t>Conditional</a:t>
+              </a:r>
+              <a:endParaRPr dirty="0">
+                <a:solidFill>
+                  <a:srgbClr val="5E5E5E"/>
+                </a:solidFill>
+              </a:endParaRPr>
+            </a:p>
+          </p:txBody>
+        </p:sp>
+        <p:sp>
+          <p:nvSpPr>
+            <p:cNvPr id="69" name="Oval">
+              <a:extLst>
+                <a:ext uri="{FF2B5EF4-FFF2-40B4-BE49-F238E27FC236}">
+                  <a16:creationId xmlns:a16="http://schemas.microsoft.com/office/drawing/2014/main" id="{76960BF5-5DAC-43DA-ABBD-7B5EABD42D86}"/>
+                </a:ext>
+              </a:extLst>
+            </p:cNvPr>
+            <p:cNvSpPr/>
+            <p:nvPr/>
+          </p:nvSpPr>
+          <p:spPr>
+            <a:xfrm>
+              <a:off x="7352347" y="4227018"/>
+              <a:ext cx="272031" cy="96525"/>
+            </a:xfrm>
+            <a:prstGeom prst="ellipse">
+              <a:avLst/>
+            </a:prstGeom>
+            <a:solidFill>
+              <a:schemeClr val="bg1"/>
+            </a:solidFill>
+            <a:ln w="25400">
+              <a:solidFill>
+                <a:srgbClr val="5E5E5E"/>
+              </a:solidFill>
+              <a:miter lim="400000"/>
+            </a:ln>
+          </p:spPr>
+          <p:txBody>
+            <a:bodyPr lIns="50800" tIns="50800" rIns="50800" bIns="50800" anchor="ctr"/>
+            <a:lstStyle/>
+            <a:p>
+              <a:pPr>
+                <a:defRPr sz="2200">
+                  <a:solidFill>
+                    <a:srgbClr val="FFFFFF"/>
+                  </a:solidFill>
+                  <a:latin typeface="Helvetica Neue Medium"/>
+                  <a:ea typeface="Helvetica Neue Medium"/>
+                  <a:cs typeface="Helvetica Neue Medium"/>
+                  <a:sym typeface="Helvetica Neue Medium"/>
+                </a:defRPr>
+              </a:pPr>
+              <a:endParaRPr/>
+            </a:p>
+          </p:txBody>
+        </p:sp>
+        <p:sp>
+          <p:nvSpPr>
+            <p:cNvPr id="76" name="&lt;language&gt;">
+              <a:extLst>
+                <a:ext uri="{FF2B5EF4-FFF2-40B4-BE49-F238E27FC236}">
+                  <a16:creationId xmlns:a16="http://schemas.microsoft.com/office/drawing/2014/main" id="{0758FFAA-B087-4650-A5BC-6B63C919C84C}"/>
+                </a:ext>
+              </a:extLst>
+            </p:cNvPr>
+            <p:cNvSpPr txBox="1"/>
+            <p:nvPr/>
+          </p:nvSpPr>
+          <p:spPr>
+            <a:xfrm rot="20160000">
+              <a:off x="4844372" y="4600604"/>
+              <a:ext cx="2683427" cy="348813"/>
+            </a:xfrm>
+            <a:prstGeom prst="rect">
+              <a:avLst/>
+            </a:prstGeom>
+            <a:noFill/>
+            <a:ln w="12700">
+              <a:miter lim="400000"/>
+            </a:ln>
+            <a:extLst>
+              <a:ext uri="{C572A759-6A51-4108-AA02-DFA0A04FC94B}">
+                <ma14:wrappingTextBoxFlag xmlns:ma14="http://schemas.microsoft.com/office/mac/drawingml/2011/main" xmlns:a14="http://schemas.microsoft.com/office/drawing/2010/main" xmlns:m="http://schemas.openxmlformats.org/officeDocument/2006/math" xmlns="" val="1"/>
+              </a:ext>
+            </a:extLst>
+          </p:spPr>
+          <p:txBody>
+            <a:bodyPr wrap="none" lIns="50800" tIns="50800" rIns="50800" bIns="50800" anchor="ctr">
+              <a:spAutoFit/>
+            </a:bodyPr>
+            <a:lstStyle>
+              <a:lvl1pPr>
+                <a:defRPr sz="1600" b="1">
+                  <a:latin typeface="+mn-lt"/>
+                  <a:ea typeface="+mn-ea"/>
+                  <a:cs typeface="+mn-cs"/>
+                  <a:sym typeface="Helvetica Neue"/>
+                </a:defRPr>
+              </a:lvl1pPr>
+            </a:lstStyle>
+            <a:p>
+              <a:r>
+                <a:rPr lang="en-CA" dirty="0">
+                  <a:solidFill>
+                    <a:srgbClr val="5E5E5E"/>
+                  </a:solidFill>
+                </a:rPr>
+                <a:t>&lt;simple conditional logic&gt;</a:t>
+              </a:r>
+              <a:endParaRPr dirty="0">
+                <a:solidFill>
+                  <a:srgbClr val="5E5E5E"/>
+                </a:solidFill>
+              </a:endParaRPr>
+            </a:p>
+          </p:txBody>
+        </p:sp>
+      </p:grpSp>
+      <p:grpSp>
+        <p:nvGrpSpPr>
+          <p:cNvPr id="78" name="Group 77">
+            <a:extLst>
+              <a:ext uri="{FF2B5EF4-FFF2-40B4-BE49-F238E27FC236}">
+                <a16:creationId xmlns:a16="http://schemas.microsoft.com/office/drawing/2014/main" id="{EC9D7387-B82E-414B-8ED9-F416089F36B9}"/>
+              </a:ext>
+            </a:extLst>
+          </p:cNvPr>
+          <p:cNvGrpSpPr/>
+          <p:nvPr/>
+        </p:nvGrpSpPr>
+        <p:grpSpPr>
+          <a:xfrm>
+            <a:off x="4060726" y="1368758"/>
+            <a:ext cx="5862244" cy="1197475"/>
+            <a:chOff x="2858201" y="2101616"/>
+            <a:chExt cx="5862244" cy="1197475"/>
+          </a:xfrm>
+        </p:grpSpPr>
+        <p:sp>
+          <p:nvSpPr>
+            <p:cNvPr id="79" name="Shape">
+              <a:extLst>
+                <a:ext uri="{FF2B5EF4-FFF2-40B4-BE49-F238E27FC236}">
+                  <a16:creationId xmlns:a16="http://schemas.microsoft.com/office/drawing/2014/main" id="{FBA8CD98-BE40-40E8-84E3-FEC8FC66C5CC}"/>
+                </a:ext>
+              </a:extLst>
+            </p:cNvPr>
+            <p:cNvSpPr/>
+            <p:nvPr/>
+          </p:nvSpPr>
+          <p:spPr>
+            <a:xfrm rot="20874979">
+              <a:off x="2858201" y="2101616"/>
+              <a:ext cx="5862244" cy="1197475"/>
+            </a:xfrm>
+            <a:custGeom>
+              <a:avLst/>
+              <a:gdLst/>
+              <a:ahLst/>
+              <a:cxnLst>
+                <a:cxn ang="0">
+                  <a:pos x="wd2" y="hd2"/>
+                </a:cxn>
+                <a:cxn ang="5400000">
+                  <a:pos x="wd2" y="hd2"/>
+                </a:cxn>
+                <a:cxn ang="10800000">
+                  <a:pos x="wd2" y="hd2"/>
+                </a:cxn>
+                <a:cxn ang="16200000">
+                  <a:pos x="wd2" y="hd2"/>
+                </a:cxn>
+              </a:cxnLst>
+              <a:rect l="0" t="0" r="r" b="b"/>
+              <a:pathLst>
+                <a:path w="21600" h="21600" extrusionOk="0">
+                  <a:moveTo>
+                    <a:pt x="0" y="10800"/>
+                  </a:moveTo>
+                  <a:lnTo>
+                    <a:pt x="10800" y="21600"/>
+                  </a:lnTo>
+                  <a:lnTo>
+                    <a:pt x="21600" y="10800"/>
+                  </a:lnTo>
+                  <a:lnTo>
+                    <a:pt x="10800" y="0"/>
+                  </a:lnTo>
+                  <a:close/>
+                </a:path>
+              </a:pathLst>
+            </a:custGeom>
+            <a:solidFill>
+              <a:schemeClr val="accent4">
+                <a:lumMod val="40000"/>
+                <a:lumOff val="60000"/>
               </a:schemeClr>
             </a:solidFill>
             <a:ln w="25400">
@@ -5854,20 +5718,71 @@
                   <a:sym typeface="Helvetica Neue Medium"/>
                 </a:defRPr>
               </a:pPr>
-              <a:endParaRPr>
-                <a:solidFill>
-                  <a:srgbClr val="BAF0FF"/>
-                </a:solidFill>
-              </a:endParaRPr>
+              <a:endParaRPr/>
             </a:p>
           </p:txBody>
         </p:sp>
         <p:sp>
           <p:nvSpPr>
-            <p:cNvPr id="104" name="Oval">
+            <p:cNvPr id="80" name="Subset">
               <a:extLst>
                 <a:ext uri="{FF2B5EF4-FFF2-40B4-BE49-F238E27FC236}">
-                  <a16:creationId xmlns:a16="http://schemas.microsoft.com/office/drawing/2014/main" id="{D1C890A8-E53E-4FF4-B0D1-403FB08DC2B8}"/>
+                  <a16:creationId xmlns:a16="http://schemas.microsoft.com/office/drawing/2014/main" id="{4A78E210-F251-4DF4-B2E6-FBC89FA818D8}"/>
+                </a:ext>
+              </a:extLst>
+            </p:cNvPr>
+            <p:cNvSpPr txBox="1"/>
+            <p:nvPr/>
+          </p:nvSpPr>
+          <p:spPr>
+            <a:xfrm>
+              <a:off x="3534391" y="2846274"/>
+              <a:ext cx="2647127" cy="425758"/>
+            </a:xfrm>
+            <a:prstGeom prst="rect">
+              <a:avLst/>
+            </a:prstGeom>
+            <a:ln w="12700">
+              <a:miter lim="400000"/>
+            </a:ln>
+            <a:extLst>
+              <a:ext uri="{C572A759-6A51-4108-AA02-DFA0A04FC94B}">
+                <ma14:wrappingTextBoxFlag xmlns:ma14="http://schemas.microsoft.com/office/mac/drawingml/2011/main" xmlns:a14="http://schemas.microsoft.com/office/drawing/2010/main" xmlns:m="http://schemas.openxmlformats.org/officeDocument/2006/math" xmlns="" val="1"/>
+              </a:ext>
+            </a:extLst>
+          </p:spPr>
+          <p:txBody>
+            <a:bodyPr wrap="square" lIns="50800" tIns="50800" rIns="50800" bIns="50800" anchor="ctr">
+              <a:spAutoFit/>
+            </a:bodyPr>
+            <a:lstStyle>
+              <a:lvl1pPr>
+                <a:defRPr sz="2100" b="1" i="1">
+                  <a:solidFill>
+                    <a:srgbClr val="5E5E5E"/>
+                  </a:solidFill>
+                  <a:latin typeface="+mn-lt"/>
+                  <a:ea typeface="+mn-ea"/>
+                  <a:cs typeface="+mn-cs"/>
+                  <a:sym typeface="Helvetica Neue"/>
+                </a:defRPr>
+              </a:lvl1pPr>
+            </a:lstStyle>
+            <a:p>
+              <a:r>
+                <a:rPr lang="en-CA" dirty="0"/>
+                <a:t>Subset</a:t>
+              </a:r>
+              <a:endParaRPr dirty="0"/>
+            </a:p>
+          </p:txBody>
+        </p:sp>
+        <p:sp>
+          <p:nvSpPr>
+            <p:cNvPr id="81" name="Oval">
+              <a:extLst>
+                <a:ext uri="{FF2B5EF4-FFF2-40B4-BE49-F238E27FC236}">
+                  <a16:creationId xmlns:a16="http://schemas.microsoft.com/office/drawing/2014/main" id="{6553DE6D-92EB-4FA0-8FA7-86B5E3010827}"/>
                 </a:ext>
               </a:extLst>
             </p:cNvPr>
@@ -5876,7 +5791,7 @@
           </p:nvSpPr>
           <p:spPr>
             <a:xfrm>
-              <a:off x="8080746" y="1592498"/>
+              <a:off x="7928346" y="2163330"/>
               <a:ext cx="272029" cy="96525"/>
             </a:xfrm>
             <a:prstGeom prst="ellipse">
@@ -5907,11 +5822,367 @@
                   <a:sym typeface="Helvetica Neue Medium"/>
                 </a:defRPr>
               </a:pPr>
-              <a:endParaRPr>
-                <a:solidFill>
-                  <a:srgbClr val="BAF0FF"/>
-                </a:solidFill>
-              </a:endParaRPr>
+              <a:endParaRPr/>
+            </a:p>
+          </p:txBody>
+        </p:sp>
+        <p:sp>
+          <p:nvSpPr>
+            <p:cNvPr id="82" name="&lt;encoding&gt;">
+              <a:extLst>
+                <a:ext uri="{FF2B5EF4-FFF2-40B4-BE49-F238E27FC236}">
+                  <a16:creationId xmlns:a16="http://schemas.microsoft.com/office/drawing/2014/main" id="{F0E7E975-43D9-4141-B821-91063279C412}"/>
+                </a:ext>
+              </a:extLst>
+            </p:cNvPr>
+            <p:cNvSpPr txBox="1"/>
+            <p:nvPr/>
+          </p:nvSpPr>
+          <p:spPr>
+            <a:xfrm rot="20160000">
+              <a:off x="5933847" y="2492010"/>
+              <a:ext cx="1824217" cy="348813"/>
+            </a:xfrm>
+            <a:prstGeom prst="rect">
+              <a:avLst/>
+            </a:prstGeom>
+            <a:ln w="12700">
+              <a:miter lim="400000"/>
+            </a:ln>
+            <a:extLst>
+              <a:ext uri="{C572A759-6A51-4108-AA02-DFA0A04FC94B}">
+                <ma14:wrappingTextBoxFlag xmlns:ma14="http://schemas.microsoft.com/office/mac/drawingml/2011/main" xmlns:a14="http://schemas.microsoft.com/office/drawing/2010/main" xmlns:m="http://schemas.openxmlformats.org/officeDocument/2006/math" xmlns="" val="1"/>
+              </a:ext>
+            </a:extLst>
+          </p:spPr>
+          <p:txBody>
+            <a:bodyPr wrap="none" lIns="50800" tIns="50800" rIns="50800" bIns="50800" anchor="ctr">
+              <a:spAutoFit/>
+            </a:bodyPr>
+            <a:lstStyle>
+              <a:lvl1pPr>
+                <a:defRPr sz="1600" b="1">
+                  <a:latin typeface="+mn-lt"/>
+                  <a:ea typeface="+mn-ea"/>
+                  <a:cs typeface="+mn-cs"/>
+                  <a:sym typeface="Helvetica Neue"/>
+                </a:defRPr>
+              </a:lvl1pPr>
+            </a:lstStyle>
+            <a:p>
+              <a:r>
+                <a:rPr dirty="0">
+                  <a:solidFill>
+                    <a:srgbClr val="5E5E5E"/>
+                  </a:solidFill>
+                </a:rPr>
+                <a:t>&lt;</a:t>
+              </a:r>
+              <a:r>
+                <a:rPr lang="en-CA" dirty="0">
+                  <a:solidFill>
+                    <a:srgbClr val="5E5E5E"/>
+                  </a:solidFill>
+                </a:rPr>
+                <a:t>schema subset</a:t>
+              </a:r>
+              <a:r>
+                <a:rPr dirty="0">
+                  <a:solidFill>
+                    <a:srgbClr val="5E5E5E"/>
+                  </a:solidFill>
+                </a:rPr>
+                <a:t>&gt;</a:t>
+              </a:r>
+            </a:p>
+          </p:txBody>
+        </p:sp>
+      </p:grpSp>
+      <p:grpSp>
+        <p:nvGrpSpPr>
+          <p:cNvPr id="83" name="Group 82">
+            <a:extLst>
+              <a:ext uri="{FF2B5EF4-FFF2-40B4-BE49-F238E27FC236}">
+                <a16:creationId xmlns:a16="http://schemas.microsoft.com/office/drawing/2014/main" id="{0A1463FD-43FB-429B-AE5D-D4F74C08CABA}"/>
+              </a:ext>
+            </a:extLst>
+          </p:cNvPr>
+          <p:cNvGrpSpPr/>
+          <p:nvPr/>
+        </p:nvGrpSpPr>
+        <p:grpSpPr>
+          <a:xfrm>
+            <a:off x="4177599" y="853890"/>
+            <a:ext cx="5862244" cy="1197475"/>
+            <a:chOff x="2858201" y="2101616"/>
+            <a:chExt cx="5862244" cy="1197475"/>
+          </a:xfrm>
+        </p:grpSpPr>
+        <p:sp>
+          <p:nvSpPr>
+            <p:cNvPr id="84" name="Shape">
+              <a:extLst>
+                <a:ext uri="{FF2B5EF4-FFF2-40B4-BE49-F238E27FC236}">
+                  <a16:creationId xmlns:a16="http://schemas.microsoft.com/office/drawing/2014/main" id="{EABCF258-9112-40D1-BBF0-2AC74705908D}"/>
+                </a:ext>
+              </a:extLst>
+            </p:cNvPr>
+            <p:cNvSpPr/>
+            <p:nvPr/>
+          </p:nvSpPr>
+          <p:spPr>
+            <a:xfrm rot="20874979">
+              <a:off x="2858201" y="2101616"/>
+              <a:ext cx="5862244" cy="1197475"/>
+            </a:xfrm>
+            <a:custGeom>
+              <a:avLst/>
+              <a:gdLst/>
+              <a:ahLst/>
+              <a:cxnLst>
+                <a:cxn ang="0">
+                  <a:pos x="wd2" y="hd2"/>
+                </a:cxn>
+                <a:cxn ang="5400000">
+                  <a:pos x="wd2" y="hd2"/>
+                </a:cxn>
+                <a:cxn ang="10800000">
+                  <a:pos x="wd2" y="hd2"/>
+                </a:cxn>
+                <a:cxn ang="16200000">
+                  <a:pos x="wd2" y="hd2"/>
+                </a:cxn>
+              </a:cxnLst>
+              <a:rect l="0" t="0" r="r" b="b"/>
+              <a:pathLst>
+                <a:path w="21600" h="21600" extrusionOk="0">
+                  <a:moveTo>
+                    <a:pt x="0" y="10800"/>
+                  </a:moveTo>
+                  <a:lnTo>
+                    <a:pt x="10800" y="21600"/>
+                  </a:lnTo>
+                  <a:lnTo>
+                    <a:pt x="21600" y="10800"/>
+                  </a:lnTo>
+                  <a:lnTo>
+                    <a:pt x="10800" y="0"/>
+                  </a:lnTo>
+                  <a:close/>
+                </a:path>
+              </a:pathLst>
+            </a:custGeom>
+            <a:solidFill>
+              <a:schemeClr val="accent4">
+                <a:lumMod val="20000"/>
+                <a:lumOff val="80000"/>
+              </a:schemeClr>
+            </a:solidFill>
+            <a:ln w="25400">
+              <a:solidFill>
+                <a:srgbClr val="5E5E5E"/>
+              </a:solidFill>
+              <a:miter lim="400000"/>
+            </a:ln>
+            <a:effectLst>
+              <a:outerShdw blurRad="63500" dist="129819" dir="5400000" rotWithShape="0">
+                <a:srgbClr val="000000">
+                  <a:alpha val="50000"/>
+                </a:srgbClr>
+              </a:outerShdw>
+            </a:effectLst>
+          </p:spPr>
+          <p:txBody>
+            <a:bodyPr lIns="50800" tIns="50800" rIns="50800" bIns="50800" anchor="ctr"/>
+            <a:lstStyle/>
+            <a:p>
+              <a:pPr>
+                <a:defRPr sz="2200">
+                  <a:solidFill>
+                    <a:srgbClr val="FFFFFF"/>
+                  </a:solidFill>
+                  <a:latin typeface="Helvetica Neue Medium"/>
+                  <a:ea typeface="Helvetica Neue Medium"/>
+                  <a:cs typeface="Helvetica Neue Medium"/>
+                  <a:sym typeface="Helvetica Neue Medium"/>
+                </a:defRPr>
+              </a:pPr>
+              <a:endParaRPr/>
+            </a:p>
+          </p:txBody>
+        </p:sp>
+        <p:sp>
+          <p:nvSpPr>
+            <p:cNvPr id="85" name="Subset">
+              <a:extLst>
+                <a:ext uri="{FF2B5EF4-FFF2-40B4-BE49-F238E27FC236}">
+                  <a16:creationId xmlns:a16="http://schemas.microsoft.com/office/drawing/2014/main" id="{57A638AB-AD5A-474F-BCCC-522D85FB1DAC}"/>
+                </a:ext>
+              </a:extLst>
+            </p:cNvPr>
+            <p:cNvSpPr txBox="1"/>
+            <p:nvPr/>
+          </p:nvSpPr>
+          <p:spPr>
+            <a:xfrm>
+              <a:off x="3534391" y="2846274"/>
+              <a:ext cx="2647127" cy="425758"/>
+            </a:xfrm>
+            <a:prstGeom prst="rect">
+              <a:avLst/>
+            </a:prstGeom>
+            <a:ln w="12700">
+              <a:miter lim="400000"/>
+            </a:ln>
+            <a:extLst>
+              <a:ext uri="{C572A759-6A51-4108-AA02-DFA0A04FC94B}">
+                <ma14:wrappingTextBoxFlag xmlns:ma14="http://schemas.microsoft.com/office/mac/drawingml/2011/main" xmlns:a14="http://schemas.microsoft.com/office/drawing/2010/main" xmlns:m="http://schemas.openxmlformats.org/officeDocument/2006/math" xmlns="" val="1"/>
+              </a:ext>
+            </a:extLst>
+          </p:spPr>
+          <p:txBody>
+            <a:bodyPr wrap="square" lIns="50800" tIns="50800" rIns="50800" bIns="50800" anchor="ctr">
+              <a:spAutoFit/>
+            </a:bodyPr>
+            <a:lstStyle>
+              <a:lvl1pPr>
+                <a:defRPr sz="2100" b="1" i="1">
+                  <a:solidFill>
+                    <a:srgbClr val="5E5E5E"/>
+                  </a:solidFill>
+                  <a:latin typeface="+mn-lt"/>
+                  <a:ea typeface="+mn-ea"/>
+                  <a:cs typeface="+mn-cs"/>
+                  <a:sym typeface="Helvetica Neue"/>
+                </a:defRPr>
+              </a:lvl1pPr>
+            </a:lstStyle>
+            <a:p>
+              <a:r>
+                <a:rPr lang="en-CA" dirty="0"/>
+                <a:t>Sensitive</a:t>
+              </a:r>
+              <a:endParaRPr dirty="0"/>
+            </a:p>
+          </p:txBody>
+        </p:sp>
+        <p:sp>
+          <p:nvSpPr>
+            <p:cNvPr id="86" name="Oval">
+              <a:extLst>
+                <a:ext uri="{FF2B5EF4-FFF2-40B4-BE49-F238E27FC236}">
+                  <a16:creationId xmlns:a16="http://schemas.microsoft.com/office/drawing/2014/main" id="{F491C85F-A0B2-46D5-B99F-E8D3C3A0CC40}"/>
+                </a:ext>
+              </a:extLst>
+            </p:cNvPr>
+            <p:cNvSpPr/>
+            <p:nvPr/>
+          </p:nvSpPr>
+          <p:spPr>
+            <a:xfrm>
+              <a:off x="7928346" y="2163330"/>
+              <a:ext cx="272029" cy="96525"/>
+            </a:xfrm>
+            <a:prstGeom prst="ellipse">
+              <a:avLst/>
+            </a:prstGeom>
+            <a:solidFill>
+              <a:srgbClr val="FFFFFF"/>
+            </a:solidFill>
+            <a:ln w="25400">
+              <a:solidFill>
+                <a:srgbClr val="5E5E5E"/>
+              </a:solidFill>
+              <a:miter lim="400000"/>
+            </a:ln>
+          </p:spPr>
+          <p:txBody>
+            <a:bodyPr lIns="50800" tIns="50800" rIns="50800" bIns="50800" anchor="ctr"/>
+            <a:lstStyle/>
+            <a:p>
+              <a:pPr>
+                <a:defRPr sz="2200">
+                  <a:solidFill>
+                    <a:srgbClr val="FFFFFF"/>
+                  </a:solidFill>
+                  <a:latin typeface="Helvetica Neue Medium"/>
+                  <a:ea typeface="Helvetica Neue Medium"/>
+                  <a:cs typeface="Helvetica Neue Medium"/>
+                  <a:sym typeface="Helvetica Neue Medium"/>
+                </a:defRPr>
+              </a:pPr>
+              <a:endParaRPr/>
+            </a:p>
+          </p:txBody>
+        </p:sp>
+        <p:sp>
+          <p:nvSpPr>
+            <p:cNvPr id="87" name="&lt;encoding&gt;">
+              <a:extLst>
+                <a:ext uri="{FF2B5EF4-FFF2-40B4-BE49-F238E27FC236}">
+                  <a16:creationId xmlns:a16="http://schemas.microsoft.com/office/drawing/2014/main" id="{90479D69-C65C-40D7-A918-C34B2BA72FE1}"/>
+                </a:ext>
+              </a:extLst>
+            </p:cNvPr>
+            <p:cNvSpPr txBox="1"/>
+            <p:nvPr/>
+          </p:nvSpPr>
+          <p:spPr>
+            <a:xfrm rot="20160000">
+              <a:off x="5731864" y="2492010"/>
+              <a:ext cx="2228175" cy="348813"/>
+            </a:xfrm>
+            <a:prstGeom prst="rect">
+              <a:avLst/>
+            </a:prstGeom>
+            <a:ln w="12700">
+              <a:miter lim="400000"/>
+            </a:ln>
+            <a:extLst>
+              <a:ext uri="{C572A759-6A51-4108-AA02-DFA0A04FC94B}">
+                <ma14:wrappingTextBoxFlag xmlns:ma14="http://schemas.microsoft.com/office/mac/drawingml/2011/main" xmlns:a14="http://schemas.microsoft.com/office/drawing/2010/main" xmlns:m="http://schemas.openxmlformats.org/officeDocument/2006/math" xmlns="" val="1"/>
+              </a:ext>
+            </a:extLst>
+          </p:spPr>
+          <p:txBody>
+            <a:bodyPr wrap="none" lIns="50800" tIns="50800" rIns="50800" bIns="50800" anchor="ctr">
+              <a:spAutoFit/>
+            </a:bodyPr>
+            <a:lstStyle>
+              <a:lvl1pPr>
+                <a:defRPr sz="1600" b="1">
+                  <a:latin typeface="+mn-lt"/>
+                  <a:ea typeface="+mn-ea"/>
+                  <a:cs typeface="+mn-cs"/>
+                  <a:sym typeface="Helvetica Neue"/>
+                </a:defRPr>
+              </a:lvl1pPr>
+            </a:lstStyle>
+            <a:p>
+              <a:r>
+                <a:rPr dirty="0">
+                  <a:solidFill>
+                    <a:srgbClr val="5E5E5E"/>
+                  </a:solidFill>
+                </a:rPr>
+                <a:t>&lt;</a:t>
+              </a:r>
+              <a:r>
+                <a:rPr lang="en-CA" dirty="0">
+                  <a:solidFill>
+                    <a:srgbClr val="5E5E5E"/>
+                  </a:solidFill>
+                </a:rPr>
+                <a:t>attribute sensitivity</a:t>
+              </a:r>
+              <a:r>
+                <a:rPr dirty="0">
+                  <a:solidFill>
+                    <a:srgbClr val="5E5E5E"/>
+                  </a:solidFill>
+                </a:rPr>
+                <a:t>&gt;</a:t>
+              </a:r>
             </a:p>
           </p:txBody>
         </p:sp>
@@ -5924,8 +6195,8 @@
         </p:nvSpPr>
         <p:spPr>
           <a:xfrm flipV="1">
-            <a:off x="6855734" y="865096"/>
-            <a:ext cx="2504502" cy="9171150"/>
+            <a:off x="6855734" y="0"/>
+            <a:ext cx="2790916" cy="10036246"/>
           </a:xfrm>
           <a:prstGeom prst="line">
             <a:avLst/>
@@ -5943,6 +6214,70 @@
           <a:lstStyle/>
           <a:p>
             <a:endParaRPr/>
+          </a:p>
+        </p:txBody>
+      </p:sp>
+      <p:sp>
+        <p:nvSpPr>
+          <p:cNvPr id="88" name="Entry">
+            <a:extLst>
+              <a:ext uri="{FF2B5EF4-FFF2-40B4-BE49-F238E27FC236}">
+                <a16:creationId xmlns:a16="http://schemas.microsoft.com/office/drawing/2014/main" id="{1CD3F762-8BFD-4C4C-84DC-6436F0E5C47E}"/>
+              </a:ext>
+            </a:extLst>
+          </p:cNvPr>
+          <p:cNvSpPr txBox="1"/>
+          <p:nvPr/>
+        </p:nvSpPr>
+        <p:spPr>
+          <a:xfrm>
+            <a:off x="7255539" y="9165492"/>
+            <a:ext cx="2492670" cy="425758"/>
+          </a:xfrm>
+          <a:prstGeom prst="rect">
+            <a:avLst/>
+          </a:prstGeom>
+          <a:noFill/>
+          <a:ln w="12700">
+            <a:miter lim="400000"/>
+          </a:ln>
+          <a:extLst>
+            <a:ext uri="{C572A759-6A51-4108-AA02-DFA0A04FC94B}">
+              <ma14:wrappingTextBoxFlag xmlns:ma14="http://schemas.microsoft.com/office/mac/drawingml/2011/main" xmlns:a14="http://schemas.microsoft.com/office/drawing/2010/main" xmlns:m="http://schemas.openxmlformats.org/officeDocument/2006/math" xmlns="" val="1"/>
+            </a:ext>
+          </a:extLst>
+        </p:spPr>
+        <p:txBody>
+          <a:bodyPr wrap="none" lIns="50800" tIns="50800" rIns="50800" bIns="50800" anchor="ctr">
+            <a:spAutoFit/>
+          </a:bodyPr>
+          <a:lstStyle>
+            <a:lvl1pPr>
+              <a:defRPr sz="2100" b="1" i="1">
+                <a:solidFill>
+                  <a:srgbClr val="FFFFFF"/>
+                </a:solidFill>
+                <a:latin typeface="+mn-lt"/>
+                <a:ea typeface="+mn-ea"/>
+                <a:cs typeface="+mn-cs"/>
+                <a:sym typeface="Helvetica Neue"/>
+              </a:defRPr>
+            </a:lvl1pPr>
+          </a:lstStyle>
+          <a:p>
+            <a:r>
+              <a:rPr lang="en-CA" b="0" i="0" dirty="0">
+                <a:solidFill>
+                  <a:srgbClr val="5E5E5E"/>
+                </a:solidFill>
+              </a:rPr>
+              <a:t>* tentative/proposed</a:t>
+            </a:r>
+            <a:endParaRPr b="0" i="0" dirty="0">
+              <a:solidFill>
+                <a:srgbClr val="5E5E5E"/>
+              </a:solidFill>
+            </a:endParaRPr>
           </a:p>
         </p:txBody>
       </p:sp>

</xml_diff>

<commit_message>
Tweak is "Schema Base" rather than "Base Schema"
</commit_message>
<xml_diff>
--- a/src/HBB-Overlays-ARM v0.2.pptx
+++ b/src/HBB-Overlays-ARM v0.2.pptx
@@ -1964,7 +1964,7 @@
           </a:ln>
           <a:extLst>
             <a:ext uri="{C572A759-6A51-4108-AA02-DFA0A04FC94B}">
-              <ma14:wrappingTextBoxFlag xmlns:ma14="http://schemas.microsoft.com/office/mac/drawingml/2011/main" xmlns:a14="http://schemas.microsoft.com/office/drawing/2010/main" xmlns:m="http://schemas.openxmlformats.org/officeDocument/2006/math" xmlns="" val="1"/>
+              <ma14:wrappingTextBoxFlag xmlns="" xmlns:m="http://schemas.openxmlformats.org/officeDocument/2006/math" xmlns:a14="http://schemas.microsoft.com/office/drawing/2010/main" xmlns:ma14="http://schemas.microsoft.com/office/mac/drawingml/2011/main" val="1"/>
             </a:ext>
           </a:extLst>
         </p:spPr>
@@ -2003,7 +2003,7 @@
           </a:ln>
           <a:extLst>
             <a:ext uri="{C572A759-6A51-4108-AA02-DFA0A04FC94B}">
-              <ma14:wrappingTextBoxFlag xmlns:ma14="http://schemas.microsoft.com/office/mac/drawingml/2011/main" xmlns:a14="http://schemas.microsoft.com/office/drawing/2010/main" xmlns:m="http://schemas.openxmlformats.org/officeDocument/2006/math" xmlns="" val="1"/>
+              <ma14:wrappingTextBoxFlag xmlns="" xmlns:m="http://schemas.openxmlformats.org/officeDocument/2006/math" xmlns:a14="http://schemas.microsoft.com/office/drawing/2010/main" xmlns:ma14="http://schemas.microsoft.com/office/mac/drawingml/2011/main" val="1"/>
             </a:ext>
           </a:extLst>
         </p:spPr>
@@ -3051,7 +3051,7 @@
             </a:ln>
             <a:extLst>
               <a:ext uri="{C572A759-6A51-4108-AA02-DFA0A04FC94B}">
-                <ma14:wrappingTextBoxFlag xmlns:ma14="http://schemas.microsoft.com/office/mac/drawingml/2011/main" xmlns:a14="http://schemas.microsoft.com/office/drawing/2010/main" xmlns:m="http://schemas.openxmlformats.org/officeDocument/2006/math" xmlns="" val="1"/>
+                <ma14:wrappingTextBoxFlag xmlns="" xmlns:m="http://schemas.openxmlformats.org/officeDocument/2006/math" xmlns:a14="http://schemas.microsoft.com/office/drawing/2010/main" xmlns:ma14="http://schemas.microsoft.com/office/mac/drawingml/2011/main" val="1"/>
               </a:ext>
             </a:extLst>
           </p:spPr>
@@ -3164,7 +3164,7 @@
             </a:ln>
             <a:extLst>
               <a:ext uri="{C572A759-6A51-4108-AA02-DFA0A04FC94B}">
-                <ma14:wrappingTextBoxFlag xmlns:ma14="http://schemas.microsoft.com/office/mac/drawingml/2011/main" xmlns:a14="http://schemas.microsoft.com/office/drawing/2010/main" xmlns:m="http://schemas.openxmlformats.org/officeDocument/2006/math" xmlns="" val="1"/>
+                <ma14:wrappingTextBoxFlag xmlns="" xmlns:m="http://schemas.openxmlformats.org/officeDocument/2006/math" xmlns:a14="http://schemas.microsoft.com/office/drawing/2010/main" xmlns:ma14="http://schemas.microsoft.com/office/mac/drawingml/2011/main" val="1"/>
               </a:ext>
             </a:extLst>
           </p:spPr>
@@ -3372,7 +3372,7 @@
             </a:ln>
             <a:extLst>
               <a:ext uri="{C572A759-6A51-4108-AA02-DFA0A04FC94B}">
-                <ma14:wrappingTextBoxFlag xmlns:ma14="http://schemas.microsoft.com/office/mac/drawingml/2011/main" xmlns:a14="http://schemas.microsoft.com/office/drawing/2010/main" xmlns:m="http://schemas.openxmlformats.org/officeDocument/2006/math" xmlns="" val="1"/>
+                <ma14:wrappingTextBoxFlag xmlns="" xmlns:m="http://schemas.openxmlformats.org/officeDocument/2006/math" xmlns:a14="http://schemas.microsoft.com/office/drawing/2010/main" xmlns:ma14="http://schemas.microsoft.com/office/mac/drawingml/2011/main" val="1"/>
               </a:ext>
             </a:extLst>
           </p:spPr>
@@ -3396,7 +3396,7 @@
             <a:p>
               <a:r>
                 <a:rPr lang="en-CA" dirty="0"/>
-                <a:t>Base Schema*</a:t>
+                <a:t>Schema Base</a:t>
               </a:r>
               <a:endParaRPr dirty="0"/>
             </a:p>
@@ -3427,7 +3427,7 @@
             </a:ln>
             <a:extLst>
               <a:ext uri="{C572A759-6A51-4108-AA02-DFA0A04FC94B}">
-                <ma14:wrappingTextBoxFlag xmlns:ma14="http://schemas.microsoft.com/office/mac/drawingml/2011/main" xmlns:a14="http://schemas.microsoft.com/office/drawing/2010/main" xmlns:m="http://schemas.openxmlformats.org/officeDocument/2006/math" xmlns="" val="1"/>
+                <ma14:wrappingTextBoxFlag xmlns="" xmlns:m="http://schemas.openxmlformats.org/officeDocument/2006/math" xmlns:a14="http://schemas.microsoft.com/office/drawing/2010/main" xmlns:ma14="http://schemas.microsoft.com/office/mac/drawingml/2011/main" val="1"/>
               </a:ext>
             </a:extLst>
           </p:spPr>
@@ -3544,7 +3544,7 @@
             </a:ln>
             <a:extLst>
               <a:ext uri="{C572A759-6A51-4108-AA02-DFA0A04FC94B}">
-                <ma14:wrappingTextBoxFlag xmlns:ma14="http://schemas.microsoft.com/office/mac/drawingml/2011/main" xmlns:a14="http://schemas.microsoft.com/office/drawing/2010/main" xmlns:m="http://schemas.openxmlformats.org/officeDocument/2006/math" xmlns="" val="1"/>
+                <ma14:wrappingTextBoxFlag xmlns="" xmlns:m="http://schemas.openxmlformats.org/officeDocument/2006/math" xmlns:a14="http://schemas.microsoft.com/office/drawing/2010/main" xmlns:ma14="http://schemas.microsoft.com/office/mac/drawingml/2011/main" val="1"/>
               </a:ext>
             </a:extLst>
           </p:spPr>
@@ -3629,7 +3629,7 @@
           </a:ln>
           <a:extLst>
             <a:ext uri="{C572A759-6A51-4108-AA02-DFA0A04FC94B}">
-              <ma14:wrappingTextBoxFlag xmlns:ma14="http://schemas.microsoft.com/office/mac/drawingml/2011/main" xmlns:a14="http://schemas.microsoft.com/office/drawing/2010/main" xmlns:m="http://schemas.openxmlformats.org/officeDocument/2006/math" xmlns="" val="1"/>
+              <ma14:wrappingTextBoxFlag xmlns="" xmlns:m="http://schemas.openxmlformats.org/officeDocument/2006/math" xmlns:a14="http://schemas.microsoft.com/office/drawing/2010/main" xmlns:ma14="http://schemas.microsoft.com/office/mac/drawingml/2011/main" val="1"/>
             </a:ext>
           </a:extLst>
         </p:spPr>
@@ -3830,7 +3830,7 @@
             </a:ln>
             <a:extLst>
               <a:ext uri="{C572A759-6A51-4108-AA02-DFA0A04FC94B}">
-                <ma14:wrappingTextBoxFlag xmlns:ma14="http://schemas.microsoft.com/office/mac/drawingml/2011/main" xmlns:a14="http://schemas.microsoft.com/office/drawing/2010/main" xmlns:m="http://schemas.openxmlformats.org/officeDocument/2006/math" xmlns="" val="1"/>
+                <ma14:wrappingTextBoxFlag xmlns="" xmlns:m="http://schemas.openxmlformats.org/officeDocument/2006/math" xmlns:a14="http://schemas.microsoft.com/office/drawing/2010/main" xmlns:ma14="http://schemas.microsoft.com/office/mac/drawingml/2011/main" val="1"/>
               </a:ext>
             </a:extLst>
           </p:spPr>
@@ -3928,7 +3928,7 @@
             </a:ln>
             <a:extLst>
               <a:ext uri="{C572A759-6A51-4108-AA02-DFA0A04FC94B}">
-                <ma14:wrappingTextBoxFlag xmlns:ma14="http://schemas.microsoft.com/office/mac/drawingml/2011/main" xmlns:a14="http://schemas.microsoft.com/office/drawing/2010/main" xmlns:m="http://schemas.openxmlformats.org/officeDocument/2006/math" xmlns="" val="1"/>
+                <ma14:wrappingTextBoxFlag xmlns="" xmlns:m="http://schemas.openxmlformats.org/officeDocument/2006/math" xmlns:a14="http://schemas.microsoft.com/office/drawing/2010/main" xmlns:ma14="http://schemas.microsoft.com/office/mac/drawingml/2011/main" val="1"/>
               </a:ext>
             </a:extLst>
           </p:spPr>
@@ -4113,7 +4113,7 @@
             </a:ln>
             <a:extLst>
               <a:ext uri="{C572A759-6A51-4108-AA02-DFA0A04FC94B}">
-                <ma14:wrappingTextBoxFlag xmlns:ma14="http://schemas.microsoft.com/office/mac/drawingml/2011/main" xmlns:a14="http://schemas.microsoft.com/office/drawing/2010/main" xmlns:m="http://schemas.openxmlformats.org/officeDocument/2006/math" xmlns="" val="1"/>
+                <ma14:wrappingTextBoxFlag xmlns="" xmlns:m="http://schemas.openxmlformats.org/officeDocument/2006/math" xmlns:a14="http://schemas.microsoft.com/office/drawing/2010/main" xmlns:ma14="http://schemas.microsoft.com/office/mac/drawingml/2011/main" val="1"/>
               </a:ext>
             </a:extLst>
           </p:spPr>
@@ -4226,7 +4226,7 @@
             </a:ln>
             <a:extLst>
               <a:ext uri="{C572A759-6A51-4108-AA02-DFA0A04FC94B}">
-                <ma14:wrappingTextBoxFlag xmlns:ma14="http://schemas.microsoft.com/office/mac/drawingml/2011/main" xmlns:a14="http://schemas.microsoft.com/office/drawing/2010/main" xmlns:m="http://schemas.openxmlformats.org/officeDocument/2006/math" xmlns="" val="1"/>
+                <ma14:wrappingTextBoxFlag xmlns="" xmlns:m="http://schemas.openxmlformats.org/officeDocument/2006/math" xmlns:a14="http://schemas.microsoft.com/office/drawing/2010/main" xmlns:ma14="http://schemas.microsoft.com/office/mac/drawingml/2011/main" val="1"/>
               </a:ext>
             </a:extLst>
           </p:spPr>
@@ -4389,7 +4389,7 @@
             </a:ln>
             <a:extLst>
               <a:ext uri="{C572A759-6A51-4108-AA02-DFA0A04FC94B}">
-                <ma14:wrappingTextBoxFlag xmlns:ma14="http://schemas.microsoft.com/office/mac/drawingml/2011/main" xmlns:a14="http://schemas.microsoft.com/office/drawing/2010/main" xmlns:m="http://schemas.openxmlformats.org/officeDocument/2006/math" xmlns="" val="1"/>
+                <ma14:wrappingTextBoxFlag xmlns="" xmlns:m="http://schemas.openxmlformats.org/officeDocument/2006/math" xmlns:a14="http://schemas.microsoft.com/office/drawing/2010/main" xmlns:ma14="http://schemas.microsoft.com/office/mac/drawingml/2011/main" val="1"/>
               </a:ext>
             </a:extLst>
           </p:spPr>
@@ -4490,7 +4490,7 @@
             </a:ln>
             <a:extLst>
               <a:ext uri="{C572A759-6A51-4108-AA02-DFA0A04FC94B}">
-                <ma14:wrappingTextBoxFlag xmlns:ma14="http://schemas.microsoft.com/office/mac/drawingml/2011/main" xmlns:a14="http://schemas.microsoft.com/office/drawing/2010/main" xmlns:m="http://schemas.openxmlformats.org/officeDocument/2006/math" xmlns="" val="1"/>
+                <ma14:wrappingTextBoxFlag xmlns="" xmlns:m="http://schemas.openxmlformats.org/officeDocument/2006/math" xmlns:a14="http://schemas.microsoft.com/office/drawing/2010/main" xmlns:ma14="http://schemas.microsoft.com/office/mac/drawingml/2011/main" val="1"/>
               </a:ext>
             </a:extLst>
           </p:spPr>
@@ -4665,7 +4665,7 @@
             </a:ln>
             <a:extLst>
               <a:ext uri="{C572A759-6A51-4108-AA02-DFA0A04FC94B}">
-                <ma14:wrappingTextBoxFlag xmlns:ma14="http://schemas.microsoft.com/office/mac/drawingml/2011/main" xmlns:a14="http://schemas.microsoft.com/office/drawing/2010/main" xmlns:m="http://schemas.openxmlformats.org/officeDocument/2006/math" xmlns="" val="1"/>
+                <ma14:wrappingTextBoxFlag xmlns="" xmlns:m="http://schemas.openxmlformats.org/officeDocument/2006/math" xmlns:a14="http://schemas.microsoft.com/office/drawing/2010/main" xmlns:ma14="http://schemas.microsoft.com/office/mac/drawingml/2011/main" val="1"/>
               </a:ext>
             </a:extLst>
           </p:spPr>
@@ -4773,7 +4773,7 @@
             </a:ln>
             <a:extLst>
               <a:ext uri="{C572A759-6A51-4108-AA02-DFA0A04FC94B}">
-                <ma14:wrappingTextBoxFlag xmlns:ma14="http://schemas.microsoft.com/office/mac/drawingml/2011/main" xmlns:a14="http://schemas.microsoft.com/office/drawing/2010/main" xmlns:m="http://schemas.openxmlformats.org/officeDocument/2006/math" xmlns="" val="1"/>
+                <ma14:wrappingTextBoxFlag xmlns="" xmlns:m="http://schemas.openxmlformats.org/officeDocument/2006/math" xmlns:a14="http://schemas.microsoft.com/office/drawing/2010/main" xmlns:ma14="http://schemas.microsoft.com/office/mac/drawingml/2011/main" val="1"/>
               </a:ext>
             </a:extLst>
           </p:spPr>
@@ -4848,7 +4848,7 @@
             </a:ln>
             <a:extLst>
               <a:ext uri="{C572A759-6A51-4108-AA02-DFA0A04FC94B}">
-                <ma14:wrappingTextBoxFlag xmlns:ma14="http://schemas.microsoft.com/office/mac/drawingml/2011/main" xmlns:a14="http://schemas.microsoft.com/office/drawing/2010/main" xmlns:m="http://schemas.openxmlformats.org/officeDocument/2006/math" xmlns="" val="1"/>
+                <ma14:wrappingTextBoxFlag xmlns="" xmlns:m="http://schemas.openxmlformats.org/officeDocument/2006/math" xmlns:a14="http://schemas.microsoft.com/office/drawing/2010/main" xmlns:ma14="http://schemas.microsoft.com/office/mac/drawingml/2011/main" val="1"/>
               </a:ext>
             </a:extLst>
           </p:spPr>
@@ -4958,7 +4958,7 @@
             </a:ln>
             <a:extLst>
               <a:ext uri="{C572A759-6A51-4108-AA02-DFA0A04FC94B}">
-                <ma14:wrappingTextBoxFlag xmlns:ma14="http://schemas.microsoft.com/office/mac/drawingml/2011/main" xmlns:a14="http://schemas.microsoft.com/office/drawing/2010/main" xmlns:m="http://schemas.openxmlformats.org/officeDocument/2006/math" xmlns="" val="1"/>
+                <ma14:wrappingTextBoxFlag xmlns="" xmlns:m="http://schemas.openxmlformats.org/officeDocument/2006/math" xmlns:a14="http://schemas.microsoft.com/office/drawing/2010/main" xmlns:ma14="http://schemas.microsoft.com/office/mac/drawingml/2011/main" val="1"/>
               </a:ext>
             </a:extLst>
           </p:spPr>
@@ -5164,7 +5164,7 @@
             </a:ln>
             <a:extLst>
               <a:ext uri="{C572A759-6A51-4108-AA02-DFA0A04FC94B}">
-                <ma14:wrappingTextBoxFlag xmlns:ma14="http://schemas.microsoft.com/office/mac/drawingml/2011/main" xmlns:a14="http://schemas.microsoft.com/office/drawing/2010/main" xmlns:m="http://schemas.openxmlformats.org/officeDocument/2006/math" xmlns="" val="1"/>
+                <ma14:wrappingTextBoxFlag xmlns="" xmlns:m="http://schemas.openxmlformats.org/officeDocument/2006/math" xmlns:a14="http://schemas.microsoft.com/office/drawing/2010/main" xmlns:ma14="http://schemas.microsoft.com/office/mac/drawingml/2011/main" val="1"/>
               </a:ext>
             </a:extLst>
           </p:spPr>
@@ -5280,7 +5280,7 @@
             </a:ln>
             <a:extLst>
               <a:ext uri="{C572A759-6A51-4108-AA02-DFA0A04FC94B}">
-                <ma14:wrappingTextBoxFlag xmlns:ma14="http://schemas.microsoft.com/office/mac/drawingml/2011/main" xmlns:a14="http://schemas.microsoft.com/office/drawing/2010/main" xmlns:m="http://schemas.openxmlformats.org/officeDocument/2006/math" xmlns="" val="1"/>
+                <ma14:wrappingTextBoxFlag xmlns="" xmlns:m="http://schemas.openxmlformats.org/officeDocument/2006/math" xmlns:a14="http://schemas.microsoft.com/office/drawing/2010/main" xmlns:ma14="http://schemas.microsoft.com/office/mac/drawingml/2011/main" val="1"/>
               </a:ext>
             </a:extLst>
           </p:spPr>
@@ -5460,7 +5460,7 @@
             </a:ln>
             <a:extLst>
               <a:ext uri="{C572A759-6A51-4108-AA02-DFA0A04FC94B}">
-                <ma14:wrappingTextBoxFlag xmlns:ma14="http://schemas.microsoft.com/office/mac/drawingml/2011/main" xmlns:a14="http://schemas.microsoft.com/office/drawing/2010/main" xmlns:m="http://schemas.openxmlformats.org/officeDocument/2006/math" xmlns="" val="1"/>
+                <ma14:wrappingTextBoxFlag xmlns="" xmlns:m="http://schemas.openxmlformats.org/officeDocument/2006/math" xmlns:a14="http://schemas.microsoft.com/office/drawing/2010/main" xmlns:ma14="http://schemas.microsoft.com/office/mac/drawingml/2011/main" val="1"/>
               </a:ext>
             </a:extLst>
           </p:spPr>
@@ -5573,7 +5573,7 @@
             </a:ln>
             <a:extLst>
               <a:ext uri="{C572A759-6A51-4108-AA02-DFA0A04FC94B}">
-                <ma14:wrappingTextBoxFlag xmlns:ma14="http://schemas.microsoft.com/office/mac/drawingml/2011/main" xmlns:a14="http://schemas.microsoft.com/office/drawing/2010/main" xmlns:m="http://schemas.openxmlformats.org/officeDocument/2006/math" xmlns="" val="1"/>
+                <ma14:wrappingTextBoxFlag xmlns="" xmlns:m="http://schemas.openxmlformats.org/officeDocument/2006/math" xmlns:a14="http://schemas.microsoft.com/office/drawing/2010/main" xmlns:ma14="http://schemas.microsoft.com/office/mac/drawingml/2011/main" val="1"/>
               </a:ext>
             </a:extLst>
           </p:spPr>
@@ -5747,7 +5747,7 @@
             </a:ln>
             <a:extLst>
               <a:ext uri="{C572A759-6A51-4108-AA02-DFA0A04FC94B}">
-                <ma14:wrappingTextBoxFlag xmlns:ma14="http://schemas.microsoft.com/office/mac/drawingml/2011/main" xmlns:a14="http://schemas.microsoft.com/office/drawing/2010/main" xmlns:m="http://schemas.openxmlformats.org/officeDocument/2006/math" xmlns="" val="1"/>
+                <ma14:wrappingTextBoxFlag xmlns="" xmlns:m="http://schemas.openxmlformats.org/officeDocument/2006/math" xmlns:a14="http://schemas.microsoft.com/office/drawing/2010/main" xmlns:ma14="http://schemas.microsoft.com/office/mac/drawingml/2011/main" val="1"/>
               </a:ext>
             </a:extLst>
           </p:spPr>
@@ -5851,7 +5851,7 @@
             </a:ln>
             <a:extLst>
               <a:ext uri="{C572A759-6A51-4108-AA02-DFA0A04FC94B}">
-                <ma14:wrappingTextBoxFlag xmlns:ma14="http://schemas.microsoft.com/office/mac/drawingml/2011/main" xmlns:a14="http://schemas.microsoft.com/office/drawing/2010/main" xmlns:m="http://schemas.openxmlformats.org/officeDocument/2006/math" xmlns="" val="1"/>
+                <ma14:wrappingTextBoxFlag xmlns="" xmlns:m="http://schemas.openxmlformats.org/officeDocument/2006/math" xmlns:a14="http://schemas.microsoft.com/office/drawing/2010/main" xmlns:ma14="http://schemas.microsoft.com/office/mac/drawingml/2011/main" val="1"/>
               </a:ext>
             </a:extLst>
           </p:spPr>
@@ -6036,7 +6036,7 @@
             </a:ln>
             <a:extLst>
               <a:ext uri="{C572A759-6A51-4108-AA02-DFA0A04FC94B}">
-                <ma14:wrappingTextBoxFlag xmlns:ma14="http://schemas.microsoft.com/office/mac/drawingml/2011/main" xmlns:a14="http://schemas.microsoft.com/office/drawing/2010/main" xmlns:m="http://schemas.openxmlformats.org/officeDocument/2006/math" xmlns="" val="1"/>
+                <ma14:wrappingTextBoxFlag xmlns="" xmlns:m="http://schemas.openxmlformats.org/officeDocument/2006/math" xmlns:a14="http://schemas.microsoft.com/office/drawing/2010/main" xmlns:ma14="http://schemas.microsoft.com/office/mac/drawingml/2011/main" val="1"/>
               </a:ext>
             </a:extLst>
           </p:spPr>
@@ -6140,7 +6140,7 @@
             </a:ln>
             <a:extLst>
               <a:ext uri="{C572A759-6A51-4108-AA02-DFA0A04FC94B}">
-                <ma14:wrappingTextBoxFlag xmlns:ma14="http://schemas.microsoft.com/office/mac/drawingml/2011/main" xmlns:a14="http://schemas.microsoft.com/office/drawing/2010/main" xmlns:m="http://schemas.openxmlformats.org/officeDocument/2006/math" xmlns="" val="1"/>
+                <ma14:wrappingTextBoxFlag xmlns="" xmlns:m="http://schemas.openxmlformats.org/officeDocument/2006/math" xmlns:a14="http://schemas.microsoft.com/office/drawing/2010/main" xmlns:ma14="http://schemas.microsoft.com/office/mac/drawingml/2011/main" val="1"/>
               </a:ext>
             </a:extLst>
           </p:spPr>
@@ -6243,7 +6243,7 @@
           </a:ln>
           <a:extLst>
             <a:ext uri="{C572A759-6A51-4108-AA02-DFA0A04FC94B}">
-              <ma14:wrappingTextBoxFlag xmlns:ma14="http://schemas.microsoft.com/office/mac/drawingml/2011/main" xmlns:a14="http://schemas.microsoft.com/office/drawing/2010/main" xmlns:m="http://schemas.openxmlformats.org/officeDocument/2006/math" xmlns="" val="1"/>
+              <ma14:wrappingTextBoxFlag xmlns="" xmlns:m="http://schemas.openxmlformats.org/officeDocument/2006/math" xmlns:a14="http://schemas.microsoft.com/office/drawing/2010/main" xmlns:ma14="http://schemas.microsoft.com/office/mac/drawingml/2011/main" val="1"/>
             </a:ext>
           </a:extLst>
         </p:spPr>

</xml_diff>

<commit_message>
Tweak Overlays ARM model
</commit_message>
<xml_diff>
--- a/src/HBB-Overlays-ARM v0.2.pptx
+++ b/src/HBB-Overlays-ARM v0.2.pptx
@@ -1964,7 +1964,7 @@
           </a:ln>
           <a:extLst>
             <a:ext uri="{C572A759-6A51-4108-AA02-DFA0A04FC94B}">
-              <ma14:wrappingTextBoxFlag xmlns="" xmlns:m="http://schemas.openxmlformats.org/officeDocument/2006/math" xmlns:a14="http://schemas.microsoft.com/office/drawing/2010/main" xmlns:ma14="http://schemas.microsoft.com/office/mac/drawingml/2011/main" val="1"/>
+              <ma14:wrappingTextBoxFlag xmlns:ma14="http://schemas.microsoft.com/office/mac/drawingml/2011/main" xmlns:a14="http://schemas.microsoft.com/office/drawing/2010/main" xmlns:m="http://schemas.openxmlformats.org/officeDocument/2006/math" xmlns="" val="1"/>
             </a:ext>
           </a:extLst>
         </p:spPr>
@@ -2003,7 +2003,7 @@
           </a:ln>
           <a:extLst>
             <a:ext uri="{C572A759-6A51-4108-AA02-DFA0A04FC94B}">
-              <ma14:wrappingTextBoxFlag xmlns="" xmlns:m="http://schemas.openxmlformats.org/officeDocument/2006/math" xmlns:a14="http://schemas.microsoft.com/office/drawing/2010/main" xmlns:ma14="http://schemas.microsoft.com/office/mac/drawingml/2011/main" val="1"/>
+              <ma14:wrappingTextBoxFlag xmlns:ma14="http://schemas.microsoft.com/office/mac/drawingml/2011/main" xmlns:a14="http://schemas.microsoft.com/office/drawing/2010/main" xmlns:m="http://schemas.openxmlformats.org/officeDocument/2006/math" xmlns="" val="1"/>
             </a:ext>
           </a:extLst>
         </p:spPr>
@@ -3051,7 +3051,7 @@
             </a:ln>
             <a:extLst>
               <a:ext uri="{C572A759-6A51-4108-AA02-DFA0A04FC94B}">
-                <ma14:wrappingTextBoxFlag xmlns="" xmlns:m="http://schemas.openxmlformats.org/officeDocument/2006/math" xmlns:a14="http://schemas.microsoft.com/office/drawing/2010/main" xmlns:ma14="http://schemas.microsoft.com/office/mac/drawingml/2011/main" val="1"/>
+                <ma14:wrappingTextBoxFlag xmlns:ma14="http://schemas.microsoft.com/office/mac/drawingml/2011/main" xmlns:a14="http://schemas.microsoft.com/office/drawing/2010/main" xmlns:m="http://schemas.openxmlformats.org/officeDocument/2006/math" xmlns="" val="1"/>
               </a:ext>
             </a:extLst>
           </p:spPr>
@@ -3164,7 +3164,7 @@
             </a:ln>
             <a:extLst>
               <a:ext uri="{C572A759-6A51-4108-AA02-DFA0A04FC94B}">
-                <ma14:wrappingTextBoxFlag xmlns="" xmlns:m="http://schemas.openxmlformats.org/officeDocument/2006/math" xmlns:a14="http://schemas.microsoft.com/office/drawing/2010/main" xmlns:ma14="http://schemas.microsoft.com/office/mac/drawingml/2011/main" val="1"/>
+                <ma14:wrappingTextBoxFlag xmlns:ma14="http://schemas.microsoft.com/office/mac/drawingml/2011/main" xmlns:a14="http://schemas.microsoft.com/office/drawing/2010/main" xmlns:m="http://schemas.openxmlformats.org/officeDocument/2006/math" xmlns="" val="1"/>
               </a:ext>
             </a:extLst>
           </p:spPr>
@@ -3372,7 +3372,7 @@
             </a:ln>
             <a:extLst>
               <a:ext uri="{C572A759-6A51-4108-AA02-DFA0A04FC94B}">
-                <ma14:wrappingTextBoxFlag xmlns="" xmlns:m="http://schemas.openxmlformats.org/officeDocument/2006/math" xmlns:a14="http://schemas.microsoft.com/office/drawing/2010/main" xmlns:ma14="http://schemas.microsoft.com/office/mac/drawingml/2011/main" val="1"/>
+                <ma14:wrappingTextBoxFlag xmlns:ma14="http://schemas.microsoft.com/office/mac/drawingml/2011/main" xmlns:a14="http://schemas.microsoft.com/office/drawing/2010/main" xmlns:m="http://schemas.openxmlformats.org/officeDocument/2006/math" xmlns="" val="1"/>
               </a:ext>
             </a:extLst>
           </p:spPr>
@@ -3427,7 +3427,7 @@
             </a:ln>
             <a:extLst>
               <a:ext uri="{C572A759-6A51-4108-AA02-DFA0A04FC94B}">
-                <ma14:wrappingTextBoxFlag xmlns="" xmlns:m="http://schemas.openxmlformats.org/officeDocument/2006/math" xmlns:a14="http://schemas.microsoft.com/office/drawing/2010/main" xmlns:ma14="http://schemas.microsoft.com/office/mac/drawingml/2011/main" val="1"/>
+                <ma14:wrappingTextBoxFlag xmlns:ma14="http://schemas.microsoft.com/office/mac/drawingml/2011/main" xmlns:a14="http://schemas.microsoft.com/office/drawing/2010/main" xmlns:m="http://schemas.openxmlformats.org/officeDocument/2006/math" xmlns="" val="1"/>
               </a:ext>
             </a:extLst>
           </p:spPr>
@@ -3544,7 +3544,7 @@
             </a:ln>
             <a:extLst>
               <a:ext uri="{C572A759-6A51-4108-AA02-DFA0A04FC94B}">
-                <ma14:wrappingTextBoxFlag xmlns="" xmlns:m="http://schemas.openxmlformats.org/officeDocument/2006/math" xmlns:a14="http://schemas.microsoft.com/office/drawing/2010/main" xmlns:ma14="http://schemas.microsoft.com/office/mac/drawingml/2011/main" val="1"/>
+                <ma14:wrappingTextBoxFlag xmlns:ma14="http://schemas.microsoft.com/office/mac/drawingml/2011/main" xmlns:a14="http://schemas.microsoft.com/office/drawing/2010/main" xmlns:m="http://schemas.openxmlformats.org/officeDocument/2006/math" xmlns="" val="1"/>
               </a:ext>
             </a:extLst>
           </p:spPr>
@@ -3629,7 +3629,7 @@
           </a:ln>
           <a:extLst>
             <a:ext uri="{C572A759-6A51-4108-AA02-DFA0A04FC94B}">
-              <ma14:wrappingTextBoxFlag xmlns="" xmlns:m="http://schemas.openxmlformats.org/officeDocument/2006/math" xmlns:a14="http://schemas.microsoft.com/office/drawing/2010/main" xmlns:ma14="http://schemas.microsoft.com/office/mac/drawingml/2011/main" val="1"/>
+              <ma14:wrappingTextBoxFlag xmlns:ma14="http://schemas.microsoft.com/office/mac/drawingml/2011/main" xmlns:a14="http://schemas.microsoft.com/office/drawing/2010/main" xmlns:m="http://schemas.openxmlformats.org/officeDocument/2006/math" xmlns="" val="1"/>
             </a:ext>
           </a:extLst>
         </p:spPr>
@@ -3698,7 +3698,7 @@
             </a:r>
             <a:r>
               <a:rPr lang="en-CA" sz="3600" dirty="0"/>
-              <a:t>Architecture Reference Model (OVERLAYS-ARM)</a:t>
+              <a:t>Architecture Reference Model (OVERLAYS ARM)</a:t>
             </a:r>
             <a:endParaRPr sz="3600" dirty="0"/>
           </a:p>
@@ -3830,7 +3830,7 @@
             </a:ln>
             <a:extLst>
               <a:ext uri="{C572A759-6A51-4108-AA02-DFA0A04FC94B}">
-                <ma14:wrappingTextBoxFlag xmlns="" xmlns:m="http://schemas.openxmlformats.org/officeDocument/2006/math" xmlns:a14="http://schemas.microsoft.com/office/drawing/2010/main" xmlns:ma14="http://schemas.microsoft.com/office/mac/drawingml/2011/main" val="1"/>
+                <ma14:wrappingTextBoxFlag xmlns:ma14="http://schemas.microsoft.com/office/mac/drawingml/2011/main" xmlns:a14="http://schemas.microsoft.com/office/drawing/2010/main" xmlns:m="http://schemas.openxmlformats.org/officeDocument/2006/math" xmlns="" val="1"/>
               </a:ext>
             </a:extLst>
           </p:spPr>
@@ -3928,7 +3928,7 @@
             </a:ln>
             <a:extLst>
               <a:ext uri="{C572A759-6A51-4108-AA02-DFA0A04FC94B}">
-                <ma14:wrappingTextBoxFlag xmlns="" xmlns:m="http://schemas.openxmlformats.org/officeDocument/2006/math" xmlns:a14="http://schemas.microsoft.com/office/drawing/2010/main" xmlns:ma14="http://schemas.microsoft.com/office/mac/drawingml/2011/main" val="1"/>
+                <ma14:wrappingTextBoxFlag xmlns:ma14="http://schemas.microsoft.com/office/mac/drawingml/2011/main" xmlns:a14="http://schemas.microsoft.com/office/drawing/2010/main" xmlns:m="http://schemas.openxmlformats.org/officeDocument/2006/math" xmlns="" val="1"/>
               </a:ext>
             </a:extLst>
           </p:spPr>
@@ -4113,7 +4113,7 @@
             </a:ln>
             <a:extLst>
               <a:ext uri="{C572A759-6A51-4108-AA02-DFA0A04FC94B}">
-                <ma14:wrappingTextBoxFlag xmlns="" xmlns:m="http://schemas.openxmlformats.org/officeDocument/2006/math" xmlns:a14="http://schemas.microsoft.com/office/drawing/2010/main" xmlns:ma14="http://schemas.microsoft.com/office/mac/drawingml/2011/main" val="1"/>
+                <ma14:wrappingTextBoxFlag xmlns:ma14="http://schemas.microsoft.com/office/mac/drawingml/2011/main" xmlns:a14="http://schemas.microsoft.com/office/drawing/2010/main" xmlns:m="http://schemas.openxmlformats.org/officeDocument/2006/math" xmlns="" val="1"/>
               </a:ext>
             </a:extLst>
           </p:spPr>
@@ -4226,7 +4226,7 @@
             </a:ln>
             <a:extLst>
               <a:ext uri="{C572A759-6A51-4108-AA02-DFA0A04FC94B}">
-                <ma14:wrappingTextBoxFlag xmlns="" xmlns:m="http://schemas.openxmlformats.org/officeDocument/2006/math" xmlns:a14="http://schemas.microsoft.com/office/drawing/2010/main" xmlns:ma14="http://schemas.microsoft.com/office/mac/drawingml/2011/main" val="1"/>
+                <ma14:wrappingTextBoxFlag xmlns:ma14="http://schemas.microsoft.com/office/mac/drawingml/2011/main" xmlns:a14="http://schemas.microsoft.com/office/drawing/2010/main" xmlns:m="http://schemas.openxmlformats.org/officeDocument/2006/math" xmlns="" val="1"/>
               </a:ext>
             </a:extLst>
           </p:spPr>
@@ -4389,7 +4389,7 @@
             </a:ln>
             <a:extLst>
               <a:ext uri="{C572A759-6A51-4108-AA02-DFA0A04FC94B}">
-                <ma14:wrappingTextBoxFlag xmlns="" xmlns:m="http://schemas.openxmlformats.org/officeDocument/2006/math" xmlns:a14="http://schemas.microsoft.com/office/drawing/2010/main" xmlns:ma14="http://schemas.microsoft.com/office/mac/drawingml/2011/main" val="1"/>
+                <ma14:wrappingTextBoxFlag xmlns:ma14="http://schemas.microsoft.com/office/mac/drawingml/2011/main" xmlns:a14="http://schemas.microsoft.com/office/drawing/2010/main" xmlns:m="http://schemas.openxmlformats.org/officeDocument/2006/math" xmlns="" val="1"/>
               </a:ext>
             </a:extLst>
           </p:spPr>
@@ -4490,7 +4490,7 @@
             </a:ln>
             <a:extLst>
               <a:ext uri="{C572A759-6A51-4108-AA02-DFA0A04FC94B}">
-                <ma14:wrappingTextBoxFlag xmlns="" xmlns:m="http://schemas.openxmlformats.org/officeDocument/2006/math" xmlns:a14="http://schemas.microsoft.com/office/drawing/2010/main" xmlns:ma14="http://schemas.microsoft.com/office/mac/drawingml/2011/main" val="1"/>
+                <ma14:wrappingTextBoxFlag xmlns:ma14="http://schemas.microsoft.com/office/mac/drawingml/2011/main" xmlns:a14="http://schemas.microsoft.com/office/drawing/2010/main" xmlns:m="http://schemas.openxmlformats.org/officeDocument/2006/math" xmlns="" val="1"/>
               </a:ext>
             </a:extLst>
           </p:spPr>
@@ -4665,7 +4665,7 @@
             </a:ln>
             <a:extLst>
               <a:ext uri="{C572A759-6A51-4108-AA02-DFA0A04FC94B}">
-                <ma14:wrappingTextBoxFlag xmlns="" xmlns:m="http://schemas.openxmlformats.org/officeDocument/2006/math" xmlns:a14="http://schemas.microsoft.com/office/drawing/2010/main" xmlns:ma14="http://schemas.microsoft.com/office/mac/drawingml/2011/main" val="1"/>
+                <ma14:wrappingTextBoxFlag xmlns:ma14="http://schemas.microsoft.com/office/mac/drawingml/2011/main" xmlns:a14="http://schemas.microsoft.com/office/drawing/2010/main" xmlns:m="http://schemas.openxmlformats.org/officeDocument/2006/math" xmlns="" val="1"/>
               </a:ext>
             </a:extLst>
           </p:spPr>
@@ -4773,7 +4773,7 @@
             </a:ln>
             <a:extLst>
               <a:ext uri="{C572A759-6A51-4108-AA02-DFA0A04FC94B}">
-                <ma14:wrappingTextBoxFlag xmlns="" xmlns:m="http://schemas.openxmlformats.org/officeDocument/2006/math" xmlns:a14="http://schemas.microsoft.com/office/drawing/2010/main" xmlns:ma14="http://schemas.microsoft.com/office/mac/drawingml/2011/main" val="1"/>
+                <ma14:wrappingTextBoxFlag xmlns:ma14="http://schemas.microsoft.com/office/mac/drawingml/2011/main" xmlns:a14="http://schemas.microsoft.com/office/drawing/2010/main" xmlns:m="http://schemas.openxmlformats.org/officeDocument/2006/math" xmlns="" val="1"/>
               </a:ext>
             </a:extLst>
           </p:spPr>
@@ -4848,7 +4848,7 @@
             </a:ln>
             <a:extLst>
               <a:ext uri="{C572A759-6A51-4108-AA02-DFA0A04FC94B}">
-                <ma14:wrappingTextBoxFlag xmlns="" xmlns:m="http://schemas.openxmlformats.org/officeDocument/2006/math" xmlns:a14="http://schemas.microsoft.com/office/drawing/2010/main" xmlns:ma14="http://schemas.microsoft.com/office/mac/drawingml/2011/main" val="1"/>
+                <ma14:wrappingTextBoxFlag xmlns:ma14="http://schemas.microsoft.com/office/mac/drawingml/2011/main" xmlns:a14="http://schemas.microsoft.com/office/drawing/2010/main" xmlns:m="http://schemas.openxmlformats.org/officeDocument/2006/math" xmlns="" val="1"/>
               </a:ext>
             </a:extLst>
           </p:spPr>
@@ -4958,7 +4958,7 @@
             </a:ln>
             <a:extLst>
               <a:ext uri="{C572A759-6A51-4108-AA02-DFA0A04FC94B}">
-                <ma14:wrappingTextBoxFlag xmlns="" xmlns:m="http://schemas.openxmlformats.org/officeDocument/2006/math" xmlns:a14="http://schemas.microsoft.com/office/drawing/2010/main" xmlns:ma14="http://schemas.microsoft.com/office/mac/drawingml/2011/main" val="1"/>
+                <ma14:wrappingTextBoxFlag xmlns:ma14="http://schemas.microsoft.com/office/mac/drawingml/2011/main" xmlns:a14="http://schemas.microsoft.com/office/drawing/2010/main" xmlns:m="http://schemas.openxmlformats.org/officeDocument/2006/math" xmlns="" val="1"/>
               </a:ext>
             </a:extLst>
           </p:spPr>
@@ -5164,7 +5164,7 @@
             </a:ln>
             <a:extLst>
               <a:ext uri="{C572A759-6A51-4108-AA02-DFA0A04FC94B}">
-                <ma14:wrappingTextBoxFlag xmlns="" xmlns:m="http://schemas.openxmlformats.org/officeDocument/2006/math" xmlns:a14="http://schemas.microsoft.com/office/drawing/2010/main" xmlns:ma14="http://schemas.microsoft.com/office/mac/drawingml/2011/main" val="1"/>
+                <ma14:wrappingTextBoxFlag xmlns:ma14="http://schemas.microsoft.com/office/mac/drawingml/2011/main" xmlns:a14="http://schemas.microsoft.com/office/drawing/2010/main" xmlns:m="http://schemas.openxmlformats.org/officeDocument/2006/math" xmlns="" val="1"/>
               </a:ext>
             </a:extLst>
           </p:spPr>
@@ -5280,7 +5280,7 @@
             </a:ln>
             <a:extLst>
               <a:ext uri="{C572A759-6A51-4108-AA02-DFA0A04FC94B}">
-                <ma14:wrappingTextBoxFlag xmlns="" xmlns:m="http://schemas.openxmlformats.org/officeDocument/2006/math" xmlns:a14="http://schemas.microsoft.com/office/drawing/2010/main" xmlns:ma14="http://schemas.microsoft.com/office/mac/drawingml/2011/main" val="1"/>
+                <ma14:wrappingTextBoxFlag xmlns:ma14="http://schemas.microsoft.com/office/mac/drawingml/2011/main" xmlns:a14="http://schemas.microsoft.com/office/drawing/2010/main" xmlns:m="http://schemas.openxmlformats.org/officeDocument/2006/math" xmlns="" val="1"/>
               </a:ext>
             </a:extLst>
           </p:spPr>
@@ -5460,7 +5460,7 @@
             </a:ln>
             <a:extLst>
               <a:ext uri="{C572A759-6A51-4108-AA02-DFA0A04FC94B}">
-                <ma14:wrappingTextBoxFlag xmlns="" xmlns:m="http://schemas.openxmlformats.org/officeDocument/2006/math" xmlns:a14="http://schemas.microsoft.com/office/drawing/2010/main" xmlns:ma14="http://schemas.microsoft.com/office/mac/drawingml/2011/main" val="1"/>
+                <ma14:wrappingTextBoxFlag xmlns:ma14="http://schemas.microsoft.com/office/mac/drawingml/2011/main" xmlns:a14="http://schemas.microsoft.com/office/drawing/2010/main" xmlns:m="http://schemas.openxmlformats.org/officeDocument/2006/math" xmlns="" val="1"/>
               </a:ext>
             </a:extLst>
           </p:spPr>
@@ -5573,7 +5573,7 @@
             </a:ln>
             <a:extLst>
               <a:ext uri="{C572A759-6A51-4108-AA02-DFA0A04FC94B}">
-                <ma14:wrappingTextBoxFlag xmlns="" xmlns:m="http://schemas.openxmlformats.org/officeDocument/2006/math" xmlns:a14="http://schemas.microsoft.com/office/drawing/2010/main" xmlns:ma14="http://schemas.microsoft.com/office/mac/drawingml/2011/main" val="1"/>
+                <ma14:wrappingTextBoxFlag xmlns:ma14="http://schemas.microsoft.com/office/mac/drawingml/2011/main" xmlns:a14="http://schemas.microsoft.com/office/drawing/2010/main" xmlns:m="http://schemas.openxmlformats.org/officeDocument/2006/math" xmlns="" val="1"/>
               </a:ext>
             </a:extLst>
           </p:spPr>
@@ -5747,7 +5747,7 @@
             </a:ln>
             <a:extLst>
               <a:ext uri="{C572A759-6A51-4108-AA02-DFA0A04FC94B}">
-                <ma14:wrappingTextBoxFlag xmlns="" xmlns:m="http://schemas.openxmlformats.org/officeDocument/2006/math" xmlns:a14="http://schemas.microsoft.com/office/drawing/2010/main" xmlns:ma14="http://schemas.microsoft.com/office/mac/drawingml/2011/main" val="1"/>
+                <ma14:wrappingTextBoxFlag xmlns:ma14="http://schemas.microsoft.com/office/mac/drawingml/2011/main" xmlns:a14="http://schemas.microsoft.com/office/drawing/2010/main" xmlns:m="http://schemas.openxmlformats.org/officeDocument/2006/math" xmlns="" val="1"/>
               </a:ext>
             </a:extLst>
           </p:spPr>
@@ -5851,7 +5851,7 @@
             </a:ln>
             <a:extLst>
               <a:ext uri="{C572A759-6A51-4108-AA02-DFA0A04FC94B}">
-                <ma14:wrappingTextBoxFlag xmlns="" xmlns:m="http://schemas.openxmlformats.org/officeDocument/2006/math" xmlns:a14="http://schemas.microsoft.com/office/drawing/2010/main" xmlns:ma14="http://schemas.microsoft.com/office/mac/drawingml/2011/main" val="1"/>
+                <ma14:wrappingTextBoxFlag xmlns:ma14="http://schemas.microsoft.com/office/mac/drawingml/2011/main" xmlns:a14="http://schemas.microsoft.com/office/drawing/2010/main" xmlns:m="http://schemas.openxmlformats.org/officeDocument/2006/math" xmlns="" val="1"/>
               </a:ext>
             </a:extLst>
           </p:spPr>
@@ -6036,7 +6036,7 @@
             </a:ln>
             <a:extLst>
               <a:ext uri="{C572A759-6A51-4108-AA02-DFA0A04FC94B}">
-                <ma14:wrappingTextBoxFlag xmlns="" xmlns:m="http://schemas.openxmlformats.org/officeDocument/2006/math" xmlns:a14="http://schemas.microsoft.com/office/drawing/2010/main" xmlns:ma14="http://schemas.microsoft.com/office/mac/drawingml/2011/main" val="1"/>
+                <ma14:wrappingTextBoxFlag xmlns:ma14="http://schemas.microsoft.com/office/mac/drawingml/2011/main" xmlns:a14="http://schemas.microsoft.com/office/drawing/2010/main" xmlns:m="http://schemas.openxmlformats.org/officeDocument/2006/math" xmlns="" val="1"/>
               </a:ext>
             </a:extLst>
           </p:spPr>
@@ -6140,7 +6140,7 @@
             </a:ln>
             <a:extLst>
               <a:ext uri="{C572A759-6A51-4108-AA02-DFA0A04FC94B}">
-                <ma14:wrappingTextBoxFlag xmlns="" xmlns:m="http://schemas.openxmlformats.org/officeDocument/2006/math" xmlns:a14="http://schemas.microsoft.com/office/drawing/2010/main" xmlns:ma14="http://schemas.microsoft.com/office/mac/drawingml/2011/main" val="1"/>
+                <ma14:wrappingTextBoxFlag xmlns:ma14="http://schemas.microsoft.com/office/mac/drawingml/2011/main" xmlns:a14="http://schemas.microsoft.com/office/drawing/2010/main" xmlns:m="http://schemas.openxmlformats.org/officeDocument/2006/math" xmlns="" val="1"/>
               </a:ext>
             </a:extLst>
           </p:spPr>
@@ -6243,7 +6243,7 @@
           </a:ln>
           <a:extLst>
             <a:ext uri="{C572A759-6A51-4108-AA02-DFA0A04FC94B}">
-              <ma14:wrappingTextBoxFlag xmlns="" xmlns:m="http://schemas.openxmlformats.org/officeDocument/2006/math" xmlns:a14="http://schemas.microsoft.com/office/drawing/2010/main" xmlns:ma14="http://schemas.microsoft.com/office/mac/drawingml/2011/main" val="1"/>
+              <ma14:wrappingTextBoxFlag xmlns:ma14="http://schemas.microsoft.com/office/mac/drawingml/2011/main" xmlns:a14="http://schemas.microsoft.com/office/drawing/2010/main" xmlns:m="http://schemas.openxmlformats.org/officeDocument/2006/math" xmlns="" val="1"/>
             </a:ext>
           </a:extLst>
         </p:spPr>

</xml_diff>

<commit_message>
Added Schema Family to Appendix F
</commit_message>
<xml_diff>
--- a/src/HBB-Overlays-ARM v0.2.pptx
+++ b/src/HBB-Overlays-ARM v0.2.pptx
@@ -5,10 +5,12 @@
     <p:sldMasterId id="2147483648" r:id="rId1"/>
   </p:sldMasterIdLst>
   <p:notesMasterIdLst>
-    <p:notesMasterId r:id="rId3"/>
+    <p:notesMasterId r:id="rId5"/>
   </p:notesMasterIdLst>
   <p:sldIdLst>
     <p:sldId id="262" r:id="rId2"/>
+    <p:sldId id="263" r:id="rId3"/>
+    <p:sldId id="264" r:id="rId4"/>
   </p:sldIdLst>
   <p:sldSz cx="13004800" cy="9753600"/>
   <p:notesSz cx="6858000" cy="9144000"/>
@@ -363,7 +365,7 @@
           <a:bodyPr/>
           <a:lstStyle/>
           <a:p>
-            <a:endParaRPr/>
+            <a:endParaRPr dirty="0"/>
           </a:p>
         </p:txBody>
       </p:sp>
@@ -543,7 +545,7 @@
           </a:bodyPr>
           <a:lstStyle/>
           <a:p>
-            <a:endParaRPr/>
+            <a:endParaRPr dirty="0"/>
           </a:p>
         </p:txBody>
       </p:sp>
@@ -692,7 +694,7 @@
             <a:fld id="{86CB4B4D-7CA3-9044-876B-883B54F8677D}" type="slidenum">
               <a:t>‹#›</a:t>
             </a:fld>
-            <a:endParaRPr/>
+            <a:endParaRPr dirty="0"/>
           </a:p>
         </p:txBody>
       </p:sp>
@@ -747,7 +749,7 @@
           </a:bodyPr>
           <a:lstStyle/>
           <a:p>
-            <a:endParaRPr/>
+            <a:endParaRPr dirty="0"/>
           </a:p>
         </p:txBody>
       </p:sp>
@@ -900,7 +902,7 @@
             <a:fld id="{86CB4B4D-7CA3-9044-876B-883B54F8677D}" type="slidenum">
               <a:t>‹#›</a:t>
             </a:fld>
-            <a:endParaRPr/>
+            <a:endParaRPr dirty="0"/>
           </a:p>
         </p:txBody>
       </p:sp>
@@ -1026,7 +1028,7 @@
             <a:fld id="{86CB4B4D-7CA3-9044-876B-883B54F8677D}" type="slidenum">
               <a:t>‹#›</a:t>
             </a:fld>
-            <a:endParaRPr/>
+            <a:endParaRPr dirty="0"/>
           </a:p>
         </p:txBody>
       </p:sp>
@@ -1081,7 +1083,7 @@
           </a:bodyPr>
           <a:lstStyle/>
           <a:p>
-            <a:endParaRPr/>
+            <a:endParaRPr dirty="0"/>
           </a:p>
         </p:txBody>
       </p:sp>
@@ -1229,7 +1231,7 @@
             <a:fld id="{86CB4B4D-7CA3-9044-876B-883B54F8677D}" type="slidenum">
               <a:t>‹#›</a:t>
             </a:fld>
-            <a:endParaRPr/>
+            <a:endParaRPr dirty="0"/>
           </a:p>
         </p:txBody>
       </p:sp>
@@ -1334,7 +1336,7 @@
             <a:fld id="{86CB4B4D-7CA3-9044-876B-883B54F8677D}" type="slidenum">
               <a:t>‹#›</a:t>
             </a:fld>
-            <a:endParaRPr/>
+            <a:endParaRPr dirty="0"/>
           </a:p>
         </p:txBody>
       </p:sp>
@@ -1389,7 +1391,7 @@
           </a:bodyPr>
           <a:lstStyle/>
           <a:p>
-            <a:endParaRPr/>
+            <a:endParaRPr dirty="0"/>
           </a:p>
         </p:txBody>
       </p:sp>
@@ -1418,7 +1420,7 @@
           </a:bodyPr>
           <a:lstStyle/>
           <a:p>
-            <a:endParaRPr/>
+            <a:endParaRPr dirty="0"/>
           </a:p>
         </p:txBody>
       </p:sp>
@@ -1447,7 +1449,7 @@
           </a:bodyPr>
           <a:lstStyle/>
           <a:p>
-            <a:endParaRPr/>
+            <a:endParaRPr dirty="0"/>
           </a:p>
         </p:txBody>
       </p:sp>
@@ -1473,7 +1475,7 @@
             <a:fld id="{86CB4B4D-7CA3-9044-876B-883B54F8677D}" type="slidenum">
               <a:t>‹#›</a:t>
             </a:fld>
-            <a:endParaRPr/>
+            <a:endParaRPr dirty="0"/>
           </a:p>
         </p:txBody>
       </p:sp>
@@ -1638,7 +1640,7 @@
             <a:fld id="{86CB4B4D-7CA3-9044-876B-883B54F8677D}" type="slidenum">
               <a:t>‹#›</a:t>
             </a:fld>
-            <a:endParaRPr/>
+            <a:endParaRPr dirty="0"/>
           </a:p>
         </p:txBody>
       </p:sp>
@@ -1693,7 +1695,7 @@
           </a:bodyPr>
           <a:lstStyle/>
           <a:p>
-            <a:endParaRPr/>
+            <a:endParaRPr dirty="0"/>
           </a:p>
         </p:txBody>
       </p:sp>
@@ -1719,7 +1721,7 @@
             <a:fld id="{86CB4B4D-7CA3-9044-876B-883B54F8677D}" type="slidenum">
               <a:t>‹#›</a:t>
             </a:fld>
-            <a:endParaRPr/>
+            <a:endParaRPr dirty="0"/>
           </a:p>
         </p:txBody>
       </p:sp>
@@ -1903,7 +1905,7 @@
             <a:fld id="{86CB4B4D-7CA3-9044-876B-883B54F8677D}" type="slidenum">
               <a:t>‹#›</a:t>
             </a:fld>
-            <a:endParaRPr/>
+            <a:endParaRPr dirty="0"/>
           </a:p>
         </p:txBody>
       </p:sp>
@@ -1964,7 +1966,7 @@
           </a:ln>
           <a:extLst>
             <a:ext uri="{C572A759-6A51-4108-AA02-DFA0A04FC94B}">
-              <ma14:wrappingTextBoxFlag xmlns="" xmlns:m="http://schemas.openxmlformats.org/officeDocument/2006/math" xmlns:a14="http://schemas.microsoft.com/office/drawing/2010/main" xmlns:ma14="http://schemas.microsoft.com/office/mac/drawingml/2011/main" val="1"/>
+              <ma14:wrappingTextBoxFlag xmlns:ma14="http://schemas.microsoft.com/office/mac/drawingml/2011/main" xmlns:a14="http://schemas.microsoft.com/office/drawing/2010/main" xmlns:m="http://schemas.openxmlformats.org/officeDocument/2006/math" xmlns="" val="1"/>
             </a:ext>
           </a:extLst>
         </p:spPr>
@@ -2003,7 +2005,7 @@
           </a:ln>
           <a:extLst>
             <a:ext uri="{C572A759-6A51-4108-AA02-DFA0A04FC94B}">
-              <ma14:wrappingTextBoxFlag xmlns="" xmlns:m="http://schemas.openxmlformats.org/officeDocument/2006/math" xmlns:a14="http://schemas.microsoft.com/office/drawing/2010/main" xmlns:ma14="http://schemas.microsoft.com/office/mac/drawingml/2011/main" val="1"/>
+              <ma14:wrappingTextBoxFlag xmlns:ma14="http://schemas.microsoft.com/office/mac/drawingml/2011/main" xmlns:a14="http://schemas.microsoft.com/office/drawing/2010/main" xmlns:m="http://schemas.openxmlformats.org/officeDocument/2006/math" xmlns="" val="1"/>
             </a:ext>
           </a:extLst>
         </p:spPr>
@@ -2083,7 +2085,7 @@
             <a:fld id="{86CB4B4D-7CA3-9044-876B-883B54F8677D}" type="slidenum">
               <a:t>‹#›</a:t>
             </a:fld>
-            <a:endParaRPr/>
+            <a:endParaRPr dirty="0"/>
           </a:p>
         </p:txBody>
       </p:sp>
@@ -3021,7 +3023,7 @@
                   <a:sym typeface="Helvetica Neue Medium"/>
                 </a:defRPr>
               </a:pPr>
-              <a:endParaRPr/>
+              <a:endParaRPr dirty="0"/>
             </a:p>
           </p:txBody>
         </p:sp>
@@ -3051,7 +3053,7 @@
             </a:ln>
             <a:extLst>
               <a:ext uri="{C572A759-6A51-4108-AA02-DFA0A04FC94B}">
-                <ma14:wrappingTextBoxFlag xmlns="" xmlns:m="http://schemas.openxmlformats.org/officeDocument/2006/math" xmlns:a14="http://schemas.microsoft.com/office/drawing/2010/main" xmlns:ma14="http://schemas.microsoft.com/office/mac/drawingml/2011/main" val="1"/>
+                <ma14:wrappingTextBoxFlag xmlns:ma14="http://schemas.microsoft.com/office/mac/drawingml/2011/main" xmlns:a14="http://schemas.microsoft.com/office/drawing/2010/main" xmlns:m="http://schemas.openxmlformats.org/officeDocument/2006/math" xmlns="" val="1"/>
               </a:ext>
             </a:extLst>
           </p:spPr>
@@ -3134,7 +3136,7 @@
                   <a:sym typeface="Helvetica Neue Medium"/>
                 </a:defRPr>
               </a:pPr>
-              <a:endParaRPr/>
+              <a:endParaRPr dirty="0"/>
             </a:p>
           </p:txBody>
         </p:sp>
@@ -3164,7 +3166,7 @@
             </a:ln>
             <a:extLst>
               <a:ext uri="{C572A759-6A51-4108-AA02-DFA0A04FC94B}">
-                <ma14:wrappingTextBoxFlag xmlns="" xmlns:m="http://schemas.openxmlformats.org/officeDocument/2006/math" xmlns:a14="http://schemas.microsoft.com/office/drawing/2010/main" xmlns:ma14="http://schemas.microsoft.com/office/mac/drawingml/2011/main" val="1"/>
+                <ma14:wrappingTextBoxFlag xmlns:ma14="http://schemas.microsoft.com/office/mac/drawingml/2011/main" xmlns:a14="http://schemas.microsoft.com/office/drawing/2010/main" xmlns:m="http://schemas.openxmlformats.org/officeDocument/2006/math" xmlns="" val="1"/>
               </a:ext>
             </a:extLst>
           </p:spPr>
@@ -3300,7 +3302,7 @@
                   <a:sym typeface="Helvetica Neue Medium"/>
                 </a:defRPr>
               </a:pPr>
-              <a:endParaRPr/>
+              <a:endParaRPr dirty="0"/>
             </a:p>
           </p:txBody>
         </p:sp>
@@ -3343,7 +3345,7 @@
                   <a:sym typeface="Helvetica Neue Medium"/>
                 </a:defRPr>
               </a:pPr>
-              <a:endParaRPr/>
+              <a:endParaRPr dirty="0"/>
             </a:p>
           </p:txBody>
         </p:sp>
@@ -3372,7 +3374,7 @@
             </a:ln>
             <a:extLst>
               <a:ext uri="{C572A759-6A51-4108-AA02-DFA0A04FC94B}">
-                <ma14:wrappingTextBoxFlag xmlns="" xmlns:m="http://schemas.openxmlformats.org/officeDocument/2006/math" xmlns:a14="http://schemas.microsoft.com/office/drawing/2010/main" xmlns:ma14="http://schemas.microsoft.com/office/mac/drawingml/2011/main" val="1"/>
+                <ma14:wrappingTextBoxFlag xmlns:ma14="http://schemas.microsoft.com/office/mac/drawingml/2011/main" xmlns:a14="http://schemas.microsoft.com/office/drawing/2010/main" xmlns:m="http://schemas.openxmlformats.org/officeDocument/2006/math" xmlns="" val="1"/>
               </a:ext>
             </a:extLst>
           </p:spPr>
@@ -3427,7 +3429,7 @@
             </a:ln>
             <a:extLst>
               <a:ext uri="{C572A759-6A51-4108-AA02-DFA0A04FC94B}">
-                <ma14:wrappingTextBoxFlag xmlns="" xmlns:m="http://schemas.openxmlformats.org/officeDocument/2006/math" xmlns:a14="http://schemas.microsoft.com/office/drawing/2010/main" xmlns:ma14="http://schemas.microsoft.com/office/mac/drawingml/2011/main" val="1"/>
+                <ma14:wrappingTextBoxFlag xmlns:ma14="http://schemas.microsoft.com/office/mac/drawingml/2011/main" xmlns:a14="http://schemas.microsoft.com/office/drawing/2010/main" xmlns:m="http://schemas.openxmlformats.org/officeDocument/2006/math" xmlns="" val="1"/>
               </a:ext>
             </a:extLst>
           </p:spPr>
@@ -3521,7 +3523,7 @@
             <a:bodyPr lIns="45718" tIns="45718" rIns="45718" bIns="45718"/>
             <a:lstStyle/>
             <a:p>
-              <a:endParaRPr/>
+              <a:endParaRPr dirty="0"/>
             </a:p>
           </p:txBody>
         </p:sp>
@@ -3544,7 +3546,7 @@
             </a:ln>
             <a:extLst>
               <a:ext uri="{C572A759-6A51-4108-AA02-DFA0A04FC94B}">
-                <ma14:wrappingTextBoxFlag xmlns="" xmlns:m="http://schemas.openxmlformats.org/officeDocument/2006/math" xmlns:a14="http://schemas.microsoft.com/office/drawing/2010/main" xmlns:ma14="http://schemas.microsoft.com/office/mac/drawingml/2011/main" val="1"/>
+                <ma14:wrappingTextBoxFlag xmlns:ma14="http://schemas.microsoft.com/office/mac/drawingml/2011/main" xmlns:a14="http://schemas.microsoft.com/office/drawing/2010/main" xmlns:m="http://schemas.openxmlformats.org/officeDocument/2006/math" xmlns="" val="1"/>
               </a:ext>
             </a:extLst>
           </p:spPr>
@@ -3629,7 +3631,7 @@
           </a:ln>
           <a:extLst>
             <a:ext uri="{C572A759-6A51-4108-AA02-DFA0A04FC94B}">
-              <ma14:wrappingTextBoxFlag xmlns="" xmlns:m="http://schemas.openxmlformats.org/officeDocument/2006/math" xmlns:a14="http://schemas.microsoft.com/office/drawing/2010/main" xmlns:ma14="http://schemas.microsoft.com/office/mac/drawingml/2011/main" val="1"/>
+              <ma14:wrappingTextBoxFlag xmlns:ma14="http://schemas.microsoft.com/office/mac/drawingml/2011/main" xmlns:a14="http://schemas.microsoft.com/office/drawing/2010/main" xmlns:m="http://schemas.openxmlformats.org/officeDocument/2006/math" xmlns="" val="1"/>
             </a:ext>
           </a:extLst>
         </p:spPr>
@@ -3807,7 +3809,7 @@
                   <a:sym typeface="Helvetica Neue Medium"/>
                 </a:defRPr>
               </a:pPr>
-              <a:endParaRPr/>
+              <a:endParaRPr dirty="0"/>
             </a:p>
           </p:txBody>
         </p:sp>
@@ -3830,7 +3832,7 @@
             </a:ln>
             <a:extLst>
               <a:ext uri="{C572A759-6A51-4108-AA02-DFA0A04FC94B}">
-                <ma14:wrappingTextBoxFlag xmlns="" xmlns:m="http://schemas.openxmlformats.org/officeDocument/2006/math" xmlns:a14="http://schemas.microsoft.com/office/drawing/2010/main" xmlns:ma14="http://schemas.microsoft.com/office/mac/drawingml/2011/main" val="1"/>
+                <ma14:wrappingTextBoxFlag xmlns:ma14="http://schemas.microsoft.com/office/mac/drawingml/2011/main" xmlns:a14="http://schemas.microsoft.com/office/drawing/2010/main" xmlns:m="http://schemas.openxmlformats.org/officeDocument/2006/math" xmlns="" val="1"/>
               </a:ext>
             </a:extLst>
           </p:spPr>
@@ -3899,7 +3901,7 @@
                   <a:sym typeface="Helvetica Neue Medium"/>
                 </a:defRPr>
               </a:pPr>
-              <a:endParaRPr/>
+              <a:endParaRPr dirty="0"/>
             </a:p>
           </p:txBody>
         </p:sp>
@@ -3928,7 +3930,7 @@
             </a:ln>
             <a:extLst>
               <a:ext uri="{C572A759-6A51-4108-AA02-DFA0A04FC94B}">
-                <ma14:wrappingTextBoxFlag xmlns="" xmlns:m="http://schemas.openxmlformats.org/officeDocument/2006/math" xmlns:a14="http://schemas.microsoft.com/office/drawing/2010/main" xmlns:ma14="http://schemas.microsoft.com/office/mac/drawingml/2011/main" val="1"/>
+                <ma14:wrappingTextBoxFlag xmlns:ma14="http://schemas.microsoft.com/office/mac/drawingml/2011/main" xmlns:a14="http://schemas.microsoft.com/office/drawing/2010/main" xmlns:m="http://schemas.openxmlformats.org/officeDocument/2006/math" xmlns="" val="1"/>
               </a:ext>
             </a:extLst>
           </p:spPr>
@@ -4083,7 +4085,7 @@
                   <a:sym typeface="Helvetica Neue Medium"/>
                 </a:defRPr>
               </a:pPr>
-              <a:endParaRPr/>
+              <a:endParaRPr dirty="0"/>
             </a:p>
           </p:txBody>
         </p:sp>
@@ -4113,7 +4115,7 @@
             </a:ln>
             <a:extLst>
               <a:ext uri="{C572A759-6A51-4108-AA02-DFA0A04FC94B}">
-                <ma14:wrappingTextBoxFlag xmlns="" xmlns:m="http://schemas.openxmlformats.org/officeDocument/2006/math" xmlns:a14="http://schemas.microsoft.com/office/drawing/2010/main" xmlns:ma14="http://schemas.microsoft.com/office/mac/drawingml/2011/main" val="1"/>
+                <ma14:wrappingTextBoxFlag xmlns:ma14="http://schemas.microsoft.com/office/mac/drawingml/2011/main" xmlns:a14="http://schemas.microsoft.com/office/drawing/2010/main" xmlns:m="http://schemas.openxmlformats.org/officeDocument/2006/math" xmlns="" val="1"/>
               </a:ext>
             </a:extLst>
           </p:spPr>
@@ -4196,7 +4198,7 @@
                   <a:sym typeface="Helvetica Neue Medium"/>
                 </a:defRPr>
               </a:pPr>
-              <a:endParaRPr/>
+              <a:endParaRPr dirty="0"/>
             </a:p>
           </p:txBody>
         </p:sp>
@@ -4226,7 +4228,7 @@
             </a:ln>
             <a:extLst>
               <a:ext uri="{C572A759-6A51-4108-AA02-DFA0A04FC94B}">
-                <ma14:wrappingTextBoxFlag xmlns="" xmlns:m="http://schemas.openxmlformats.org/officeDocument/2006/math" xmlns:a14="http://schemas.microsoft.com/office/drawing/2010/main" xmlns:ma14="http://schemas.microsoft.com/office/mac/drawingml/2011/main" val="1"/>
+                <ma14:wrappingTextBoxFlag xmlns:ma14="http://schemas.microsoft.com/office/mac/drawingml/2011/main" xmlns:a14="http://schemas.microsoft.com/office/drawing/2010/main" xmlns:m="http://schemas.openxmlformats.org/officeDocument/2006/math" xmlns="" val="1"/>
               </a:ext>
             </a:extLst>
           </p:spPr>
@@ -4365,7 +4367,7 @@
                   <a:sym typeface="Helvetica Neue Medium"/>
                 </a:defRPr>
               </a:pPr>
-              <a:endParaRPr/>
+              <a:endParaRPr dirty="0"/>
             </a:p>
           </p:txBody>
         </p:sp>
@@ -4389,7 +4391,7 @@
             </a:ln>
             <a:extLst>
               <a:ext uri="{C572A759-6A51-4108-AA02-DFA0A04FC94B}">
-                <ma14:wrappingTextBoxFlag xmlns="" xmlns:m="http://schemas.openxmlformats.org/officeDocument/2006/math" xmlns:a14="http://schemas.microsoft.com/office/drawing/2010/main" xmlns:ma14="http://schemas.microsoft.com/office/mac/drawingml/2011/main" val="1"/>
+                <ma14:wrappingTextBoxFlag xmlns:ma14="http://schemas.microsoft.com/office/mac/drawingml/2011/main" xmlns:a14="http://schemas.microsoft.com/office/drawing/2010/main" xmlns:m="http://schemas.openxmlformats.org/officeDocument/2006/math" xmlns="" val="1"/>
               </a:ext>
             </a:extLst>
           </p:spPr>
@@ -4466,7 +4468,7 @@
                   <a:sym typeface="Helvetica Neue Medium"/>
                 </a:defRPr>
               </a:pPr>
-              <a:endParaRPr/>
+              <a:endParaRPr dirty="0"/>
             </a:p>
           </p:txBody>
         </p:sp>
@@ -4490,7 +4492,7 @@
             </a:ln>
             <a:extLst>
               <a:ext uri="{C572A759-6A51-4108-AA02-DFA0A04FC94B}">
-                <ma14:wrappingTextBoxFlag xmlns="" xmlns:m="http://schemas.openxmlformats.org/officeDocument/2006/math" xmlns:a14="http://schemas.microsoft.com/office/drawing/2010/main" xmlns:ma14="http://schemas.microsoft.com/office/mac/drawingml/2011/main" val="1"/>
+                <ma14:wrappingTextBoxFlag xmlns:ma14="http://schemas.microsoft.com/office/mac/drawingml/2011/main" xmlns:a14="http://schemas.microsoft.com/office/drawing/2010/main" xmlns:m="http://schemas.openxmlformats.org/officeDocument/2006/math" xmlns="" val="1"/>
               </a:ext>
             </a:extLst>
           </p:spPr>
@@ -4635,7 +4637,7 @@
                   <a:sym typeface="Helvetica Neue Medium"/>
                 </a:defRPr>
               </a:pPr>
-              <a:endParaRPr/>
+              <a:endParaRPr dirty="0"/>
             </a:p>
           </p:txBody>
         </p:sp>
@@ -4665,7 +4667,7 @@
             </a:ln>
             <a:extLst>
               <a:ext uri="{C572A759-6A51-4108-AA02-DFA0A04FC94B}">
-                <ma14:wrappingTextBoxFlag xmlns="" xmlns:m="http://schemas.openxmlformats.org/officeDocument/2006/math" xmlns:a14="http://schemas.microsoft.com/office/drawing/2010/main" xmlns:ma14="http://schemas.microsoft.com/office/mac/drawingml/2011/main" val="1"/>
+                <ma14:wrappingTextBoxFlag xmlns:ma14="http://schemas.microsoft.com/office/mac/drawingml/2011/main" xmlns:a14="http://schemas.microsoft.com/office/drawing/2010/main" xmlns:m="http://schemas.openxmlformats.org/officeDocument/2006/math" xmlns="" val="1"/>
               </a:ext>
             </a:extLst>
           </p:spPr>
@@ -4743,7 +4745,7 @@
                   <a:sym typeface="Helvetica Neue Medium"/>
                 </a:defRPr>
               </a:pPr>
-              <a:endParaRPr/>
+              <a:endParaRPr dirty="0"/>
             </a:p>
           </p:txBody>
         </p:sp>
@@ -4773,7 +4775,7 @@
             </a:ln>
             <a:extLst>
               <a:ext uri="{C572A759-6A51-4108-AA02-DFA0A04FC94B}">
-                <ma14:wrappingTextBoxFlag xmlns="" xmlns:m="http://schemas.openxmlformats.org/officeDocument/2006/math" xmlns:a14="http://schemas.microsoft.com/office/drawing/2010/main" xmlns:ma14="http://schemas.microsoft.com/office/mac/drawingml/2011/main" val="1"/>
+                <ma14:wrappingTextBoxFlag xmlns:ma14="http://schemas.microsoft.com/office/mac/drawingml/2011/main" xmlns:a14="http://schemas.microsoft.com/office/drawing/2010/main" xmlns:m="http://schemas.openxmlformats.org/officeDocument/2006/math" xmlns="" val="1"/>
               </a:ext>
             </a:extLst>
           </p:spPr>
@@ -4848,7 +4850,7 @@
             </a:ln>
             <a:extLst>
               <a:ext uri="{C572A759-6A51-4108-AA02-DFA0A04FC94B}">
-                <ma14:wrappingTextBoxFlag xmlns="" xmlns:m="http://schemas.openxmlformats.org/officeDocument/2006/math" xmlns:a14="http://schemas.microsoft.com/office/drawing/2010/main" xmlns:ma14="http://schemas.microsoft.com/office/mac/drawingml/2011/main" val="1"/>
+                <ma14:wrappingTextBoxFlag xmlns:ma14="http://schemas.microsoft.com/office/mac/drawingml/2011/main" xmlns:a14="http://schemas.microsoft.com/office/drawing/2010/main" xmlns:m="http://schemas.openxmlformats.org/officeDocument/2006/math" xmlns="" val="1"/>
               </a:ext>
             </a:extLst>
           </p:spPr>
@@ -4908,7 +4910,7 @@
             <a:bodyPr lIns="45718" tIns="45718" rIns="45718" bIns="45718"/>
             <a:lstStyle/>
             <a:p>
-              <a:endParaRPr/>
+              <a:endParaRPr dirty="0"/>
             </a:p>
           </p:txBody>
         </p:sp>
@@ -4958,7 +4960,7 @@
             </a:ln>
             <a:extLst>
               <a:ext uri="{C572A759-6A51-4108-AA02-DFA0A04FC94B}">
-                <ma14:wrappingTextBoxFlag xmlns="" xmlns:m="http://schemas.openxmlformats.org/officeDocument/2006/math" xmlns:a14="http://schemas.microsoft.com/office/drawing/2010/main" xmlns:ma14="http://schemas.microsoft.com/office/mac/drawingml/2011/main" val="1"/>
+                <ma14:wrappingTextBoxFlag xmlns:ma14="http://schemas.microsoft.com/office/mac/drawingml/2011/main" xmlns:a14="http://schemas.microsoft.com/office/drawing/2010/main" xmlns:m="http://schemas.openxmlformats.org/officeDocument/2006/math" xmlns="" val="1"/>
               </a:ext>
             </a:extLst>
           </p:spPr>
@@ -5018,7 +5020,7 @@
             <a:bodyPr lIns="45718" tIns="45718" rIns="45718" bIns="45718"/>
             <a:lstStyle/>
             <a:p>
-              <a:endParaRPr/>
+              <a:endParaRPr dirty="0"/>
             </a:p>
           </p:txBody>
         </p:sp>
@@ -5131,7 +5133,7 @@
                   <a:sym typeface="Helvetica Neue Medium"/>
                 </a:defRPr>
               </a:pPr>
-              <a:endParaRPr>
+              <a:endParaRPr dirty="0">
                 <a:solidFill>
                   <a:srgbClr val="BAF0FF"/>
                 </a:solidFill>
@@ -5164,7 +5166,7 @@
             </a:ln>
             <a:extLst>
               <a:ext uri="{C572A759-6A51-4108-AA02-DFA0A04FC94B}">
-                <ma14:wrappingTextBoxFlag xmlns="" xmlns:m="http://schemas.openxmlformats.org/officeDocument/2006/math" xmlns:a14="http://schemas.microsoft.com/office/drawing/2010/main" xmlns:ma14="http://schemas.microsoft.com/office/mac/drawingml/2011/main" val="1"/>
+                <ma14:wrappingTextBoxFlag xmlns:ma14="http://schemas.microsoft.com/office/mac/drawingml/2011/main" xmlns:a14="http://schemas.microsoft.com/office/drawing/2010/main" xmlns:m="http://schemas.openxmlformats.org/officeDocument/2006/math" xmlns="" val="1"/>
               </a:ext>
             </a:extLst>
           </p:spPr>
@@ -5247,7 +5249,7 @@
                   <a:sym typeface="Helvetica Neue Medium"/>
                 </a:defRPr>
               </a:pPr>
-              <a:endParaRPr>
+              <a:endParaRPr dirty="0">
                 <a:solidFill>
                   <a:srgbClr val="BAF0FF"/>
                 </a:solidFill>
@@ -5280,7 +5282,7 @@
             </a:ln>
             <a:extLst>
               <a:ext uri="{C572A759-6A51-4108-AA02-DFA0A04FC94B}">
-                <ma14:wrappingTextBoxFlag xmlns="" xmlns:m="http://schemas.openxmlformats.org/officeDocument/2006/math" xmlns:a14="http://schemas.microsoft.com/office/drawing/2010/main" xmlns:ma14="http://schemas.microsoft.com/office/mac/drawingml/2011/main" val="1"/>
+                <ma14:wrappingTextBoxFlag xmlns:ma14="http://schemas.microsoft.com/office/mac/drawingml/2011/main" xmlns:a14="http://schemas.microsoft.com/office/drawing/2010/main" xmlns:m="http://schemas.openxmlformats.org/officeDocument/2006/math" xmlns="" val="1"/>
               </a:ext>
             </a:extLst>
           </p:spPr>
@@ -5430,7 +5432,7 @@
                   <a:sym typeface="Helvetica Neue Medium"/>
                 </a:defRPr>
               </a:pPr>
-              <a:endParaRPr/>
+              <a:endParaRPr dirty="0"/>
             </a:p>
           </p:txBody>
         </p:sp>
@@ -5460,7 +5462,7 @@
             </a:ln>
             <a:extLst>
               <a:ext uri="{C572A759-6A51-4108-AA02-DFA0A04FC94B}">
-                <ma14:wrappingTextBoxFlag xmlns="" xmlns:m="http://schemas.openxmlformats.org/officeDocument/2006/math" xmlns:a14="http://schemas.microsoft.com/office/drawing/2010/main" xmlns:ma14="http://schemas.microsoft.com/office/mac/drawingml/2011/main" val="1"/>
+                <ma14:wrappingTextBoxFlag xmlns:ma14="http://schemas.microsoft.com/office/mac/drawingml/2011/main" xmlns:a14="http://schemas.microsoft.com/office/drawing/2010/main" xmlns:m="http://schemas.openxmlformats.org/officeDocument/2006/math" xmlns="" val="1"/>
               </a:ext>
             </a:extLst>
           </p:spPr>
@@ -5543,7 +5545,7 @@
                   <a:sym typeface="Helvetica Neue Medium"/>
                 </a:defRPr>
               </a:pPr>
-              <a:endParaRPr/>
+              <a:endParaRPr dirty="0"/>
             </a:p>
           </p:txBody>
         </p:sp>
@@ -5573,7 +5575,7 @@
             </a:ln>
             <a:extLst>
               <a:ext uri="{C572A759-6A51-4108-AA02-DFA0A04FC94B}">
-                <ma14:wrappingTextBoxFlag xmlns="" xmlns:m="http://schemas.openxmlformats.org/officeDocument/2006/math" xmlns:a14="http://schemas.microsoft.com/office/drawing/2010/main" xmlns:ma14="http://schemas.microsoft.com/office/mac/drawingml/2011/main" val="1"/>
+                <ma14:wrappingTextBoxFlag xmlns:ma14="http://schemas.microsoft.com/office/mac/drawingml/2011/main" xmlns:a14="http://schemas.microsoft.com/office/drawing/2010/main" xmlns:m="http://schemas.openxmlformats.org/officeDocument/2006/math" xmlns="" val="1"/>
               </a:ext>
             </a:extLst>
           </p:spPr>
@@ -5718,7 +5720,7 @@
                   <a:sym typeface="Helvetica Neue Medium"/>
                 </a:defRPr>
               </a:pPr>
-              <a:endParaRPr/>
+              <a:endParaRPr dirty="0"/>
             </a:p>
           </p:txBody>
         </p:sp>
@@ -5747,7 +5749,7 @@
             </a:ln>
             <a:extLst>
               <a:ext uri="{C572A759-6A51-4108-AA02-DFA0A04FC94B}">
-                <ma14:wrappingTextBoxFlag xmlns="" xmlns:m="http://schemas.openxmlformats.org/officeDocument/2006/math" xmlns:a14="http://schemas.microsoft.com/office/drawing/2010/main" xmlns:ma14="http://schemas.microsoft.com/office/mac/drawingml/2011/main" val="1"/>
+                <ma14:wrappingTextBoxFlag xmlns:ma14="http://schemas.microsoft.com/office/mac/drawingml/2011/main" xmlns:a14="http://schemas.microsoft.com/office/drawing/2010/main" xmlns:m="http://schemas.openxmlformats.org/officeDocument/2006/math" xmlns="" val="1"/>
               </a:ext>
             </a:extLst>
           </p:spPr>
@@ -5822,7 +5824,7 @@
                   <a:sym typeface="Helvetica Neue Medium"/>
                 </a:defRPr>
               </a:pPr>
-              <a:endParaRPr/>
+              <a:endParaRPr dirty="0"/>
             </a:p>
           </p:txBody>
         </p:sp>
@@ -5851,7 +5853,7 @@
             </a:ln>
             <a:extLst>
               <a:ext uri="{C572A759-6A51-4108-AA02-DFA0A04FC94B}">
-                <ma14:wrappingTextBoxFlag xmlns="" xmlns:m="http://schemas.openxmlformats.org/officeDocument/2006/math" xmlns:a14="http://schemas.microsoft.com/office/drawing/2010/main" xmlns:ma14="http://schemas.microsoft.com/office/mac/drawingml/2011/main" val="1"/>
+                <ma14:wrappingTextBoxFlag xmlns:ma14="http://schemas.microsoft.com/office/mac/drawingml/2011/main" xmlns:a14="http://schemas.microsoft.com/office/drawing/2010/main" xmlns:m="http://schemas.openxmlformats.org/officeDocument/2006/math" xmlns="" val="1"/>
               </a:ext>
             </a:extLst>
           </p:spPr>
@@ -6007,7 +6009,7 @@
                   <a:sym typeface="Helvetica Neue Medium"/>
                 </a:defRPr>
               </a:pPr>
-              <a:endParaRPr/>
+              <a:endParaRPr dirty="0"/>
             </a:p>
           </p:txBody>
         </p:sp>
@@ -6036,7 +6038,7 @@
             </a:ln>
             <a:extLst>
               <a:ext uri="{C572A759-6A51-4108-AA02-DFA0A04FC94B}">
-                <ma14:wrappingTextBoxFlag xmlns="" xmlns:m="http://schemas.openxmlformats.org/officeDocument/2006/math" xmlns:a14="http://schemas.microsoft.com/office/drawing/2010/main" xmlns:ma14="http://schemas.microsoft.com/office/mac/drawingml/2011/main" val="1"/>
+                <ma14:wrappingTextBoxFlag xmlns:ma14="http://schemas.microsoft.com/office/mac/drawingml/2011/main" xmlns:a14="http://schemas.microsoft.com/office/drawing/2010/main" xmlns:m="http://schemas.openxmlformats.org/officeDocument/2006/math" xmlns="" val="1"/>
               </a:ext>
             </a:extLst>
           </p:spPr>
@@ -6111,7 +6113,7 @@
                   <a:sym typeface="Helvetica Neue Medium"/>
                 </a:defRPr>
               </a:pPr>
-              <a:endParaRPr/>
+              <a:endParaRPr dirty="0"/>
             </a:p>
           </p:txBody>
         </p:sp>
@@ -6140,7 +6142,7 @@
             </a:ln>
             <a:extLst>
               <a:ext uri="{C572A759-6A51-4108-AA02-DFA0A04FC94B}">
-                <ma14:wrappingTextBoxFlag xmlns="" xmlns:m="http://schemas.openxmlformats.org/officeDocument/2006/math" xmlns:a14="http://schemas.microsoft.com/office/drawing/2010/main" xmlns:ma14="http://schemas.microsoft.com/office/mac/drawingml/2011/main" val="1"/>
+                <ma14:wrappingTextBoxFlag xmlns:ma14="http://schemas.microsoft.com/office/mac/drawingml/2011/main" xmlns:a14="http://schemas.microsoft.com/office/drawing/2010/main" xmlns:m="http://schemas.openxmlformats.org/officeDocument/2006/math" xmlns="" val="1"/>
               </a:ext>
             </a:extLst>
           </p:spPr>
@@ -6213,7 +6215,7 @@
           <a:bodyPr lIns="45718" tIns="45718" rIns="45718" bIns="45718"/>
           <a:lstStyle/>
           <a:p>
-            <a:endParaRPr/>
+            <a:endParaRPr dirty="0"/>
           </a:p>
         </p:txBody>
       </p:sp>
@@ -6243,7 +6245,7 @@
           </a:ln>
           <a:extLst>
             <a:ext uri="{C572A759-6A51-4108-AA02-DFA0A04FC94B}">
-              <ma14:wrappingTextBoxFlag xmlns="" xmlns:m="http://schemas.openxmlformats.org/officeDocument/2006/math" xmlns:a14="http://schemas.microsoft.com/office/drawing/2010/main" xmlns:ma14="http://schemas.microsoft.com/office/mac/drawingml/2011/main" val="1"/>
+              <ma14:wrappingTextBoxFlag xmlns:ma14="http://schemas.microsoft.com/office/mac/drawingml/2011/main" xmlns:a14="http://schemas.microsoft.com/office/drawing/2010/main" xmlns:m="http://schemas.openxmlformats.org/officeDocument/2006/math" xmlns="" val="1"/>
             </a:ext>
           </a:extLst>
         </p:spPr>
@@ -6285,6 +6287,3784 @@
     <p:extLst>
       <p:ext uri="{BB962C8B-B14F-4D97-AF65-F5344CB8AC3E}">
         <p14:creationId xmlns:p14="http://schemas.microsoft.com/office/powerpoint/2010/main" val="3861791811"/>
+      </p:ext>
+    </p:extLst>
+  </p:cSld>
+  <p:clrMapOvr>
+    <a:masterClrMapping/>
+  </p:clrMapOvr>
+  <p:transition spd="med"/>
+</p:sld>
+</file>
+
+<file path=ppt/slides/slide2.xml><?xml version="1.0" encoding="utf-8"?>
+<p:sld xmlns:a="http://schemas.openxmlformats.org/drawingml/2006/main" xmlns:r="http://schemas.openxmlformats.org/officeDocument/2006/relationships" xmlns:p="http://schemas.openxmlformats.org/presentationml/2006/main">
+  <p:cSld>
+    <p:spTree>
+      <p:nvGrpSpPr>
+        <p:cNvPr id="1" name=""/>
+        <p:cNvGrpSpPr/>
+        <p:nvPr/>
+      </p:nvGrpSpPr>
+      <p:grpSpPr>
+        <a:xfrm>
+          <a:off x="0" y="0"/>
+          <a:ext cx="0" cy="0"/>
+          <a:chOff x="0" y="0"/>
+          <a:chExt cx="0" cy="0"/>
+        </a:xfrm>
+      </p:grpSpPr>
+      <p:grpSp>
+        <p:nvGrpSpPr>
+          <p:cNvPr id="70" name="Group 69">
+            <a:extLst>
+              <a:ext uri="{FF2B5EF4-FFF2-40B4-BE49-F238E27FC236}">
+                <a16:creationId xmlns:a16="http://schemas.microsoft.com/office/drawing/2014/main" id="{3687815C-7DB6-4C1D-A2C9-8D7BA601056F}"/>
+              </a:ext>
+            </a:extLst>
+          </p:cNvPr>
+          <p:cNvGrpSpPr/>
+          <p:nvPr/>
+        </p:nvGrpSpPr>
+        <p:grpSpPr>
+          <a:xfrm>
+            <a:off x="2567304" y="6546412"/>
+            <a:ext cx="5862244" cy="1197475"/>
+            <a:chOff x="1827289" y="5632838"/>
+            <a:chExt cx="5862244" cy="1197475"/>
+          </a:xfrm>
+        </p:grpSpPr>
+        <p:sp>
+          <p:nvSpPr>
+            <p:cNvPr id="71" name="Shape">
+              <a:extLst>
+                <a:ext uri="{FF2B5EF4-FFF2-40B4-BE49-F238E27FC236}">
+                  <a16:creationId xmlns:a16="http://schemas.microsoft.com/office/drawing/2014/main" id="{5673CA13-077B-4E6B-9712-7063945832F2}"/>
+                </a:ext>
+              </a:extLst>
+            </p:cNvPr>
+            <p:cNvSpPr/>
+            <p:nvPr/>
+          </p:nvSpPr>
+          <p:spPr>
+            <a:xfrm rot="20874979">
+              <a:off x="1827289" y="5632838"/>
+              <a:ext cx="5862244" cy="1197475"/>
+            </a:xfrm>
+            <a:custGeom>
+              <a:avLst/>
+              <a:gdLst/>
+              <a:ahLst/>
+              <a:cxnLst>
+                <a:cxn ang="0">
+                  <a:pos x="wd2" y="hd2"/>
+                </a:cxn>
+                <a:cxn ang="5400000">
+                  <a:pos x="wd2" y="hd2"/>
+                </a:cxn>
+                <a:cxn ang="10800000">
+                  <a:pos x="wd2" y="hd2"/>
+                </a:cxn>
+                <a:cxn ang="16200000">
+                  <a:pos x="wd2" y="hd2"/>
+                </a:cxn>
+              </a:cxnLst>
+              <a:rect l="0" t="0" r="r" b="b"/>
+              <a:pathLst>
+                <a:path w="21600" h="21600" extrusionOk="0">
+                  <a:moveTo>
+                    <a:pt x="0" y="10800"/>
+                  </a:moveTo>
+                  <a:lnTo>
+                    <a:pt x="10800" y="21600"/>
+                  </a:lnTo>
+                  <a:lnTo>
+                    <a:pt x="21600" y="10800"/>
+                  </a:lnTo>
+                  <a:lnTo>
+                    <a:pt x="10800" y="0"/>
+                  </a:lnTo>
+                  <a:close/>
+                </a:path>
+              </a:pathLst>
+            </a:custGeom>
+            <a:solidFill>
+              <a:schemeClr val="accent2">
+                <a:lumMod val="50000"/>
+              </a:schemeClr>
+            </a:solidFill>
+            <a:ln w="25400">
+              <a:solidFill>
+                <a:srgbClr val="000000"/>
+              </a:solidFill>
+              <a:miter lim="400000"/>
+            </a:ln>
+            <a:effectLst>
+              <a:outerShdw blurRad="63500" dist="126055" dir="5400000" rotWithShape="0">
+                <a:srgbClr val="000000">
+                  <a:alpha val="50000"/>
+                </a:srgbClr>
+              </a:outerShdw>
+            </a:effectLst>
+          </p:spPr>
+          <p:txBody>
+            <a:bodyPr lIns="50800" tIns="50800" rIns="50800" bIns="50800" anchor="ctr"/>
+            <a:lstStyle/>
+            <a:p>
+              <a:pPr>
+                <a:defRPr sz="2200">
+                  <a:solidFill>
+                    <a:srgbClr val="FFFFFF"/>
+                  </a:solidFill>
+                  <a:latin typeface="Helvetica Neue Medium"/>
+                  <a:ea typeface="Helvetica Neue Medium"/>
+                  <a:cs typeface="Helvetica Neue Medium"/>
+                  <a:sym typeface="Helvetica Neue Medium"/>
+                </a:defRPr>
+              </a:pPr>
+              <a:endParaRPr dirty="0"/>
+            </a:p>
+          </p:txBody>
+        </p:sp>
+        <p:sp>
+          <p:nvSpPr>
+            <p:cNvPr id="72" name="Entry">
+              <a:extLst>
+                <a:ext uri="{FF2B5EF4-FFF2-40B4-BE49-F238E27FC236}">
+                  <a16:creationId xmlns:a16="http://schemas.microsoft.com/office/drawing/2014/main" id="{D69E3958-07EA-4ECD-9C89-6665AB1FDB15}"/>
+                </a:ext>
+              </a:extLst>
+            </p:cNvPr>
+            <p:cNvSpPr txBox="1"/>
+            <p:nvPr/>
+          </p:nvSpPr>
+          <p:spPr>
+            <a:xfrm>
+              <a:off x="3132381" y="6388345"/>
+              <a:ext cx="1341714" cy="425758"/>
+            </a:xfrm>
+            <a:prstGeom prst="rect">
+              <a:avLst/>
+            </a:prstGeom>
+            <a:noFill/>
+            <a:ln w="12700">
+              <a:miter lim="400000"/>
+            </a:ln>
+            <a:extLst>
+              <a:ext uri="{C572A759-6A51-4108-AA02-DFA0A04FC94B}">
+                <ma14:wrappingTextBoxFlag xmlns:ma14="http://schemas.microsoft.com/office/mac/drawingml/2011/main" xmlns:a14="http://schemas.microsoft.com/office/drawing/2010/main" xmlns:m="http://schemas.openxmlformats.org/officeDocument/2006/math" xmlns="" val="1"/>
+              </a:ext>
+            </a:extLst>
+          </p:spPr>
+          <p:txBody>
+            <a:bodyPr wrap="none" lIns="50800" tIns="50800" rIns="50800" bIns="50800" anchor="ctr">
+              <a:spAutoFit/>
+            </a:bodyPr>
+            <a:lstStyle>
+              <a:lvl1pPr>
+                <a:defRPr sz="2100" b="1" i="1">
+                  <a:solidFill>
+                    <a:srgbClr val="FFFFFF"/>
+                  </a:solidFill>
+                  <a:latin typeface="+mn-lt"/>
+                  <a:ea typeface="+mn-ea"/>
+                  <a:cs typeface="+mn-cs"/>
+                  <a:sym typeface="Helvetica Neue"/>
+                </a:defRPr>
+              </a:lvl1pPr>
+            </a:lstStyle>
+            <a:p>
+              <a:r>
+                <a:rPr lang="en-CA" dirty="0">
+                  <a:solidFill>
+                    <a:srgbClr val="BAF0FF"/>
+                  </a:solidFill>
+                </a:rPr>
+                <a:t>Datatype*</a:t>
+              </a:r>
+              <a:endParaRPr dirty="0">
+                <a:solidFill>
+                  <a:srgbClr val="BAF0FF"/>
+                </a:solidFill>
+              </a:endParaRPr>
+            </a:p>
+          </p:txBody>
+        </p:sp>
+        <p:sp>
+          <p:nvSpPr>
+            <p:cNvPr id="73" name="Oval">
+              <a:extLst>
+                <a:ext uri="{FF2B5EF4-FFF2-40B4-BE49-F238E27FC236}">
+                  <a16:creationId xmlns:a16="http://schemas.microsoft.com/office/drawing/2014/main" id="{1C916484-2136-4516-BFD8-448A6326BC12}"/>
+                </a:ext>
+              </a:extLst>
+            </p:cNvPr>
+            <p:cNvSpPr/>
+            <p:nvPr/>
+          </p:nvSpPr>
+          <p:spPr>
+            <a:xfrm>
+              <a:off x="6957732" y="5666533"/>
+              <a:ext cx="272031" cy="96525"/>
+            </a:xfrm>
+            <a:prstGeom prst="ellipse">
+              <a:avLst/>
+            </a:prstGeom>
+            <a:solidFill>
+              <a:schemeClr val="bg1"/>
+            </a:solidFill>
+            <a:ln w="25400">
+              <a:solidFill>
+                <a:srgbClr val="5E5E5E"/>
+              </a:solidFill>
+              <a:miter lim="400000"/>
+            </a:ln>
+          </p:spPr>
+          <p:txBody>
+            <a:bodyPr lIns="50800" tIns="50800" rIns="50800" bIns="50800" anchor="ctr"/>
+            <a:lstStyle/>
+            <a:p>
+              <a:pPr>
+                <a:defRPr sz="2200">
+                  <a:solidFill>
+                    <a:srgbClr val="FFFFFF"/>
+                  </a:solidFill>
+                  <a:latin typeface="Helvetica Neue Medium"/>
+                  <a:ea typeface="Helvetica Neue Medium"/>
+                  <a:cs typeface="Helvetica Neue Medium"/>
+                  <a:sym typeface="Helvetica Neue Medium"/>
+                </a:defRPr>
+              </a:pPr>
+              <a:endParaRPr dirty="0"/>
+            </a:p>
+          </p:txBody>
+        </p:sp>
+        <p:sp>
+          <p:nvSpPr>
+            <p:cNvPr id="74" name="&lt;language&gt;">
+              <a:extLst>
+                <a:ext uri="{FF2B5EF4-FFF2-40B4-BE49-F238E27FC236}">
+                  <a16:creationId xmlns:a16="http://schemas.microsoft.com/office/drawing/2014/main" id="{3F1976CB-4542-4488-BF9C-423A053B7CF6}"/>
+                </a:ext>
+              </a:extLst>
+            </p:cNvPr>
+            <p:cNvSpPr txBox="1"/>
+            <p:nvPr/>
+          </p:nvSpPr>
+          <p:spPr>
+            <a:xfrm rot="20160000">
+              <a:off x="4601138" y="6097269"/>
+              <a:ext cx="2099935" cy="348813"/>
+            </a:xfrm>
+            <a:prstGeom prst="rect">
+              <a:avLst/>
+            </a:prstGeom>
+            <a:noFill/>
+            <a:ln w="12700">
+              <a:miter lim="400000"/>
+            </a:ln>
+            <a:extLst>
+              <a:ext uri="{C572A759-6A51-4108-AA02-DFA0A04FC94B}">
+                <ma14:wrappingTextBoxFlag xmlns:ma14="http://schemas.microsoft.com/office/mac/drawingml/2011/main" xmlns:a14="http://schemas.microsoft.com/office/drawing/2010/main" xmlns:m="http://schemas.openxmlformats.org/officeDocument/2006/math" xmlns="" val="1"/>
+              </a:ext>
+            </a:extLst>
+          </p:spPr>
+          <p:txBody>
+            <a:bodyPr wrap="none" lIns="50800" tIns="50800" rIns="50800" bIns="50800" anchor="ctr">
+              <a:spAutoFit/>
+            </a:bodyPr>
+            <a:lstStyle>
+              <a:lvl1pPr>
+                <a:defRPr sz="1600" b="1">
+                  <a:latin typeface="+mn-lt"/>
+                  <a:ea typeface="+mn-ea"/>
+                  <a:cs typeface="+mn-cs"/>
+                  <a:sym typeface="Helvetica Neue"/>
+                </a:defRPr>
+              </a:lvl1pPr>
+            </a:lstStyle>
+            <a:p>
+              <a:r>
+                <a:rPr lang="en-CA" dirty="0">
+                  <a:solidFill>
+                    <a:srgbClr val="BAF0FF"/>
+                  </a:solidFill>
+                </a:rPr>
+                <a:t>&lt;internal datatypes&gt;</a:t>
+              </a:r>
+              <a:endParaRPr dirty="0">
+                <a:solidFill>
+                  <a:srgbClr val="BAF0FF"/>
+                </a:solidFill>
+              </a:endParaRPr>
+            </a:p>
+          </p:txBody>
+        </p:sp>
+      </p:grpSp>
+      <p:grpSp>
+        <p:nvGrpSpPr>
+          <p:cNvPr id="9" name="Group 8">
+            <a:extLst>
+              <a:ext uri="{FF2B5EF4-FFF2-40B4-BE49-F238E27FC236}">
+                <a16:creationId xmlns:a16="http://schemas.microsoft.com/office/drawing/2014/main" id="{BEEB3494-2C73-4956-B714-01AD13393FE6}"/>
+              </a:ext>
+            </a:extLst>
+          </p:cNvPr>
+          <p:cNvGrpSpPr/>
+          <p:nvPr/>
+        </p:nvGrpSpPr>
+        <p:grpSpPr>
+          <a:xfrm>
+            <a:off x="3744237" y="2450537"/>
+            <a:ext cx="5862244" cy="1197475"/>
+            <a:chOff x="2674236" y="2762016"/>
+            <a:chExt cx="5862244" cy="1197475"/>
+          </a:xfrm>
+        </p:grpSpPr>
+        <p:sp>
+          <p:nvSpPr>
+            <p:cNvPr id="166" name="Shape"/>
+            <p:cNvSpPr/>
+            <p:nvPr/>
+          </p:nvSpPr>
+          <p:spPr>
+            <a:xfrm rot="20874979">
+              <a:off x="2674236" y="2762016"/>
+              <a:ext cx="5862244" cy="1197475"/>
+            </a:xfrm>
+            <a:custGeom>
+              <a:avLst/>
+              <a:gdLst/>
+              <a:ahLst/>
+              <a:cxnLst>
+                <a:cxn ang="0">
+                  <a:pos x="wd2" y="hd2"/>
+                </a:cxn>
+                <a:cxn ang="5400000">
+                  <a:pos x="wd2" y="hd2"/>
+                </a:cxn>
+                <a:cxn ang="10800000">
+                  <a:pos x="wd2" y="hd2"/>
+                </a:cxn>
+                <a:cxn ang="16200000">
+                  <a:pos x="wd2" y="hd2"/>
+                </a:cxn>
+              </a:cxnLst>
+              <a:rect l="0" t="0" r="r" b="b"/>
+              <a:pathLst>
+                <a:path w="21600" h="21600" extrusionOk="0">
+                  <a:moveTo>
+                    <a:pt x="0" y="10800"/>
+                  </a:moveTo>
+                  <a:lnTo>
+                    <a:pt x="10800" y="21600"/>
+                  </a:lnTo>
+                  <a:lnTo>
+                    <a:pt x="21600" y="10800"/>
+                  </a:lnTo>
+                  <a:lnTo>
+                    <a:pt x="10800" y="0"/>
+                  </a:lnTo>
+                  <a:close/>
+                </a:path>
+              </a:pathLst>
+            </a:custGeom>
+            <a:solidFill>
+              <a:schemeClr val="accent4"/>
+            </a:solidFill>
+            <a:ln w="25400">
+              <a:solidFill>
+                <a:srgbClr val="5E5E5E"/>
+              </a:solidFill>
+              <a:miter lim="400000"/>
+            </a:ln>
+            <a:effectLst>
+              <a:outerShdw blurRad="63500" dist="131478" dir="5400000" rotWithShape="0">
+                <a:srgbClr val="000000">
+                  <a:alpha val="50000"/>
+                </a:srgbClr>
+              </a:outerShdw>
+            </a:effectLst>
+          </p:spPr>
+          <p:txBody>
+            <a:bodyPr lIns="50800" tIns="50800" rIns="50800" bIns="50800" anchor="ctr"/>
+            <a:lstStyle/>
+            <a:p>
+              <a:pPr>
+                <a:defRPr sz="2200">
+                  <a:solidFill>
+                    <a:srgbClr val="FFFFFF"/>
+                  </a:solidFill>
+                  <a:latin typeface="Helvetica Neue Medium"/>
+                  <a:ea typeface="Helvetica Neue Medium"/>
+                  <a:cs typeface="Helvetica Neue Medium"/>
+                  <a:sym typeface="Helvetica Neue Medium"/>
+                </a:defRPr>
+              </a:pPr>
+              <a:endParaRPr dirty="0"/>
+            </a:p>
+          </p:txBody>
+        </p:sp>
+        <p:sp>
+          <p:nvSpPr>
+            <p:cNvPr id="180" name="Oval"/>
+            <p:cNvSpPr/>
+            <p:nvPr/>
+          </p:nvSpPr>
+          <p:spPr>
+            <a:xfrm>
+              <a:off x="7763088" y="2798330"/>
+              <a:ext cx="272031" cy="96525"/>
+            </a:xfrm>
+            <a:prstGeom prst="ellipse">
+              <a:avLst/>
+            </a:prstGeom>
+            <a:solidFill>
+              <a:srgbClr val="FFFFFF"/>
+            </a:solidFill>
+            <a:ln w="25400">
+              <a:solidFill>
+                <a:srgbClr val="5E5E5E"/>
+              </a:solidFill>
+              <a:miter lim="400000"/>
+            </a:ln>
+          </p:spPr>
+          <p:txBody>
+            <a:bodyPr lIns="50800" tIns="50800" rIns="50800" bIns="50800" anchor="ctr"/>
+            <a:lstStyle/>
+            <a:p>
+              <a:pPr>
+                <a:defRPr sz="2200">
+                  <a:solidFill>
+                    <a:srgbClr val="FFFFFF"/>
+                  </a:solidFill>
+                  <a:latin typeface="Helvetica Neue Medium"/>
+                  <a:ea typeface="Helvetica Neue Medium"/>
+                  <a:cs typeface="Helvetica Neue Medium"/>
+                  <a:sym typeface="Helvetica Neue Medium"/>
+                </a:defRPr>
+              </a:pPr>
+              <a:endParaRPr dirty="0"/>
+            </a:p>
+          </p:txBody>
+        </p:sp>
+        <p:sp>
+          <p:nvSpPr>
+            <p:cNvPr id="43" name="Subset">
+              <a:extLst>
+                <a:ext uri="{FF2B5EF4-FFF2-40B4-BE49-F238E27FC236}">
+                  <a16:creationId xmlns:a16="http://schemas.microsoft.com/office/drawing/2014/main" id="{C2F07E08-4EC8-4CCC-B1B2-75A706809347}"/>
+                </a:ext>
+              </a:extLst>
+            </p:cNvPr>
+            <p:cNvSpPr txBox="1"/>
+            <p:nvPr/>
+          </p:nvSpPr>
+          <p:spPr>
+            <a:xfrm>
+              <a:off x="3381991" y="3486354"/>
+              <a:ext cx="2647127" cy="425758"/>
+            </a:xfrm>
+            <a:prstGeom prst="rect">
+              <a:avLst/>
+            </a:prstGeom>
+            <a:ln w="12700">
+              <a:miter lim="400000"/>
+            </a:ln>
+            <a:extLst>
+              <a:ext uri="{C572A759-6A51-4108-AA02-DFA0A04FC94B}">
+                <ma14:wrappingTextBoxFlag xmlns:ma14="http://schemas.microsoft.com/office/mac/drawingml/2011/main" xmlns:a14="http://schemas.microsoft.com/office/drawing/2010/main" xmlns:m="http://schemas.openxmlformats.org/officeDocument/2006/math" xmlns="" val="1"/>
+              </a:ext>
+            </a:extLst>
+          </p:spPr>
+          <p:txBody>
+            <a:bodyPr wrap="square" lIns="50800" tIns="50800" rIns="50800" bIns="50800" anchor="ctr">
+              <a:spAutoFit/>
+            </a:bodyPr>
+            <a:lstStyle>
+              <a:lvl1pPr>
+                <a:defRPr sz="2100" b="1" i="1">
+                  <a:solidFill>
+                    <a:srgbClr val="5E5E5E"/>
+                  </a:solidFill>
+                  <a:latin typeface="+mn-lt"/>
+                  <a:ea typeface="+mn-ea"/>
+                  <a:cs typeface="+mn-cs"/>
+                  <a:sym typeface="Helvetica Neue"/>
+                </a:defRPr>
+              </a:lvl1pPr>
+            </a:lstStyle>
+            <a:p>
+              <a:r>
+                <a:rPr lang="en-CA" dirty="0"/>
+                <a:t>Schema Base</a:t>
+              </a:r>
+              <a:endParaRPr dirty="0"/>
+            </a:p>
+          </p:txBody>
+        </p:sp>
+        <p:sp>
+          <p:nvSpPr>
+            <p:cNvPr id="44" name="&lt;encoding&gt;">
+              <a:extLst>
+                <a:ext uri="{FF2B5EF4-FFF2-40B4-BE49-F238E27FC236}">
+                  <a16:creationId xmlns:a16="http://schemas.microsoft.com/office/drawing/2014/main" id="{68459986-6D5E-403F-AD89-1DC78E00536C}"/>
+                </a:ext>
+              </a:extLst>
+            </p:cNvPr>
+            <p:cNvSpPr txBox="1"/>
+            <p:nvPr/>
+          </p:nvSpPr>
+          <p:spPr>
+            <a:xfrm rot="20160000">
+              <a:off x="5536200" y="3091248"/>
+              <a:ext cx="2558393" cy="348813"/>
+            </a:xfrm>
+            <a:prstGeom prst="rect">
+              <a:avLst/>
+            </a:prstGeom>
+            <a:ln w="12700">
+              <a:miter lim="400000"/>
+            </a:ln>
+            <a:extLst>
+              <a:ext uri="{C572A759-6A51-4108-AA02-DFA0A04FC94B}">
+                <ma14:wrappingTextBoxFlag xmlns:ma14="http://schemas.microsoft.com/office/mac/drawingml/2011/main" xmlns:a14="http://schemas.microsoft.com/office/drawing/2010/main" xmlns:m="http://schemas.openxmlformats.org/officeDocument/2006/math" xmlns="" val="1"/>
+              </a:ext>
+            </a:extLst>
+          </p:spPr>
+          <p:txBody>
+            <a:bodyPr wrap="none" lIns="50800" tIns="50800" rIns="50800" bIns="50800" anchor="ctr">
+              <a:spAutoFit/>
+            </a:bodyPr>
+            <a:lstStyle>
+              <a:lvl1pPr>
+                <a:defRPr sz="1600" b="1">
+                  <a:latin typeface="+mn-lt"/>
+                  <a:ea typeface="+mn-ea"/>
+                  <a:cs typeface="+mn-cs"/>
+                  <a:sym typeface="Helvetica Neue"/>
+                </a:defRPr>
+              </a:lvl1pPr>
+            </a:lstStyle>
+            <a:p>
+              <a:r>
+                <a:rPr dirty="0">
+                  <a:solidFill>
+                    <a:srgbClr val="5E5E5E"/>
+                  </a:solidFill>
+                </a:rPr>
+                <a:t>&lt;</a:t>
+              </a:r>
+              <a:r>
+                <a:rPr lang="en-CA" dirty="0">
+                  <a:solidFill>
+                    <a:srgbClr val="5E5E5E"/>
+                  </a:solidFill>
+                </a:rPr>
+                <a:t>internal attribute name</a:t>
+              </a:r>
+              <a:r>
+                <a:rPr dirty="0">
+                  <a:solidFill>
+                    <a:srgbClr val="5E5E5E"/>
+                  </a:solidFill>
+                </a:rPr>
+                <a:t>&gt;</a:t>
+              </a:r>
+            </a:p>
+          </p:txBody>
+        </p:sp>
+      </p:grpSp>
+      <p:grpSp>
+        <p:nvGrpSpPr>
+          <p:cNvPr id="2" name="Group 1">
+            <a:extLst>
+              <a:ext uri="{FF2B5EF4-FFF2-40B4-BE49-F238E27FC236}">
+                <a16:creationId xmlns:a16="http://schemas.microsoft.com/office/drawing/2014/main" id="{E5DD09C4-4D9B-4452-A033-6868C4F1B428}"/>
+              </a:ext>
+            </a:extLst>
+          </p:cNvPr>
+          <p:cNvGrpSpPr/>
+          <p:nvPr/>
+        </p:nvGrpSpPr>
+        <p:grpSpPr>
+          <a:xfrm>
+            <a:off x="10079792" y="811141"/>
+            <a:ext cx="674969" cy="2714672"/>
+            <a:chOff x="9978192" y="695571"/>
+            <a:chExt cx="674969" cy="2714672"/>
+          </a:xfrm>
+        </p:grpSpPr>
+        <p:sp>
+          <p:nvSpPr>
+            <p:cNvPr id="169" name="Line"/>
+            <p:cNvSpPr/>
+            <p:nvPr/>
+          </p:nvSpPr>
+          <p:spPr>
+            <a:xfrm flipV="1">
+              <a:off x="9978192" y="695571"/>
+              <a:ext cx="20096" cy="2714672"/>
+            </a:xfrm>
+            <a:prstGeom prst="line">
+              <a:avLst/>
+            </a:prstGeom>
+            <a:ln w="25400">
+              <a:solidFill>
+                <a:srgbClr val="000000"/>
+              </a:solidFill>
+              <a:miter lim="400000"/>
+              <a:headEnd type="triangle"/>
+              <a:tailEnd type="triangle"/>
+            </a:ln>
+          </p:spPr>
+          <p:txBody>
+            <a:bodyPr lIns="45718" tIns="45718" rIns="45718" bIns="45718"/>
+            <a:lstStyle/>
+            <a:p>
+              <a:endParaRPr dirty="0"/>
+            </a:p>
+          </p:txBody>
+        </p:sp>
+        <p:sp>
+          <p:nvSpPr>
+            <p:cNvPr id="170" name="Optional Logic"/>
+            <p:cNvSpPr txBox="1"/>
+            <p:nvPr/>
+          </p:nvSpPr>
+          <p:spPr>
+            <a:xfrm rot="16200000">
+              <a:off x="9736349" y="1739370"/>
+              <a:ext cx="1177033" cy="656590"/>
+            </a:xfrm>
+            <a:prstGeom prst="rect">
+              <a:avLst/>
+            </a:prstGeom>
+            <a:ln w="12700">
+              <a:miter lim="400000"/>
+            </a:ln>
+            <a:extLst>
+              <a:ext uri="{C572A759-6A51-4108-AA02-DFA0A04FC94B}">
+                <ma14:wrappingTextBoxFlag xmlns:ma14="http://schemas.microsoft.com/office/mac/drawingml/2011/main" xmlns:a14="http://schemas.microsoft.com/office/drawing/2010/main" xmlns:m="http://schemas.openxmlformats.org/officeDocument/2006/math" xmlns="" val="1"/>
+              </a:ext>
+            </a:extLst>
+          </p:spPr>
+          <p:txBody>
+            <a:bodyPr lIns="50800" tIns="50800" rIns="50800" bIns="50800" anchor="ctr">
+              <a:spAutoFit/>
+            </a:bodyPr>
+            <a:lstStyle>
+              <a:lvl1pPr>
+                <a:defRPr sz="1800" b="1">
+                  <a:latin typeface="+mn-lt"/>
+                  <a:ea typeface="+mn-ea"/>
+                  <a:cs typeface="+mn-cs"/>
+                  <a:sym typeface="Helvetica Neue"/>
+                </a:defRPr>
+              </a:lvl1pPr>
+            </a:lstStyle>
+            <a:p>
+              <a:r>
+                <a:rPr lang="en-CA" dirty="0"/>
+                <a:t>Business Layer</a:t>
+              </a:r>
+              <a:endParaRPr dirty="0"/>
+            </a:p>
+          </p:txBody>
+        </p:sp>
+      </p:grpSp>
+      <p:sp>
+        <p:nvSpPr>
+          <p:cNvPr id="177" name="Double Arrow"/>
+          <p:cNvSpPr/>
+          <p:nvPr/>
+        </p:nvSpPr>
+        <p:spPr>
+          <a:xfrm rot="17263724">
+            <a:off x="-2070144" y="4611406"/>
+            <a:ext cx="9109091" cy="1122106"/>
+          </a:xfrm>
+          <a:prstGeom prst="leftRightArrow">
+            <a:avLst>
+              <a:gd name="adj1" fmla="val 45739"/>
+              <a:gd name="adj2" fmla="val 40007"/>
+            </a:avLst>
+          </a:prstGeom>
+          <a:solidFill>
+            <a:srgbClr val="FFFFFF"/>
+          </a:solidFill>
+          <a:ln w="25400">
+            <a:solidFill>
+              <a:srgbClr val="5E5E5E"/>
+            </a:solidFill>
+            <a:miter lim="400000"/>
+          </a:ln>
+        </p:spPr>
+        <p:txBody>
+          <a:bodyPr lIns="50800" tIns="50800" rIns="50800" bIns="50800" anchor="ctr"/>
+          <a:lstStyle/>
+          <a:p>
+            <a:r>
+              <a:rPr lang="en-CA" b="1" i="1" dirty="0"/>
+              <a:t> An Overlay Family</a:t>
+            </a:r>
+          </a:p>
+        </p:txBody>
+      </p:sp>
+      <p:sp>
+        <p:nvSpPr>
+          <p:cNvPr id="178" name="Overlays"/>
+          <p:cNvSpPr txBox="1"/>
+          <p:nvPr/>
+        </p:nvSpPr>
+        <p:spPr>
+          <a:xfrm rot="17136000">
+            <a:off x="185664" y="4936378"/>
+            <a:ext cx="4675416" cy="487313"/>
+          </a:xfrm>
+          <a:prstGeom prst="rect">
+            <a:avLst/>
+          </a:prstGeom>
+          <a:ln w="12700">
+            <a:miter lim="400000"/>
+          </a:ln>
+          <a:extLst>
+            <a:ext uri="{C572A759-6A51-4108-AA02-DFA0A04FC94B}">
+              <ma14:wrappingTextBoxFlag xmlns:ma14="http://schemas.microsoft.com/office/mac/drawingml/2011/main" xmlns:a14="http://schemas.microsoft.com/office/drawing/2010/main" xmlns:m="http://schemas.openxmlformats.org/officeDocument/2006/math" xmlns="" val="1"/>
+            </a:ext>
+          </a:extLst>
+        </p:spPr>
+        <p:txBody>
+          <a:bodyPr wrap="square" lIns="50800" tIns="50800" rIns="50800" bIns="50800" anchor="ctr">
+            <a:spAutoFit/>
+          </a:bodyPr>
+          <a:lstStyle>
+            <a:lvl1pPr>
+              <a:defRPr sz="2500" b="1">
+                <a:solidFill>
+                  <a:srgbClr val="5E5E5E"/>
+                </a:solidFill>
+                <a:latin typeface="+mn-lt"/>
+                <a:ea typeface="+mn-ea"/>
+                <a:cs typeface="+mn-cs"/>
+                <a:sym typeface="Helvetica Neue"/>
+              </a:defRPr>
+            </a:lvl1pPr>
+          </a:lstStyle>
+          <a:p>
+            <a:endParaRPr dirty="0"/>
+          </a:p>
+        </p:txBody>
+      </p:sp>
+      <p:grpSp>
+        <p:nvGrpSpPr>
+          <p:cNvPr id="8" name="Group 7">
+            <a:extLst>
+              <a:ext uri="{FF2B5EF4-FFF2-40B4-BE49-F238E27FC236}">
+                <a16:creationId xmlns:a16="http://schemas.microsoft.com/office/drawing/2014/main" id="{EC79B7FF-99B9-459C-B45F-F5F2251811F3}"/>
+              </a:ext>
+            </a:extLst>
+          </p:cNvPr>
+          <p:cNvGrpSpPr/>
+          <p:nvPr/>
+        </p:nvGrpSpPr>
+        <p:grpSpPr>
+          <a:xfrm>
+            <a:off x="3964299" y="1864330"/>
+            <a:ext cx="5862244" cy="1197475"/>
+            <a:chOff x="2858201" y="2101616"/>
+            <a:chExt cx="5862244" cy="1197475"/>
+          </a:xfrm>
+        </p:grpSpPr>
+        <p:sp>
+          <p:nvSpPr>
+            <p:cNvPr id="175" name="Shape"/>
+            <p:cNvSpPr/>
+            <p:nvPr/>
+          </p:nvSpPr>
+          <p:spPr>
+            <a:xfrm rot="20874979">
+              <a:off x="2858201" y="2101616"/>
+              <a:ext cx="5862244" cy="1197475"/>
+            </a:xfrm>
+            <a:custGeom>
+              <a:avLst/>
+              <a:gdLst/>
+              <a:ahLst/>
+              <a:cxnLst>
+                <a:cxn ang="0">
+                  <a:pos x="wd2" y="hd2"/>
+                </a:cxn>
+                <a:cxn ang="5400000">
+                  <a:pos x="wd2" y="hd2"/>
+                </a:cxn>
+                <a:cxn ang="10800000">
+                  <a:pos x="wd2" y="hd2"/>
+                </a:cxn>
+                <a:cxn ang="16200000">
+                  <a:pos x="wd2" y="hd2"/>
+                </a:cxn>
+              </a:cxnLst>
+              <a:rect l="0" t="0" r="r" b="b"/>
+              <a:pathLst>
+                <a:path w="21600" h="21600" extrusionOk="0">
+                  <a:moveTo>
+                    <a:pt x="0" y="10800"/>
+                  </a:moveTo>
+                  <a:lnTo>
+                    <a:pt x="10800" y="21600"/>
+                  </a:lnTo>
+                  <a:lnTo>
+                    <a:pt x="21600" y="10800"/>
+                  </a:lnTo>
+                  <a:lnTo>
+                    <a:pt x="10800" y="0"/>
+                  </a:lnTo>
+                  <a:close/>
+                </a:path>
+              </a:pathLst>
+            </a:custGeom>
+            <a:solidFill>
+              <a:schemeClr val="accent4">
+                <a:lumMod val="60000"/>
+                <a:lumOff val="40000"/>
+              </a:schemeClr>
+            </a:solidFill>
+            <a:ln w="25400">
+              <a:solidFill>
+                <a:srgbClr val="5E5E5E"/>
+              </a:solidFill>
+              <a:miter lim="400000"/>
+            </a:ln>
+            <a:effectLst>
+              <a:outerShdw blurRad="63500" dist="129819" dir="5400000" rotWithShape="0">
+                <a:srgbClr val="000000">
+                  <a:alpha val="50000"/>
+                </a:srgbClr>
+              </a:outerShdw>
+            </a:effectLst>
+          </p:spPr>
+          <p:txBody>
+            <a:bodyPr lIns="50800" tIns="50800" rIns="50800" bIns="50800" anchor="ctr"/>
+            <a:lstStyle/>
+            <a:p>
+              <a:pPr>
+                <a:defRPr sz="2200">
+                  <a:solidFill>
+                    <a:srgbClr val="FFFFFF"/>
+                  </a:solidFill>
+                  <a:latin typeface="Helvetica Neue Medium"/>
+                  <a:ea typeface="Helvetica Neue Medium"/>
+                  <a:cs typeface="Helvetica Neue Medium"/>
+                  <a:sym typeface="Helvetica Neue Medium"/>
+                </a:defRPr>
+              </a:pPr>
+              <a:endParaRPr dirty="0"/>
+            </a:p>
+          </p:txBody>
+        </p:sp>
+        <p:sp>
+          <p:nvSpPr>
+            <p:cNvPr id="176" name="Subset"/>
+            <p:cNvSpPr txBox="1"/>
+            <p:nvPr/>
+          </p:nvSpPr>
+          <p:spPr>
+            <a:xfrm>
+              <a:off x="3534391" y="2846274"/>
+              <a:ext cx="2647127" cy="425758"/>
+            </a:xfrm>
+            <a:prstGeom prst="rect">
+              <a:avLst/>
+            </a:prstGeom>
+            <a:ln w="12700">
+              <a:miter lim="400000"/>
+            </a:ln>
+            <a:extLst>
+              <a:ext uri="{C572A759-6A51-4108-AA02-DFA0A04FC94B}">
+                <ma14:wrappingTextBoxFlag xmlns:ma14="http://schemas.microsoft.com/office/mac/drawingml/2011/main" xmlns:a14="http://schemas.microsoft.com/office/drawing/2010/main" xmlns:m="http://schemas.openxmlformats.org/officeDocument/2006/math" xmlns="" val="1"/>
+              </a:ext>
+            </a:extLst>
+          </p:spPr>
+          <p:txBody>
+            <a:bodyPr wrap="square" lIns="50800" tIns="50800" rIns="50800" bIns="50800" anchor="ctr">
+              <a:spAutoFit/>
+            </a:bodyPr>
+            <a:lstStyle>
+              <a:lvl1pPr>
+                <a:defRPr sz="2100" b="1" i="1">
+                  <a:solidFill>
+                    <a:srgbClr val="5E5E5E"/>
+                  </a:solidFill>
+                  <a:latin typeface="+mn-lt"/>
+                  <a:ea typeface="+mn-ea"/>
+                  <a:cs typeface="+mn-cs"/>
+                  <a:sym typeface="Helvetica Neue"/>
+                </a:defRPr>
+              </a:lvl1pPr>
+            </a:lstStyle>
+            <a:p>
+              <a:r>
+                <a:rPr lang="en-CA" dirty="0"/>
+                <a:t>Source</a:t>
+              </a:r>
+              <a:endParaRPr dirty="0"/>
+            </a:p>
+          </p:txBody>
+        </p:sp>
+        <p:sp>
+          <p:nvSpPr>
+            <p:cNvPr id="179" name="Oval"/>
+            <p:cNvSpPr/>
+            <p:nvPr/>
+          </p:nvSpPr>
+          <p:spPr>
+            <a:xfrm>
+              <a:off x="7928346" y="2163330"/>
+              <a:ext cx="272029" cy="96525"/>
+            </a:xfrm>
+            <a:prstGeom prst="ellipse">
+              <a:avLst/>
+            </a:prstGeom>
+            <a:solidFill>
+              <a:srgbClr val="FFFFFF"/>
+            </a:solidFill>
+            <a:ln w="25400">
+              <a:solidFill>
+                <a:srgbClr val="5E5E5E"/>
+              </a:solidFill>
+              <a:miter lim="400000"/>
+            </a:ln>
+          </p:spPr>
+          <p:txBody>
+            <a:bodyPr lIns="50800" tIns="50800" rIns="50800" bIns="50800" anchor="ctr"/>
+            <a:lstStyle/>
+            <a:p>
+              <a:pPr>
+                <a:defRPr sz="2200">
+                  <a:solidFill>
+                    <a:srgbClr val="FFFFFF"/>
+                  </a:solidFill>
+                  <a:latin typeface="Helvetica Neue Medium"/>
+                  <a:ea typeface="Helvetica Neue Medium"/>
+                  <a:cs typeface="Helvetica Neue Medium"/>
+                  <a:sym typeface="Helvetica Neue Medium"/>
+                </a:defRPr>
+              </a:pPr>
+              <a:endParaRPr dirty="0"/>
+            </a:p>
+          </p:txBody>
+        </p:sp>
+        <p:sp>
+          <p:nvSpPr>
+            <p:cNvPr id="42" name="&lt;encoding&gt;">
+              <a:extLst>
+                <a:ext uri="{FF2B5EF4-FFF2-40B4-BE49-F238E27FC236}">
+                  <a16:creationId xmlns:a16="http://schemas.microsoft.com/office/drawing/2014/main" id="{AC5E0DF3-B72A-48B3-B3B6-C71043F23B36}"/>
+                </a:ext>
+              </a:extLst>
+            </p:cNvPr>
+            <p:cNvSpPr txBox="1"/>
+            <p:nvPr/>
+          </p:nvSpPr>
+          <p:spPr>
+            <a:xfrm rot="20160000">
+              <a:off x="5430503" y="2492010"/>
+              <a:ext cx="2830904" cy="348813"/>
+            </a:xfrm>
+            <a:prstGeom prst="rect">
+              <a:avLst/>
+            </a:prstGeom>
+            <a:ln w="12700">
+              <a:miter lim="400000"/>
+            </a:ln>
+            <a:extLst>
+              <a:ext uri="{C572A759-6A51-4108-AA02-DFA0A04FC94B}">
+                <ma14:wrappingTextBoxFlag xmlns:ma14="http://schemas.microsoft.com/office/mac/drawingml/2011/main" xmlns:a14="http://schemas.microsoft.com/office/drawing/2010/main" xmlns:m="http://schemas.openxmlformats.org/officeDocument/2006/math" xmlns="" val="1"/>
+              </a:ext>
+            </a:extLst>
+          </p:spPr>
+          <p:txBody>
+            <a:bodyPr wrap="none" lIns="50800" tIns="50800" rIns="50800" bIns="50800" anchor="ctr">
+              <a:spAutoFit/>
+            </a:bodyPr>
+            <a:lstStyle>
+              <a:lvl1pPr>
+                <a:defRPr sz="1600" b="1">
+                  <a:latin typeface="+mn-lt"/>
+                  <a:ea typeface="+mn-ea"/>
+                  <a:cs typeface="+mn-cs"/>
+                  <a:sym typeface="Helvetica Neue"/>
+                </a:defRPr>
+              </a:lvl1pPr>
+            </a:lstStyle>
+            <a:p>
+              <a:r>
+                <a:rPr dirty="0">
+                  <a:solidFill>
+                    <a:srgbClr val="5E5E5E"/>
+                  </a:solidFill>
+                </a:rPr>
+                <a:t>&lt;</a:t>
+              </a:r>
+              <a:r>
+                <a:rPr lang="en-CA" dirty="0">
+                  <a:solidFill>
+                    <a:srgbClr val="5E5E5E"/>
+                  </a:solidFill>
+                </a:rPr>
+                <a:t>external attribute schema</a:t>
+              </a:r>
+              <a:r>
+                <a:rPr dirty="0">
+                  <a:solidFill>
+                    <a:srgbClr val="5E5E5E"/>
+                  </a:solidFill>
+                </a:rPr>
+                <a:t>&gt;</a:t>
+              </a:r>
+            </a:p>
+          </p:txBody>
+        </p:sp>
+      </p:grpSp>
+      <p:grpSp>
+        <p:nvGrpSpPr>
+          <p:cNvPr id="15" name="Group 14">
+            <a:extLst>
+              <a:ext uri="{FF2B5EF4-FFF2-40B4-BE49-F238E27FC236}">
+                <a16:creationId xmlns:a16="http://schemas.microsoft.com/office/drawing/2014/main" id="{04FF0EF2-3F54-4195-AB18-7AD63ACD2747}"/>
+              </a:ext>
+            </a:extLst>
+          </p:cNvPr>
+          <p:cNvGrpSpPr/>
+          <p:nvPr/>
+        </p:nvGrpSpPr>
+        <p:grpSpPr>
+          <a:xfrm>
+            <a:off x="2714410" y="5882565"/>
+            <a:ext cx="5862244" cy="1197475"/>
+            <a:chOff x="1827289" y="5632838"/>
+            <a:chExt cx="5862244" cy="1197475"/>
+          </a:xfrm>
+        </p:grpSpPr>
+        <p:sp>
+          <p:nvSpPr>
+            <p:cNvPr id="60" name="Shape">
+              <a:extLst>
+                <a:ext uri="{FF2B5EF4-FFF2-40B4-BE49-F238E27FC236}">
+                  <a16:creationId xmlns:a16="http://schemas.microsoft.com/office/drawing/2014/main" id="{9630146B-64BF-45A2-8FED-E912DCD868CD}"/>
+                </a:ext>
+              </a:extLst>
+            </p:cNvPr>
+            <p:cNvSpPr/>
+            <p:nvPr/>
+          </p:nvSpPr>
+          <p:spPr>
+            <a:xfrm rot="20874979">
+              <a:off x="1827289" y="5632838"/>
+              <a:ext cx="5862244" cy="1197475"/>
+            </a:xfrm>
+            <a:custGeom>
+              <a:avLst/>
+              <a:gdLst/>
+              <a:ahLst/>
+              <a:cxnLst>
+                <a:cxn ang="0">
+                  <a:pos x="wd2" y="hd2"/>
+                </a:cxn>
+                <a:cxn ang="5400000">
+                  <a:pos x="wd2" y="hd2"/>
+                </a:cxn>
+                <a:cxn ang="10800000">
+                  <a:pos x="wd2" y="hd2"/>
+                </a:cxn>
+                <a:cxn ang="16200000">
+                  <a:pos x="wd2" y="hd2"/>
+                </a:cxn>
+              </a:cxnLst>
+              <a:rect l="0" t="0" r="r" b="b"/>
+              <a:pathLst>
+                <a:path w="21600" h="21600" extrusionOk="0">
+                  <a:moveTo>
+                    <a:pt x="0" y="10800"/>
+                  </a:moveTo>
+                  <a:lnTo>
+                    <a:pt x="10800" y="21600"/>
+                  </a:lnTo>
+                  <a:lnTo>
+                    <a:pt x="21600" y="10800"/>
+                  </a:lnTo>
+                  <a:lnTo>
+                    <a:pt x="10800" y="0"/>
+                  </a:lnTo>
+                  <a:close/>
+                </a:path>
+              </a:pathLst>
+            </a:custGeom>
+            <a:solidFill>
+              <a:schemeClr val="accent2">
+                <a:lumMod val="75000"/>
+              </a:schemeClr>
+            </a:solidFill>
+            <a:ln w="25400">
+              <a:solidFill>
+                <a:srgbClr val="000000"/>
+              </a:solidFill>
+              <a:miter lim="400000"/>
+            </a:ln>
+            <a:effectLst>
+              <a:outerShdw blurRad="63500" dist="126055" dir="5400000" rotWithShape="0">
+                <a:srgbClr val="000000">
+                  <a:alpha val="50000"/>
+                </a:srgbClr>
+              </a:outerShdw>
+            </a:effectLst>
+          </p:spPr>
+          <p:txBody>
+            <a:bodyPr lIns="50800" tIns="50800" rIns="50800" bIns="50800" anchor="ctr"/>
+            <a:lstStyle/>
+            <a:p>
+              <a:pPr>
+                <a:defRPr sz="2200">
+                  <a:solidFill>
+                    <a:srgbClr val="FFFFFF"/>
+                  </a:solidFill>
+                  <a:latin typeface="Helvetica Neue Medium"/>
+                  <a:ea typeface="Helvetica Neue Medium"/>
+                  <a:cs typeface="Helvetica Neue Medium"/>
+                  <a:sym typeface="Helvetica Neue Medium"/>
+                </a:defRPr>
+              </a:pPr>
+              <a:endParaRPr dirty="0"/>
+            </a:p>
+          </p:txBody>
+        </p:sp>
+        <p:sp>
+          <p:nvSpPr>
+            <p:cNvPr id="61" name="Entry">
+              <a:extLst>
+                <a:ext uri="{FF2B5EF4-FFF2-40B4-BE49-F238E27FC236}">
+                  <a16:creationId xmlns:a16="http://schemas.microsoft.com/office/drawing/2014/main" id="{670D6975-6164-41D9-866E-F6628CACD3E9}"/>
+                </a:ext>
+              </a:extLst>
+            </p:cNvPr>
+            <p:cNvSpPr txBox="1"/>
+            <p:nvPr/>
+          </p:nvSpPr>
+          <p:spPr>
+            <a:xfrm>
+              <a:off x="3400078" y="6388345"/>
+              <a:ext cx="806311" cy="425758"/>
+            </a:xfrm>
+            <a:prstGeom prst="rect">
+              <a:avLst/>
+            </a:prstGeom>
+            <a:noFill/>
+            <a:ln w="12700">
+              <a:miter lim="400000"/>
+            </a:ln>
+            <a:extLst>
+              <a:ext uri="{C572A759-6A51-4108-AA02-DFA0A04FC94B}">
+                <ma14:wrappingTextBoxFlag xmlns:ma14="http://schemas.microsoft.com/office/mac/drawingml/2011/main" xmlns:a14="http://schemas.microsoft.com/office/drawing/2010/main" xmlns:m="http://schemas.openxmlformats.org/officeDocument/2006/math" xmlns="" val="1"/>
+              </a:ext>
+            </a:extLst>
+          </p:spPr>
+          <p:txBody>
+            <a:bodyPr wrap="none" lIns="50800" tIns="50800" rIns="50800" bIns="50800" anchor="ctr">
+              <a:spAutoFit/>
+            </a:bodyPr>
+            <a:lstStyle>
+              <a:lvl1pPr>
+                <a:defRPr sz="2100" b="1" i="1">
+                  <a:solidFill>
+                    <a:srgbClr val="FFFFFF"/>
+                  </a:solidFill>
+                  <a:latin typeface="+mn-lt"/>
+                  <a:ea typeface="+mn-ea"/>
+                  <a:cs typeface="+mn-cs"/>
+                  <a:sym typeface="Helvetica Neue"/>
+                </a:defRPr>
+              </a:lvl1pPr>
+            </a:lstStyle>
+            <a:p>
+              <a:r>
+                <a:rPr lang="en-CA" dirty="0">
+                  <a:solidFill>
+                    <a:srgbClr val="BAF0FF"/>
+                  </a:solidFill>
+                </a:rPr>
+                <a:t>Label</a:t>
+              </a:r>
+              <a:endParaRPr dirty="0">
+                <a:solidFill>
+                  <a:srgbClr val="BAF0FF"/>
+                </a:solidFill>
+              </a:endParaRPr>
+            </a:p>
+          </p:txBody>
+        </p:sp>
+        <p:sp>
+          <p:nvSpPr>
+            <p:cNvPr id="62" name="Oval">
+              <a:extLst>
+                <a:ext uri="{FF2B5EF4-FFF2-40B4-BE49-F238E27FC236}">
+                  <a16:creationId xmlns:a16="http://schemas.microsoft.com/office/drawing/2014/main" id="{11E0DCAB-2B36-4D97-AE1A-E256ACFC8BD3}"/>
+                </a:ext>
+              </a:extLst>
+            </p:cNvPr>
+            <p:cNvSpPr/>
+            <p:nvPr/>
+          </p:nvSpPr>
+          <p:spPr>
+            <a:xfrm>
+              <a:off x="6957732" y="5666533"/>
+              <a:ext cx="272031" cy="96525"/>
+            </a:xfrm>
+            <a:prstGeom prst="ellipse">
+              <a:avLst/>
+            </a:prstGeom>
+            <a:solidFill>
+              <a:schemeClr val="bg1"/>
+            </a:solidFill>
+            <a:ln w="25400">
+              <a:solidFill>
+                <a:srgbClr val="5E5E5E"/>
+              </a:solidFill>
+              <a:miter lim="400000"/>
+            </a:ln>
+          </p:spPr>
+          <p:txBody>
+            <a:bodyPr lIns="50800" tIns="50800" rIns="50800" bIns="50800" anchor="ctr"/>
+            <a:lstStyle/>
+            <a:p>
+              <a:pPr>
+                <a:defRPr sz="2200">
+                  <a:solidFill>
+                    <a:srgbClr val="FFFFFF"/>
+                  </a:solidFill>
+                  <a:latin typeface="Helvetica Neue Medium"/>
+                  <a:ea typeface="Helvetica Neue Medium"/>
+                  <a:cs typeface="Helvetica Neue Medium"/>
+                  <a:sym typeface="Helvetica Neue Medium"/>
+                </a:defRPr>
+              </a:pPr>
+              <a:endParaRPr dirty="0"/>
+            </a:p>
+          </p:txBody>
+        </p:sp>
+        <p:sp>
+          <p:nvSpPr>
+            <p:cNvPr id="63" name="&lt;language&gt;">
+              <a:extLst>
+                <a:ext uri="{FF2B5EF4-FFF2-40B4-BE49-F238E27FC236}">
+                  <a16:creationId xmlns:a16="http://schemas.microsoft.com/office/drawing/2014/main" id="{FF6435D5-F9CA-4164-BF62-1280A5487182}"/>
+                </a:ext>
+              </a:extLst>
+            </p:cNvPr>
+            <p:cNvSpPr txBox="1"/>
+            <p:nvPr/>
+          </p:nvSpPr>
+          <p:spPr>
+            <a:xfrm rot="20160000">
+              <a:off x="4381402" y="6078219"/>
+              <a:ext cx="2729914" cy="348813"/>
+            </a:xfrm>
+            <a:prstGeom prst="rect">
+              <a:avLst/>
+            </a:prstGeom>
+            <a:noFill/>
+            <a:ln w="12700">
+              <a:miter lim="400000"/>
+            </a:ln>
+            <a:extLst>
+              <a:ext uri="{C572A759-6A51-4108-AA02-DFA0A04FC94B}">
+                <ma14:wrappingTextBoxFlag xmlns:ma14="http://schemas.microsoft.com/office/mac/drawingml/2011/main" xmlns:a14="http://schemas.microsoft.com/office/drawing/2010/main" xmlns:m="http://schemas.openxmlformats.org/officeDocument/2006/math" xmlns="" val="1"/>
+              </a:ext>
+            </a:extLst>
+          </p:spPr>
+          <p:txBody>
+            <a:bodyPr wrap="none" lIns="50800" tIns="50800" rIns="50800" bIns="50800" anchor="ctr">
+              <a:spAutoFit/>
+            </a:bodyPr>
+            <a:lstStyle>
+              <a:lvl1pPr>
+                <a:defRPr sz="1600" b="1">
+                  <a:latin typeface="+mn-lt"/>
+                  <a:ea typeface="+mn-ea"/>
+                  <a:cs typeface="+mn-cs"/>
+                  <a:sym typeface="Helvetica Neue"/>
+                </a:defRPr>
+              </a:lvl1pPr>
+            </a:lstStyle>
+            <a:p>
+              <a:r>
+                <a:rPr lang="en-CA" dirty="0">
+                  <a:solidFill>
+                    <a:srgbClr val="BAF0FF"/>
+                  </a:solidFill>
+                </a:rPr>
+                <a:t>&lt;localized attribute labels&gt;</a:t>
+              </a:r>
+              <a:endParaRPr dirty="0">
+                <a:solidFill>
+                  <a:srgbClr val="BAF0FF"/>
+                </a:solidFill>
+              </a:endParaRPr>
+            </a:p>
+          </p:txBody>
+        </p:sp>
+      </p:grpSp>
+      <p:grpSp>
+        <p:nvGrpSpPr>
+          <p:cNvPr id="14" name="Group 13">
+            <a:extLst>
+              <a:ext uri="{FF2B5EF4-FFF2-40B4-BE49-F238E27FC236}">
+                <a16:creationId xmlns:a16="http://schemas.microsoft.com/office/drawing/2014/main" id="{225CA906-2E81-44C9-A51A-456A8724F345}"/>
+              </a:ext>
+            </a:extLst>
+          </p:cNvPr>
+          <p:cNvGrpSpPr/>
+          <p:nvPr/>
+        </p:nvGrpSpPr>
+        <p:grpSpPr>
+          <a:xfrm>
+            <a:off x="2891231" y="5253948"/>
+            <a:ext cx="5862244" cy="1197475"/>
+            <a:chOff x="2028173" y="4907969"/>
+            <a:chExt cx="5862244" cy="1197475"/>
+          </a:xfrm>
+        </p:grpSpPr>
+        <p:sp>
+          <p:nvSpPr>
+            <p:cNvPr id="159" name="Shape"/>
+            <p:cNvSpPr/>
+            <p:nvPr/>
+          </p:nvSpPr>
+          <p:spPr>
+            <a:xfrm rot="20874979">
+              <a:off x="2028173" y="4907969"/>
+              <a:ext cx="5862244" cy="1197475"/>
+            </a:xfrm>
+            <a:custGeom>
+              <a:avLst/>
+              <a:gdLst/>
+              <a:ahLst/>
+              <a:cxnLst>
+                <a:cxn ang="0">
+                  <a:pos x="wd2" y="hd2"/>
+                </a:cxn>
+                <a:cxn ang="5400000">
+                  <a:pos x="wd2" y="hd2"/>
+                </a:cxn>
+                <a:cxn ang="10800000">
+                  <a:pos x="wd2" y="hd2"/>
+                </a:cxn>
+                <a:cxn ang="16200000">
+                  <a:pos x="wd2" y="hd2"/>
+                </a:cxn>
+              </a:cxnLst>
+              <a:rect l="0" t="0" r="r" b="b"/>
+              <a:pathLst>
+                <a:path w="21600" h="21600" extrusionOk="0">
+                  <a:moveTo>
+                    <a:pt x="0" y="10800"/>
+                  </a:moveTo>
+                  <a:lnTo>
+                    <a:pt x="10800" y="21600"/>
+                  </a:lnTo>
+                  <a:lnTo>
+                    <a:pt x="21600" y="10800"/>
+                  </a:lnTo>
+                  <a:lnTo>
+                    <a:pt x="10800" y="0"/>
+                  </a:lnTo>
+                  <a:close/>
+                </a:path>
+              </a:pathLst>
+            </a:custGeom>
+            <a:solidFill>
+              <a:schemeClr val="accent2">
+                <a:lumMod val="60000"/>
+                <a:lumOff val="40000"/>
+              </a:schemeClr>
+            </a:solidFill>
+            <a:ln w="25400">
+              <a:solidFill>
+                <a:srgbClr val="000000"/>
+              </a:solidFill>
+              <a:miter lim="400000"/>
+            </a:ln>
+            <a:effectLst>
+              <a:outerShdw blurRad="63500" dist="126055" dir="5400000" rotWithShape="0">
+                <a:srgbClr val="000000">
+                  <a:alpha val="50000"/>
+                </a:srgbClr>
+              </a:outerShdw>
+            </a:effectLst>
+          </p:spPr>
+          <p:txBody>
+            <a:bodyPr lIns="50800" tIns="50800" rIns="50800" bIns="50800" anchor="ctr"/>
+            <a:lstStyle/>
+            <a:p>
+              <a:pPr>
+                <a:defRPr sz="2200">
+                  <a:solidFill>
+                    <a:srgbClr val="FFFFFF"/>
+                  </a:solidFill>
+                  <a:latin typeface="Helvetica Neue Medium"/>
+                  <a:ea typeface="Helvetica Neue Medium"/>
+                  <a:cs typeface="Helvetica Neue Medium"/>
+                  <a:sym typeface="Helvetica Neue Medium"/>
+                </a:defRPr>
+              </a:pPr>
+              <a:endParaRPr dirty="0"/>
+            </a:p>
+          </p:txBody>
+        </p:sp>
+        <p:sp>
+          <p:nvSpPr>
+            <p:cNvPr id="162" name="Entry"/>
+            <p:cNvSpPr txBox="1"/>
+            <p:nvPr/>
+          </p:nvSpPr>
+          <p:spPr>
+            <a:xfrm>
+              <a:off x="3496767" y="5651444"/>
+              <a:ext cx="1014701" cy="425758"/>
+            </a:xfrm>
+            <a:prstGeom prst="rect">
+              <a:avLst/>
+            </a:prstGeom>
+            <a:noFill/>
+            <a:ln w="12700">
+              <a:miter lim="400000"/>
+            </a:ln>
+            <a:extLst>
+              <a:ext uri="{C572A759-6A51-4108-AA02-DFA0A04FC94B}">
+                <ma14:wrappingTextBoxFlag xmlns:ma14="http://schemas.microsoft.com/office/mac/drawingml/2011/main" xmlns:a14="http://schemas.microsoft.com/office/drawing/2010/main" xmlns:m="http://schemas.openxmlformats.org/officeDocument/2006/math" xmlns="" val="1"/>
+              </a:ext>
+            </a:extLst>
+          </p:spPr>
+          <p:txBody>
+            <a:bodyPr wrap="none" lIns="50800" tIns="50800" rIns="50800" bIns="50800" anchor="ctr">
+              <a:spAutoFit/>
+            </a:bodyPr>
+            <a:lstStyle>
+              <a:lvl1pPr>
+                <a:defRPr sz="2100" b="1" i="1">
+                  <a:solidFill>
+                    <a:srgbClr val="FFFFFF"/>
+                  </a:solidFill>
+                  <a:latin typeface="+mn-lt"/>
+                  <a:ea typeface="+mn-ea"/>
+                  <a:cs typeface="+mn-cs"/>
+                  <a:sym typeface="Helvetica Neue"/>
+                </a:defRPr>
+              </a:lvl1pPr>
+            </a:lstStyle>
+            <a:p>
+              <a:r>
+                <a:rPr lang="en-CA" dirty="0">
+                  <a:solidFill>
+                    <a:srgbClr val="5E5E5E"/>
+                  </a:solidFill>
+                </a:rPr>
+                <a:t>Format</a:t>
+              </a:r>
+              <a:endParaRPr dirty="0">
+                <a:solidFill>
+                  <a:srgbClr val="5E5E5E"/>
+                </a:solidFill>
+              </a:endParaRPr>
+            </a:p>
+          </p:txBody>
+        </p:sp>
+        <p:sp>
+          <p:nvSpPr>
+            <p:cNvPr id="183" name="Oval"/>
+            <p:cNvSpPr/>
+            <p:nvPr/>
+          </p:nvSpPr>
+          <p:spPr>
+            <a:xfrm>
+              <a:off x="7158616" y="4941664"/>
+              <a:ext cx="272031" cy="96525"/>
+            </a:xfrm>
+            <a:prstGeom prst="ellipse">
+              <a:avLst/>
+            </a:prstGeom>
+            <a:solidFill>
+              <a:schemeClr val="bg1"/>
+            </a:solidFill>
+            <a:ln w="25400">
+              <a:solidFill>
+                <a:srgbClr val="5E5E5E"/>
+              </a:solidFill>
+              <a:miter lim="400000"/>
+            </a:ln>
+          </p:spPr>
+          <p:txBody>
+            <a:bodyPr lIns="50800" tIns="50800" rIns="50800" bIns="50800" anchor="ctr"/>
+            <a:lstStyle/>
+            <a:p>
+              <a:pPr>
+                <a:defRPr sz="2200">
+                  <a:solidFill>
+                    <a:srgbClr val="FFFFFF"/>
+                  </a:solidFill>
+                  <a:latin typeface="Helvetica Neue Medium"/>
+                  <a:ea typeface="Helvetica Neue Medium"/>
+                  <a:cs typeface="Helvetica Neue Medium"/>
+                  <a:sym typeface="Helvetica Neue Medium"/>
+                </a:defRPr>
+              </a:pPr>
+              <a:endParaRPr dirty="0"/>
+            </a:p>
+          </p:txBody>
+        </p:sp>
+        <p:sp>
+          <p:nvSpPr>
+            <p:cNvPr id="189" name="&lt;language&gt;"/>
+            <p:cNvSpPr txBox="1"/>
+            <p:nvPr/>
+          </p:nvSpPr>
+          <p:spPr>
+            <a:xfrm rot="20160000">
+              <a:off x="4628771" y="5391450"/>
+              <a:ext cx="2636940" cy="348813"/>
+            </a:xfrm>
+            <a:prstGeom prst="rect">
+              <a:avLst/>
+            </a:prstGeom>
+            <a:noFill/>
+            <a:ln w="12700">
+              <a:miter lim="400000"/>
+            </a:ln>
+            <a:extLst>
+              <a:ext uri="{C572A759-6A51-4108-AA02-DFA0A04FC94B}">
+                <ma14:wrappingTextBoxFlag xmlns:ma14="http://schemas.microsoft.com/office/mac/drawingml/2011/main" xmlns:a14="http://schemas.microsoft.com/office/drawing/2010/main" xmlns:m="http://schemas.openxmlformats.org/officeDocument/2006/math" xmlns="" val="1"/>
+              </a:ext>
+            </a:extLst>
+          </p:spPr>
+          <p:txBody>
+            <a:bodyPr wrap="none" lIns="50800" tIns="50800" rIns="50800" bIns="50800" anchor="ctr">
+              <a:spAutoFit/>
+            </a:bodyPr>
+            <a:lstStyle>
+              <a:lvl1pPr>
+                <a:defRPr sz="1600" b="1">
+                  <a:latin typeface="+mn-lt"/>
+                  <a:ea typeface="+mn-ea"/>
+                  <a:cs typeface="+mn-cs"/>
+                  <a:sym typeface="Helvetica Neue"/>
+                </a:defRPr>
+              </a:lvl1pPr>
+            </a:lstStyle>
+            <a:p>
+              <a:r>
+                <a:rPr lang="en-CA" dirty="0">
+                  <a:solidFill>
+                    <a:srgbClr val="5E5E5E"/>
+                  </a:solidFill>
+                </a:rPr>
+                <a:t>&lt;field value presentation&gt;</a:t>
+              </a:r>
+              <a:endParaRPr dirty="0">
+                <a:solidFill>
+                  <a:srgbClr val="5E5E5E"/>
+                </a:solidFill>
+              </a:endParaRPr>
+            </a:p>
+          </p:txBody>
+        </p:sp>
+      </p:grpSp>
+      <p:grpSp>
+        <p:nvGrpSpPr>
+          <p:cNvPr id="13" name="Group 12">
+            <a:extLst>
+              <a:ext uri="{FF2B5EF4-FFF2-40B4-BE49-F238E27FC236}">
+                <a16:creationId xmlns:a16="http://schemas.microsoft.com/office/drawing/2014/main" id="{EDE1E7C9-433A-40BD-87AF-2EC904C392C0}"/>
+              </a:ext>
+            </a:extLst>
+          </p:cNvPr>
+          <p:cNvGrpSpPr/>
+          <p:nvPr/>
+        </p:nvGrpSpPr>
+        <p:grpSpPr>
+          <a:xfrm>
+            <a:off x="3036836" y="4683680"/>
+            <a:ext cx="5862244" cy="1197475"/>
+            <a:chOff x="2221904" y="4193323"/>
+            <a:chExt cx="5862244" cy="1197475"/>
+          </a:xfrm>
+        </p:grpSpPr>
+        <p:sp>
+          <p:nvSpPr>
+            <p:cNvPr id="52" name="Shape">
+              <a:extLst>
+                <a:ext uri="{FF2B5EF4-FFF2-40B4-BE49-F238E27FC236}">
+                  <a16:creationId xmlns:a16="http://schemas.microsoft.com/office/drawing/2014/main" id="{D6F51723-6328-4209-AC2E-7C44165D10FE}"/>
+                </a:ext>
+              </a:extLst>
+            </p:cNvPr>
+            <p:cNvSpPr/>
+            <p:nvPr/>
+          </p:nvSpPr>
+          <p:spPr>
+            <a:xfrm rot="20874979">
+              <a:off x="2221904" y="4193323"/>
+              <a:ext cx="5862244" cy="1197475"/>
+            </a:xfrm>
+            <a:custGeom>
+              <a:avLst/>
+              <a:gdLst/>
+              <a:ahLst/>
+              <a:cxnLst>
+                <a:cxn ang="0">
+                  <a:pos x="wd2" y="hd2"/>
+                </a:cxn>
+                <a:cxn ang="5400000">
+                  <a:pos x="wd2" y="hd2"/>
+                </a:cxn>
+                <a:cxn ang="10800000">
+                  <a:pos x="wd2" y="hd2"/>
+                </a:cxn>
+                <a:cxn ang="16200000">
+                  <a:pos x="wd2" y="hd2"/>
+                </a:cxn>
+              </a:cxnLst>
+              <a:rect l="0" t="0" r="r" b="b"/>
+              <a:pathLst>
+                <a:path w="21600" h="21600" extrusionOk="0">
+                  <a:moveTo>
+                    <a:pt x="0" y="10800"/>
+                  </a:moveTo>
+                  <a:lnTo>
+                    <a:pt x="10800" y="21600"/>
+                  </a:lnTo>
+                  <a:lnTo>
+                    <a:pt x="21600" y="10800"/>
+                  </a:lnTo>
+                  <a:lnTo>
+                    <a:pt x="10800" y="0"/>
+                  </a:lnTo>
+                  <a:close/>
+                </a:path>
+              </a:pathLst>
+            </a:custGeom>
+            <a:solidFill>
+              <a:schemeClr val="accent2">
+                <a:lumMod val="40000"/>
+                <a:lumOff val="60000"/>
+              </a:schemeClr>
+            </a:solidFill>
+            <a:ln w="25400">
+              <a:solidFill>
+                <a:srgbClr val="000000"/>
+              </a:solidFill>
+              <a:miter lim="400000"/>
+            </a:ln>
+            <a:effectLst>
+              <a:outerShdw blurRad="63500" dist="126055" dir="5400000" rotWithShape="0">
+                <a:srgbClr val="000000">
+                  <a:alpha val="50000"/>
+                </a:srgbClr>
+              </a:outerShdw>
+            </a:effectLst>
+          </p:spPr>
+          <p:txBody>
+            <a:bodyPr lIns="50800" tIns="50800" rIns="50800" bIns="50800" anchor="ctr"/>
+            <a:lstStyle/>
+            <a:p>
+              <a:pPr>
+                <a:defRPr sz="2200">
+                  <a:solidFill>
+                    <a:srgbClr val="FFFFFF"/>
+                  </a:solidFill>
+                  <a:latin typeface="Helvetica Neue Medium"/>
+                  <a:ea typeface="Helvetica Neue Medium"/>
+                  <a:cs typeface="Helvetica Neue Medium"/>
+                  <a:sym typeface="Helvetica Neue Medium"/>
+                </a:defRPr>
+              </a:pPr>
+              <a:endParaRPr dirty="0"/>
+            </a:p>
+          </p:txBody>
+        </p:sp>
+        <p:sp>
+          <p:nvSpPr>
+            <p:cNvPr id="56" name="Entry">
+              <a:extLst>
+                <a:ext uri="{FF2B5EF4-FFF2-40B4-BE49-F238E27FC236}">
+                  <a16:creationId xmlns:a16="http://schemas.microsoft.com/office/drawing/2014/main" id="{A509F1D2-3B22-4A99-8006-1FB18EF4D204}"/>
+                </a:ext>
+              </a:extLst>
+            </p:cNvPr>
+            <p:cNvSpPr txBox="1"/>
+            <p:nvPr/>
+          </p:nvSpPr>
+          <p:spPr>
+            <a:xfrm>
+              <a:off x="3799854" y="4937645"/>
+              <a:ext cx="795987" cy="424064"/>
+            </a:xfrm>
+            <a:prstGeom prst="rect">
+              <a:avLst/>
+            </a:prstGeom>
+            <a:noFill/>
+            <a:ln w="12700">
+              <a:miter lim="400000"/>
+            </a:ln>
+            <a:extLst>
+              <a:ext uri="{C572A759-6A51-4108-AA02-DFA0A04FC94B}">
+                <ma14:wrappingTextBoxFlag xmlns:ma14="http://schemas.microsoft.com/office/mac/drawingml/2011/main" xmlns:a14="http://schemas.microsoft.com/office/drawing/2010/main" xmlns:m="http://schemas.openxmlformats.org/officeDocument/2006/math" xmlns="" val="1"/>
+              </a:ext>
+            </a:extLst>
+          </p:spPr>
+          <p:txBody>
+            <a:bodyPr wrap="none" lIns="50800" tIns="50800" rIns="50800" bIns="50800" anchor="ctr">
+              <a:spAutoFit/>
+            </a:bodyPr>
+            <a:lstStyle>
+              <a:lvl1pPr>
+                <a:defRPr sz="2100" b="1" i="1">
+                  <a:solidFill>
+                    <a:srgbClr val="FFFFFF"/>
+                  </a:solidFill>
+                  <a:latin typeface="+mn-lt"/>
+                  <a:ea typeface="+mn-ea"/>
+                  <a:cs typeface="+mn-cs"/>
+                  <a:sym typeface="Helvetica Neue"/>
+                </a:defRPr>
+              </a:lvl1pPr>
+            </a:lstStyle>
+            <a:p>
+              <a:r>
+                <a:rPr dirty="0">
+                  <a:solidFill>
+                    <a:srgbClr val="5E5E5E"/>
+                  </a:solidFill>
+                </a:rPr>
+                <a:t>Entry</a:t>
+              </a:r>
+            </a:p>
+          </p:txBody>
+        </p:sp>
+        <p:sp>
+          <p:nvSpPr>
+            <p:cNvPr id="57" name="Oval">
+              <a:extLst>
+                <a:ext uri="{FF2B5EF4-FFF2-40B4-BE49-F238E27FC236}">
+                  <a16:creationId xmlns:a16="http://schemas.microsoft.com/office/drawing/2014/main" id="{8E5375DE-4119-4BE5-A1FC-4E33DE6E952A}"/>
+                </a:ext>
+              </a:extLst>
+            </p:cNvPr>
+            <p:cNvSpPr/>
+            <p:nvPr/>
+          </p:nvSpPr>
+          <p:spPr>
+            <a:xfrm>
+              <a:off x="7352347" y="4227018"/>
+              <a:ext cx="272031" cy="96525"/>
+            </a:xfrm>
+            <a:prstGeom prst="ellipse">
+              <a:avLst/>
+            </a:prstGeom>
+            <a:solidFill>
+              <a:schemeClr val="bg1"/>
+            </a:solidFill>
+            <a:ln w="25400">
+              <a:solidFill>
+                <a:srgbClr val="5E5E5E"/>
+              </a:solidFill>
+              <a:miter lim="400000"/>
+            </a:ln>
+          </p:spPr>
+          <p:txBody>
+            <a:bodyPr lIns="50800" tIns="50800" rIns="50800" bIns="50800" anchor="ctr"/>
+            <a:lstStyle/>
+            <a:p>
+              <a:pPr>
+                <a:defRPr sz="2200">
+                  <a:solidFill>
+                    <a:srgbClr val="FFFFFF"/>
+                  </a:solidFill>
+                  <a:latin typeface="Helvetica Neue Medium"/>
+                  <a:ea typeface="Helvetica Neue Medium"/>
+                  <a:cs typeface="Helvetica Neue Medium"/>
+                  <a:sym typeface="Helvetica Neue Medium"/>
+                </a:defRPr>
+              </a:pPr>
+              <a:endParaRPr dirty="0"/>
+            </a:p>
+          </p:txBody>
+        </p:sp>
+        <p:sp>
+          <p:nvSpPr>
+            <p:cNvPr id="58" name="&lt;language&gt;">
+              <a:extLst>
+                <a:ext uri="{FF2B5EF4-FFF2-40B4-BE49-F238E27FC236}">
+                  <a16:creationId xmlns:a16="http://schemas.microsoft.com/office/drawing/2014/main" id="{E9DF7CC1-1D39-4E85-83A0-BFDD3F2AAEA7}"/>
+                </a:ext>
+              </a:extLst>
+            </p:cNvPr>
+            <p:cNvSpPr txBox="1"/>
+            <p:nvPr/>
+          </p:nvSpPr>
+          <p:spPr>
+            <a:xfrm rot="20160000">
+              <a:off x="4883028" y="4638704"/>
+              <a:ext cx="2568011" cy="348813"/>
+            </a:xfrm>
+            <a:prstGeom prst="rect">
+              <a:avLst/>
+            </a:prstGeom>
+            <a:noFill/>
+            <a:ln w="12700">
+              <a:miter lim="400000"/>
+            </a:ln>
+            <a:extLst>
+              <a:ext uri="{C572A759-6A51-4108-AA02-DFA0A04FC94B}">
+                <ma14:wrappingTextBoxFlag xmlns:ma14="http://schemas.microsoft.com/office/mac/drawingml/2011/main" xmlns:a14="http://schemas.microsoft.com/office/drawing/2010/main" xmlns:m="http://schemas.openxmlformats.org/officeDocument/2006/math" xmlns="" val="1"/>
+              </a:ext>
+            </a:extLst>
+          </p:spPr>
+          <p:txBody>
+            <a:bodyPr wrap="none" lIns="50800" tIns="50800" rIns="50800" bIns="50800" anchor="ctr">
+              <a:spAutoFit/>
+            </a:bodyPr>
+            <a:lstStyle>
+              <a:lvl1pPr>
+                <a:defRPr sz="1600" b="1">
+                  <a:latin typeface="+mn-lt"/>
+                  <a:ea typeface="+mn-ea"/>
+                  <a:cs typeface="+mn-cs"/>
+                  <a:sym typeface="Helvetica Neue"/>
+                </a:defRPr>
+              </a:lvl1pPr>
+            </a:lstStyle>
+            <a:p>
+              <a:r>
+                <a:rPr lang="en-CA" dirty="0">
+                  <a:solidFill>
+                    <a:srgbClr val="5E5E5E"/>
+                  </a:solidFill>
+                </a:rPr>
+                <a:t>&lt;predefined field values&gt;</a:t>
+              </a:r>
+              <a:endParaRPr dirty="0">
+                <a:solidFill>
+                  <a:srgbClr val="5E5E5E"/>
+                </a:solidFill>
+              </a:endParaRPr>
+            </a:p>
+          </p:txBody>
+        </p:sp>
+      </p:grpSp>
+      <p:grpSp>
+        <p:nvGrpSpPr>
+          <p:cNvPr id="16" name="Group 15">
+            <a:extLst>
+              <a:ext uri="{FF2B5EF4-FFF2-40B4-BE49-F238E27FC236}">
+                <a16:creationId xmlns:a16="http://schemas.microsoft.com/office/drawing/2014/main" id="{D2659150-2FE6-4CC6-9F69-81698C7DEC80}"/>
+              </a:ext>
+            </a:extLst>
+          </p:cNvPr>
+          <p:cNvGrpSpPr/>
+          <p:nvPr/>
+        </p:nvGrpSpPr>
+        <p:grpSpPr>
+          <a:xfrm>
+            <a:off x="10095096" y="4083344"/>
+            <a:ext cx="656590" cy="3591396"/>
+            <a:chOff x="8934724" y="4733045"/>
+            <a:chExt cx="656590" cy="3591396"/>
+          </a:xfrm>
+        </p:grpSpPr>
+        <p:sp>
+          <p:nvSpPr>
+            <p:cNvPr id="168" name="Core"/>
+            <p:cNvSpPr txBox="1"/>
+            <p:nvPr/>
+          </p:nvSpPr>
+          <p:spPr>
+            <a:xfrm rot="16200000">
+              <a:off x="8292111" y="6200128"/>
+              <a:ext cx="1941815" cy="656590"/>
+            </a:xfrm>
+            <a:prstGeom prst="rect">
+              <a:avLst/>
+            </a:prstGeom>
+            <a:ln w="12700">
+              <a:miter lim="400000"/>
+            </a:ln>
+            <a:extLst>
+              <a:ext uri="{C572A759-6A51-4108-AA02-DFA0A04FC94B}">
+                <ma14:wrappingTextBoxFlag xmlns:ma14="http://schemas.microsoft.com/office/mac/drawingml/2011/main" xmlns:a14="http://schemas.microsoft.com/office/drawing/2010/main" xmlns:m="http://schemas.openxmlformats.org/officeDocument/2006/math" xmlns="" val="1"/>
+              </a:ext>
+            </a:extLst>
+          </p:spPr>
+          <p:txBody>
+            <a:bodyPr wrap="square" lIns="50800" tIns="50800" rIns="50800" bIns="50800" anchor="ctr">
+              <a:spAutoFit/>
+            </a:bodyPr>
+            <a:lstStyle>
+              <a:lvl1pPr>
+                <a:defRPr sz="1800" b="1">
+                  <a:latin typeface="+mn-lt"/>
+                  <a:ea typeface="+mn-ea"/>
+                  <a:cs typeface="+mn-cs"/>
+                  <a:sym typeface="Helvetica Neue"/>
+                </a:defRPr>
+              </a:lvl1pPr>
+            </a:lstStyle>
+            <a:p>
+              <a:r>
+                <a:rPr lang="en-CA" dirty="0"/>
+                <a:t>Application Layer</a:t>
+              </a:r>
+              <a:endParaRPr dirty="0"/>
+            </a:p>
+          </p:txBody>
+        </p:sp>
+        <p:sp>
+          <p:nvSpPr>
+            <p:cNvPr id="75" name="Line">
+              <a:extLst>
+                <a:ext uri="{FF2B5EF4-FFF2-40B4-BE49-F238E27FC236}">
+                  <a16:creationId xmlns:a16="http://schemas.microsoft.com/office/drawing/2014/main" id="{12737488-4215-49EC-9532-644E471F5F1C}"/>
+                </a:ext>
+              </a:extLst>
+            </p:cNvPr>
+            <p:cNvSpPr/>
+            <p:nvPr/>
+          </p:nvSpPr>
+          <p:spPr>
+            <a:xfrm flipH="1" flipV="1">
+              <a:off x="8954949" y="4733045"/>
+              <a:ext cx="0" cy="3591396"/>
+            </a:xfrm>
+            <a:prstGeom prst="line">
+              <a:avLst/>
+            </a:prstGeom>
+            <a:ln w="25400">
+              <a:solidFill>
+                <a:srgbClr val="000000"/>
+              </a:solidFill>
+              <a:miter lim="400000"/>
+              <a:headEnd type="triangle"/>
+              <a:tailEnd type="triangle"/>
+            </a:ln>
+          </p:spPr>
+          <p:txBody>
+            <a:bodyPr lIns="45718" tIns="45718" rIns="45718" bIns="45718"/>
+            <a:lstStyle/>
+            <a:p>
+              <a:endParaRPr dirty="0"/>
+            </a:p>
+          </p:txBody>
+        </p:sp>
+      </p:grpSp>
+      <p:grpSp>
+        <p:nvGrpSpPr>
+          <p:cNvPr id="17" name="Group 16">
+            <a:extLst>
+              <a:ext uri="{FF2B5EF4-FFF2-40B4-BE49-F238E27FC236}">
+                <a16:creationId xmlns:a16="http://schemas.microsoft.com/office/drawing/2014/main" id="{B58BE24B-B51F-4FBD-82A3-C4D78CE79F0D}"/>
+              </a:ext>
+            </a:extLst>
+          </p:cNvPr>
+          <p:cNvGrpSpPr/>
+          <p:nvPr/>
+        </p:nvGrpSpPr>
+        <p:grpSpPr>
+          <a:xfrm>
+            <a:off x="10081217" y="7789932"/>
+            <a:ext cx="676893" cy="1941815"/>
+            <a:chOff x="11017638" y="3466133"/>
+            <a:chExt cx="676893" cy="1941815"/>
+          </a:xfrm>
+        </p:grpSpPr>
+        <p:sp>
+          <p:nvSpPr>
+            <p:cNvPr id="55" name="Core">
+              <a:extLst>
+                <a:ext uri="{FF2B5EF4-FFF2-40B4-BE49-F238E27FC236}">
+                  <a16:creationId xmlns:a16="http://schemas.microsoft.com/office/drawing/2014/main" id="{8CFC2437-0147-4B10-9BE8-667805DC4D24}"/>
+                </a:ext>
+              </a:extLst>
+            </p:cNvPr>
+            <p:cNvSpPr txBox="1"/>
+            <p:nvPr/>
+          </p:nvSpPr>
+          <p:spPr>
+            <a:xfrm rot="16200000">
+              <a:off x="10395328" y="4108746"/>
+              <a:ext cx="1941815" cy="656590"/>
+            </a:xfrm>
+            <a:prstGeom prst="rect">
+              <a:avLst/>
+            </a:prstGeom>
+            <a:ln w="12700">
+              <a:miter lim="400000"/>
+            </a:ln>
+            <a:extLst>
+              <a:ext uri="{C572A759-6A51-4108-AA02-DFA0A04FC94B}">
+                <ma14:wrappingTextBoxFlag xmlns:ma14="http://schemas.microsoft.com/office/mac/drawingml/2011/main" xmlns:a14="http://schemas.microsoft.com/office/drawing/2010/main" xmlns:m="http://schemas.openxmlformats.org/officeDocument/2006/math" xmlns="" val="1"/>
+              </a:ext>
+            </a:extLst>
+          </p:spPr>
+          <p:txBody>
+            <a:bodyPr wrap="square" lIns="50800" tIns="50800" rIns="50800" bIns="50800" anchor="ctr">
+              <a:spAutoFit/>
+            </a:bodyPr>
+            <a:lstStyle>
+              <a:lvl1pPr>
+                <a:defRPr sz="1800" b="1">
+                  <a:latin typeface="+mn-lt"/>
+                  <a:ea typeface="+mn-ea"/>
+                  <a:cs typeface="+mn-cs"/>
+                  <a:sym typeface="Helvetica Neue"/>
+                </a:defRPr>
+              </a:lvl1pPr>
+            </a:lstStyle>
+            <a:p>
+              <a:r>
+                <a:rPr lang="en-CA" dirty="0"/>
+                <a:t>Technology Layer</a:t>
+              </a:r>
+              <a:endParaRPr dirty="0"/>
+            </a:p>
+          </p:txBody>
+        </p:sp>
+        <p:sp>
+          <p:nvSpPr>
+            <p:cNvPr id="77" name="Line">
+              <a:extLst>
+                <a:ext uri="{FF2B5EF4-FFF2-40B4-BE49-F238E27FC236}">
+                  <a16:creationId xmlns:a16="http://schemas.microsoft.com/office/drawing/2014/main" id="{C62E3AE9-1356-4AA4-9C29-F7DBB998B902}"/>
+                </a:ext>
+              </a:extLst>
+            </p:cNvPr>
+            <p:cNvSpPr/>
+            <p:nvPr/>
+          </p:nvSpPr>
+          <p:spPr>
+            <a:xfrm flipV="1">
+              <a:off x="11017638" y="3573671"/>
+              <a:ext cx="15034" cy="1719087"/>
+            </a:xfrm>
+            <a:prstGeom prst="line">
+              <a:avLst/>
+            </a:prstGeom>
+            <a:ln w="25400">
+              <a:solidFill>
+                <a:srgbClr val="000000"/>
+              </a:solidFill>
+              <a:miter lim="400000"/>
+              <a:headEnd type="triangle"/>
+              <a:tailEnd type="triangle"/>
+            </a:ln>
+          </p:spPr>
+          <p:txBody>
+            <a:bodyPr lIns="45718" tIns="45718" rIns="45718" bIns="45718"/>
+            <a:lstStyle/>
+            <a:p>
+              <a:endParaRPr dirty="0"/>
+            </a:p>
+          </p:txBody>
+        </p:sp>
+      </p:grpSp>
+      <p:grpSp>
+        <p:nvGrpSpPr>
+          <p:cNvPr id="97" name="Group 96">
+            <a:extLst>
+              <a:ext uri="{FF2B5EF4-FFF2-40B4-BE49-F238E27FC236}">
+                <a16:creationId xmlns:a16="http://schemas.microsoft.com/office/drawing/2014/main" id="{C7777CB9-C26B-4AAE-BBF2-AE09DFF3DC50}"/>
+              </a:ext>
+            </a:extLst>
+          </p:cNvPr>
+          <p:cNvGrpSpPr/>
+          <p:nvPr/>
+        </p:nvGrpSpPr>
+        <p:grpSpPr>
+          <a:xfrm>
+            <a:off x="2132737" y="8180061"/>
+            <a:ext cx="5862244" cy="1197475"/>
+            <a:chOff x="2858201" y="2101616"/>
+            <a:chExt cx="5862244" cy="1197475"/>
+          </a:xfrm>
+        </p:grpSpPr>
+        <p:sp>
+          <p:nvSpPr>
+            <p:cNvPr id="98" name="Shape">
+              <a:extLst>
+                <a:ext uri="{FF2B5EF4-FFF2-40B4-BE49-F238E27FC236}">
+                  <a16:creationId xmlns:a16="http://schemas.microsoft.com/office/drawing/2014/main" id="{CFEFFD8F-A2A3-40B4-9607-4E2CFCAC2A16}"/>
+                </a:ext>
+              </a:extLst>
+            </p:cNvPr>
+            <p:cNvSpPr/>
+            <p:nvPr/>
+          </p:nvSpPr>
+          <p:spPr>
+            <a:xfrm rot="20874979">
+              <a:off x="2858201" y="2101616"/>
+              <a:ext cx="5862244" cy="1197475"/>
+            </a:xfrm>
+            <a:custGeom>
+              <a:avLst/>
+              <a:gdLst/>
+              <a:ahLst/>
+              <a:cxnLst>
+                <a:cxn ang="0">
+                  <a:pos x="wd2" y="hd2"/>
+                </a:cxn>
+                <a:cxn ang="5400000">
+                  <a:pos x="wd2" y="hd2"/>
+                </a:cxn>
+                <a:cxn ang="10800000">
+                  <a:pos x="wd2" y="hd2"/>
+                </a:cxn>
+                <a:cxn ang="16200000">
+                  <a:pos x="wd2" y="hd2"/>
+                </a:cxn>
+              </a:cxnLst>
+              <a:rect l="0" t="0" r="r" b="b"/>
+              <a:pathLst>
+                <a:path w="21600" h="21600" extrusionOk="0">
+                  <a:moveTo>
+                    <a:pt x="0" y="10800"/>
+                  </a:moveTo>
+                  <a:lnTo>
+                    <a:pt x="10800" y="21600"/>
+                  </a:lnTo>
+                  <a:lnTo>
+                    <a:pt x="21600" y="10800"/>
+                  </a:lnTo>
+                  <a:lnTo>
+                    <a:pt x="10800" y="0"/>
+                  </a:lnTo>
+                  <a:close/>
+                </a:path>
+              </a:pathLst>
+            </a:custGeom>
+            <a:solidFill>
+              <a:schemeClr val="accent3">
+                <a:lumMod val="75000"/>
+              </a:schemeClr>
+            </a:solidFill>
+            <a:ln w="25400">
+              <a:solidFill>
+                <a:srgbClr val="5E5E5E"/>
+              </a:solidFill>
+              <a:miter lim="400000"/>
+            </a:ln>
+            <a:effectLst>
+              <a:outerShdw blurRad="63500" dist="129819" dir="5400000" rotWithShape="0">
+                <a:srgbClr val="000000">
+                  <a:alpha val="50000"/>
+                </a:srgbClr>
+              </a:outerShdw>
+            </a:effectLst>
+          </p:spPr>
+          <p:txBody>
+            <a:bodyPr lIns="50800" tIns="50800" rIns="50800" bIns="50800" anchor="ctr"/>
+            <a:lstStyle/>
+            <a:p>
+              <a:pPr>
+                <a:defRPr sz="2200">
+                  <a:solidFill>
+                    <a:srgbClr val="FFFFFF"/>
+                  </a:solidFill>
+                  <a:latin typeface="Helvetica Neue Medium"/>
+                  <a:ea typeface="Helvetica Neue Medium"/>
+                  <a:cs typeface="Helvetica Neue Medium"/>
+                  <a:sym typeface="Helvetica Neue Medium"/>
+                </a:defRPr>
+              </a:pPr>
+              <a:endParaRPr dirty="0">
+                <a:solidFill>
+                  <a:srgbClr val="BAF0FF"/>
+                </a:solidFill>
+              </a:endParaRPr>
+            </a:p>
+          </p:txBody>
+        </p:sp>
+        <p:sp>
+          <p:nvSpPr>
+            <p:cNvPr id="99" name="Subset">
+              <a:extLst>
+                <a:ext uri="{FF2B5EF4-FFF2-40B4-BE49-F238E27FC236}">
+                  <a16:creationId xmlns:a16="http://schemas.microsoft.com/office/drawing/2014/main" id="{25124D38-2690-4D7D-8459-2999F5B409C9}"/>
+                </a:ext>
+              </a:extLst>
+            </p:cNvPr>
+            <p:cNvSpPr txBox="1"/>
+            <p:nvPr/>
+          </p:nvSpPr>
+          <p:spPr>
+            <a:xfrm>
+              <a:off x="3534391" y="2846274"/>
+              <a:ext cx="2647127" cy="425758"/>
+            </a:xfrm>
+            <a:prstGeom prst="rect">
+              <a:avLst/>
+            </a:prstGeom>
+            <a:ln w="12700">
+              <a:miter lim="400000"/>
+            </a:ln>
+            <a:extLst>
+              <a:ext uri="{C572A759-6A51-4108-AA02-DFA0A04FC94B}">
+                <ma14:wrappingTextBoxFlag xmlns:ma14="http://schemas.microsoft.com/office/mac/drawingml/2011/main" xmlns:a14="http://schemas.microsoft.com/office/drawing/2010/main" xmlns:m="http://schemas.openxmlformats.org/officeDocument/2006/math" xmlns="" val="1"/>
+              </a:ext>
+            </a:extLst>
+          </p:spPr>
+          <p:txBody>
+            <a:bodyPr wrap="square" lIns="50800" tIns="50800" rIns="50800" bIns="50800" anchor="ctr">
+              <a:spAutoFit/>
+            </a:bodyPr>
+            <a:lstStyle>
+              <a:lvl1pPr>
+                <a:defRPr sz="2100" b="1" i="1">
+                  <a:solidFill>
+                    <a:srgbClr val="5E5E5E"/>
+                  </a:solidFill>
+                  <a:latin typeface="+mn-lt"/>
+                  <a:ea typeface="+mn-ea"/>
+                  <a:cs typeface="+mn-cs"/>
+                  <a:sym typeface="Helvetica Neue"/>
+                </a:defRPr>
+              </a:lvl1pPr>
+            </a:lstStyle>
+            <a:p>
+              <a:r>
+                <a:rPr lang="en-CA" dirty="0">
+                  <a:solidFill>
+                    <a:srgbClr val="BAF0FF"/>
+                  </a:solidFill>
+                </a:rPr>
+                <a:t>Encoding</a:t>
+              </a:r>
+              <a:endParaRPr dirty="0">
+                <a:solidFill>
+                  <a:srgbClr val="BAF0FF"/>
+                </a:solidFill>
+              </a:endParaRPr>
+            </a:p>
+          </p:txBody>
+        </p:sp>
+        <p:sp>
+          <p:nvSpPr>
+            <p:cNvPr id="100" name="Oval">
+              <a:extLst>
+                <a:ext uri="{FF2B5EF4-FFF2-40B4-BE49-F238E27FC236}">
+                  <a16:creationId xmlns:a16="http://schemas.microsoft.com/office/drawing/2014/main" id="{1E69986B-5984-42BF-836B-0E516700C8A7}"/>
+                </a:ext>
+              </a:extLst>
+            </p:cNvPr>
+            <p:cNvSpPr/>
+            <p:nvPr/>
+          </p:nvSpPr>
+          <p:spPr>
+            <a:xfrm>
+              <a:off x="7928346" y="2163330"/>
+              <a:ext cx="272029" cy="96525"/>
+            </a:xfrm>
+            <a:prstGeom prst="ellipse">
+              <a:avLst/>
+            </a:prstGeom>
+            <a:solidFill>
+              <a:srgbClr val="FFFFFF"/>
+            </a:solidFill>
+            <a:ln w="25400">
+              <a:solidFill>
+                <a:srgbClr val="5E5E5E"/>
+              </a:solidFill>
+              <a:miter lim="400000"/>
+            </a:ln>
+          </p:spPr>
+          <p:txBody>
+            <a:bodyPr lIns="50800" tIns="50800" rIns="50800" bIns="50800" anchor="ctr"/>
+            <a:lstStyle/>
+            <a:p>
+              <a:pPr>
+                <a:defRPr sz="2200">
+                  <a:solidFill>
+                    <a:srgbClr val="FFFFFF"/>
+                  </a:solidFill>
+                  <a:latin typeface="Helvetica Neue Medium"/>
+                  <a:ea typeface="Helvetica Neue Medium"/>
+                  <a:cs typeface="Helvetica Neue Medium"/>
+                  <a:sym typeface="Helvetica Neue Medium"/>
+                </a:defRPr>
+              </a:pPr>
+              <a:endParaRPr dirty="0">
+                <a:solidFill>
+                  <a:srgbClr val="BAF0FF"/>
+                </a:solidFill>
+              </a:endParaRPr>
+            </a:p>
+          </p:txBody>
+        </p:sp>
+        <p:sp>
+          <p:nvSpPr>
+            <p:cNvPr id="101" name="&lt;encoding&gt;">
+              <a:extLst>
+                <a:ext uri="{FF2B5EF4-FFF2-40B4-BE49-F238E27FC236}">
+                  <a16:creationId xmlns:a16="http://schemas.microsoft.com/office/drawing/2014/main" id="{6BEAE06E-4BA8-4F48-8568-C4B74EC92AC4}"/>
+                </a:ext>
+              </a:extLst>
+            </p:cNvPr>
+            <p:cNvSpPr txBox="1"/>
+            <p:nvPr/>
+          </p:nvSpPr>
+          <p:spPr>
+            <a:xfrm rot="20160000">
+              <a:off x="5549127" y="2320773"/>
+              <a:ext cx="2593659" cy="595035"/>
+            </a:xfrm>
+            <a:prstGeom prst="rect">
+              <a:avLst/>
+            </a:prstGeom>
+            <a:ln w="12700">
+              <a:miter lim="400000"/>
+            </a:ln>
+            <a:extLst>
+              <a:ext uri="{C572A759-6A51-4108-AA02-DFA0A04FC94B}">
+                <ma14:wrappingTextBoxFlag xmlns:ma14="http://schemas.microsoft.com/office/mac/drawingml/2011/main" xmlns:a14="http://schemas.microsoft.com/office/drawing/2010/main" xmlns:m="http://schemas.openxmlformats.org/officeDocument/2006/math" xmlns="" val="1"/>
+              </a:ext>
+            </a:extLst>
+          </p:spPr>
+          <p:txBody>
+            <a:bodyPr wrap="none" lIns="50800" tIns="50800" rIns="50800" bIns="50800" anchor="ctr">
+              <a:spAutoFit/>
+            </a:bodyPr>
+            <a:lstStyle>
+              <a:lvl1pPr>
+                <a:defRPr sz="1600" b="1">
+                  <a:latin typeface="+mn-lt"/>
+                  <a:ea typeface="+mn-ea"/>
+                  <a:cs typeface="+mn-cs"/>
+                  <a:sym typeface="Helvetica Neue"/>
+                </a:defRPr>
+              </a:lvl1pPr>
+            </a:lstStyle>
+            <a:p>
+              <a:r>
+                <a:rPr lang="en-US" dirty="0">
+                  <a:solidFill>
+                    <a:srgbClr val="BAF0FF"/>
+                  </a:solidFill>
+                </a:rPr>
+                <a:t>&lt;serialization, signing, </a:t>
+              </a:r>
+            </a:p>
+            <a:p>
+              <a:r>
+                <a:rPr lang="en-US" dirty="0">
+                  <a:solidFill>
+                    <a:srgbClr val="BAF0FF"/>
+                  </a:solidFill>
+                </a:rPr>
+                <a:t>securing, char encoding&gt;</a:t>
+              </a:r>
+            </a:p>
+          </p:txBody>
+        </p:sp>
+      </p:grpSp>
+      <p:grpSp>
+        <p:nvGrpSpPr>
+          <p:cNvPr id="66" name="Group 65">
+            <a:extLst>
+              <a:ext uri="{FF2B5EF4-FFF2-40B4-BE49-F238E27FC236}">
+                <a16:creationId xmlns:a16="http://schemas.microsoft.com/office/drawing/2014/main" id="{1B9B924B-D351-4D8F-B326-6C4E3FD7A87D}"/>
+              </a:ext>
+            </a:extLst>
+          </p:cNvPr>
+          <p:cNvGrpSpPr/>
+          <p:nvPr/>
+        </p:nvGrpSpPr>
+        <p:grpSpPr>
+          <a:xfrm>
+            <a:off x="3208286" y="4126150"/>
+            <a:ext cx="5862244" cy="1197475"/>
+            <a:chOff x="2221904" y="4193323"/>
+            <a:chExt cx="5862244" cy="1197475"/>
+          </a:xfrm>
+        </p:grpSpPr>
+        <p:sp>
+          <p:nvSpPr>
+            <p:cNvPr id="67" name="Shape">
+              <a:extLst>
+                <a:ext uri="{FF2B5EF4-FFF2-40B4-BE49-F238E27FC236}">
+                  <a16:creationId xmlns:a16="http://schemas.microsoft.com/office/drawing/2014/main" id="{DC59F998-D73F-4214-A654-1DEEC8674EB0}"/>
+                </a:ext>
+              </a:extLst>
+            </p:cNvPr>
+            <p:cNvSpPr/>
+            <p:nvPr/>
+          </p:nvSpPr>
+          <p:spPr>
+            <a:xfrm rot="20874979">
+              <a:off x="2221904" y="4193323"/>
+              <a:ext cx="5862244" cy="1197475"/>
+            </a:xfrm>
+            <a:custGeom>
+              <a:avLst/>
+              <a:gdLst/>
+              <a:ahLst/>
+              <a:cxnLst>
+                <a:cxn ang="0">
+                  <a:pos x="wd2" y="hd2"/>
+                </a:cxn>
+                <a:cxn ang="5400000">
+                  <a:pos x="wd2" y="hd2"/>
+                </a:cxn>
+                <a:cxn ang="10800000">
+                  <a:pos x="wd2" y="hd2"/>
+                </a:cxn>
+                <a:cxn ang="16200000">
+                  <a:pos x="wd2" y="hd2"/>
+                </a:cxn>
+              </a:cxnLst>
+              <a:rect l="0" t="0" r="r" b="b"/>
+              <a:pathLst>
+                <a:path w="21600" h="21600" extrusionOk="0">
+                  <a:moveTo>
+                    <a:pt x="0" y="10800"/>
+                  </a:moveTo>
+                  <a:lnTo>
+                    <a:pt x="10800" y="21600"/>
+                  </a:lnTo>
+                  <a:lnTo>
+                    <a:pt x="21600" y="10800"/>
+                  </a:lnTo>
+                  <a:lnTo>
+                    <a:pt x="10800" y="0"/>
+                  </a:lnTo>
+                  <a:close/>
+                </a:path>
+              </a:pathLst>
+            </a:custGeom>
+            <a:solidFill>
+              <a:schemeClr val="accent2">
+                <a:lumMod val="20000"/>
+                <a:lumOff val="80000"/>
+              </a:schemeClr>
+            </a:solidFill>
+            <a:ln w="25400">
+              <a:solidFill>
+                <a:srgbClr val="000000"/>
+              </a:solidFill>
+              <a:miter lim="400000"/>
+            </a:ln>
+            <a:effectLst>
+              <a:outerShdw blurRad="63500" dist="126055" dir="5400000" rotWithShape="0">
+                <a:srgbClr val="000000">
+                  <a:alpha val="50000"/>
+                </a:srgbClr>
+              </a:outerShdw>
+            </a:effectLst>
+          </p:spPr>
+          <p:txBody>
+            <a:bodyPr lIns="50800" tIns="50800" rIns="50800" bIns="50800" anchor="ctr"/>
+            <a:lstStyle/>
+            <a:p>
+              <a:pPr>
+                <a:defRPr sz="2200">
+                  <a:solidFill>
+                    <a:srgbClr val="FFFFFF"/>
+                  </a:solidFill>
+                  <a:latin typeface="Helvetica Neue Medium"/>
+                  <a:ea typeface="Helvetica Neue Medium"/>
+                  <a:cs typeface="Helvetica Neue Medium"/>
+                  <a:sym typeface="Helvetica Neue Medium"/>
+                </a:defRPr>
+              </a:pPr>
+              <a:endParaRPr dirty="0"/>
+            </a:p>
+          </p:txBody>
+        </p:sp>
+        <p:sp>
+          <p:nvSpPr>
+            <p:cNvPr id="68" name="Entry">
+              <a:extLst>
+                <a:ext uri="{FF2B5EF4-FFF2-40B4-BE49-F238E27FC236}">
+                  <a16:creationId xmlns:a16="http://schemas.microsoft.com/office/drawing/2014/main" id="{0A317BB0-1F8D-4B27-AF32-937A13B7B02D}"/>
+                </a:ext>
+              </a:extLst>
+            </p:cNvPr>
+            <p:cNvSpPr txBox="1"/>
+            <p:nvPr/>
+          </p:nvSpPr>
+          <p:spPr>
+            <a:xfrm>
+              <a:off x="3404361" y="4936798"/>
+              <a:ext cx="1586974" cy="425758"/>
+            </a:xfrm>
+            <a:prstGeom prst="rect">
+              <a:avLst/>
+            </a:prstGeom>
+            <a:noFill/>
+            <a:ln w="12700">
+              <a:miter lim="400000"/>
+            </a:ln>
+            <a:extLst>
+              <a:ext uri="{C572A759-6A51-4108-AA02-DFA0A04FC94B}">
+                <ma14:wrappingTextBoxFlag xmlns:ma14="http://schemas.microsoft.com/office/mac/drawingml/2011/main" xmlns:a14="http://schemas.microsoft.com/office/drawing/2010/main" xmlns:m="http://schemas.openxmlformats.org/officeDocument/2006/math" xmlns="" val="1"/>
+              </a:ext>
+            </a:extLst>
+          </p:spPr>
+          <p:txBody>
+            <a:bodyPr wrap="none" lIns="50800" tIns="50800" rIns="50800" bIns="50800" anchor="ctr">
+              <a:spAutoFit/>
+            </a:bodyPr>
+            <a:lstStyle>
+              <a:lvl1pPr>
+                <a:defRPr sz="2100" b="1" i="1">
+                  <a:solidFill>
+                    <a:srgbClr val="FFFFFF"/>
+                  </a:solidFill>
+                  <a:latin typeface="+mn-lt"/>
+                  <a:ea typeface="+mn-ea"/>
+                  <a:cs typeface="+mn-cs"/>
+                  <a:sym typeface="Helvetica Neue"/>
+                </a:defRPr>
+              </a:lvl1pPr>
+            </a:lstStyle>
+            <a:p>
+              <a:r>
+                <a:rPr lang="en-CA" dirty="0">
+                  <a:solidFill>
+                    <a:srgbClr val="5E5E5E"/>
+                  </a:solidFill>
+                </a:rPr>
+                <a:t>Conditional</a:t>
+              </a:r>
+              <a:endParaRPr dirty="0">
+                <a:solidFill>
+                  <a:srgbClr val="5E5E5E"/>
+                </a:solidFill>
+              </a:endParaRPr>
+            </a:p>
+          </p:txBody>
+        </p:sp>
+        <p:sp>
+          <p:nvSpPr>
+            <p:cNvPr id="69" name="Oval">
+              <a:extLst>
+                <a:ext uri="{FF2B5EF4-FFF2-40B4-BE49-F238E27FC236}">
+                  <a16:creationId xmlns:a16="http://schemas.microsoft.com/office/drawing/2014/main" id="{76960BF5-5DAC-43DA-ABBD-7B5EABD42D86}"/>
+                </a:ext>
+              </a:extLst>
+            </p:cNvPr>
+            <p:cNvSpPr/>
+            <p:nvPr/>
+          </p:nvSpPr>
+          <p:spPr>
+            <a:xfrm>
+              <a:off x="7352347" y="4227018"/>
+              <a:ext cx="272031" cy="96525"/>
+            </a:xfrm>
+            <a:prstGeom prst="ellipse">
+              <a:avLst/>
+            </a:prstGeom>
+            <a:solidFill>
+              <a:schemeClr val="bg1"/>
+            </a:solidFill>
+            <a:ln w="25400">
+              <a:solidFill>
+                <a:srgbClr val="5E5E5E"/>
+              </a:solidFill>
+              <a:miter lim="400000"/>
+            </a:ln>
+          </p:spPr>
+          <p:txBody>
+            <a:bodyPr lIns="50800" tIns="50800" rIns="50800" bIns="50800" anchor="ctr"/>
+            <a:lstStyle/>
+            <a:p>
+              <a:pPr>
+                <a:defRPr sz="2200">
+                  <a:solidFill>
+                    <a:srgbClr val="FFFFFF"/>
+                  </a:solidFill>
+                  <a:latin typeface="Helvetica Neue Medium"/>
+                  <a:ea typeface="Helvetica Neue Medium"/>
+                  <a:cs typeface="Helvetica Neue Medium"/>
+                  <a:sym typeface="Helvetica Neue Medium"/>
+                </a:defRPr>
+              </a:pPr>
+              <a:endParaRPr dirty="0"/>
+            </a:p>
+          </p:txBody>
+        </p:sp>
+        <p:sp>
+          <p:nvSpPr>
+            <p:cNvPr id="76" name="&lt;language&gt;">
+              <a:extLst>
+                <a:ext uri="{FF2B5EF4-FFF2-40B4-BE49-F238E27FC236}">
+                  <a16:creationId xmlns:a16="http://schemas.microsoft.com/office/drawing/2014/main" id="{0758FFAA-B087-4650-A5BC-6B63C919C84C}"/>
+                </a:ext>
+              </a:extLst>
+            </p:cNvPr>
+            <p:cNvSpPr txBox="1"/>
+            <p:nvPr/>
+          </p:nvSpPr>
+          <p:spPr>
+            <a:xfrm rot="20160000">
+              <a:off x="4844372" y="4600604"/>
+              <a:ext cx="2683427" cy="348813"/>
+            </a:xfrm>
+            <a:prstGeom prst="rect">
+              <a:avLst/>
+            </a:prstGeom>
+            <a:noFill/>
+            <a:ln w="12700">
+              <a:miter lim="400000"/>
+            </a:ln>
+            <a:extLst>
+              <a:ext uri="{C572A759-6A51-4108-AA02-DFA0A04FC94B}">
+                <ma14:wrappingTextBoxFlag xmlns:ma14="http://schemas.microsoft.com/office/mac/drawingml/2011/main" xmlns:a14="http://schemas.microsoft.com/office/drawing/2010/main" xmlns:m="http://schemas.openxmlformats.org/officeDocument/2006/math" xmlns="" val="1"/>
+              </a:ext>
+            </a:extLst>
+          </p:spPr>
+          <p:txBody>
+            <a:bodyPr wrap="none" lIns="50800" tIns="50800" rIns="50800" bIns="50800" anchor="ctr">
+              <a:spAutoFit/>
+            </a:bodyPr>
+            <a:lstStyle>
+              <a:lvl1pPr>
+                <a:defRPr sz="1600" b="1">
+                  <a:latin typeface="+mn-lt"/>
+                  <a:ea typeface="+mn-ea"/>
+                  <a:cs typeface="+mn-cs"/>
+                  <a:sym typeface="Helvetica Neue"/>
+                </a:defRPr>
+              </a:lvl1pPr>
+            </a:lstStyle>
+            <a:p>
+              <a:r>
+                <a:rPr lang="en-CA" dirty="0">
+                  <a:solidFill>
+                    <a:srgbClr val="5E5E5E"/>
+                  </a:solidFill>
+                </a:rPr>
+                <a:t>&lt;simple conditional logic&gt;</a:t>
+              </a:r>
+              <a:endParaRPr dirty="0">
+                <a:solidFill>
+                  <a:srgbClr val="5E5E5E"/>
+                </a:solidFill>
+              </a:endParaRPr>
+            </a:p>
+          </p:txBody>
+        </p:sp>
+      </p:grpSp>
+      <p:grpSp>
+        <p:nvGrpSpPr>
+          <p:cNvPr id="78" name="Group 77">
+            <a:extLst>
+              <a:ext uri="{FF2B5EF4-FFF2-40B4-BE49-F238E27FC236}">
+                <a16:creationId xmlns:a16="http://schemas.microsoft.com/office/drawing/2014/main" id="{EC9D7387-B82E-414B-8ED9-F416089F36B9}"/>
+              </a:ext>
+            </a:extLst>
+          </p:cNvPr>
+          <p:cNvGrpSpPr/>
+          <p:nvPr/>
+        </p:nvGrpSpPr>
+        <p:grpSpPr>
+          <a:xfrm>
+            <a:off x="4060726" y="1368758"/>
+            <a:ext cx="5862244" cy="1197475"/>
+            <a:chOff x="2858201" y="2101616"/>
+            <a:chExt cx="5862244" cy="1197475"/>
+          </a:xfrm>
+        </p:grpSpPr>
+        <p:sp>
+          <p:nvSpPr>
+            <p:cNvPr id="79" name="Shape">
+              <a:extLst>
+                <a:ext uri="{FF2B5EF4-FFF2-40B4-BE49-F238E27FC236}">
+                  <a16:creationId xmlns:a16="http://schemas.microsoft.com/office/drawing/2014/main" id="{FBA8CD98-BE40-40E8-84E3-FEC8FC66C5CC}"/>
+                </a:ext>
+              </a:extLst>
+            </p:cNvPr>
+            <p:cNvSpPr/>
+            <p:nvPr/>
+          </p:nvSpPr>
+          <p:spPr>
+            <a:xfrm rot="20874979">
+              <a:off x="2858201" y="2101616"/>
+              <a:ext cx="5862244" cy="1197475"/>
+            </a:xfrm>
+            <a:custGeom>
+              <a:avLst/>
+              <a:gdLst/>
+              <a:ahLst/>
+              <a:cxnLst>
+                <a:cxn ang="0">
+                  <a:pos x="wd2" y="hd2"/>
+                </a:cxn>
+                <a:cxn ang="5400000">
+                  <a:pos x="wd2" y="hd2"/>
+                </a:cxn>
+                <a:cxn ang="10800000">
+                  <a:pos x="wd2" y="hd2"/>
+                </a:cxn>
+                <a:cxn ang="16200000">
+                  <a:pos x="wd2" y="hd2"/>
+                </a:cxn>
+              </a:cxnLst>
+              <a:rect l="0" t="0" r="r" b="b"/>
+              <a:pathLst>
+                <a:path w="21600" h="21600" extrusionOk="0">
+                  <a:moveTo>
+                    <a:pt x="0" y="10800"/>
+                  </a:moveTo>
+                  <a:lnTo>
+                    <a:pt x="10800" y="21600"/>
+                  </a:lnTo>
+                  <a:lnTo>
+                    <a:pt x="21600" y="10800"/>
+                  </a:lnTo>
+                  <a:lnTo>
+                    <a:pt x="10800" y="0"/>
+                  </a:lnTo>
+                  <a:close/>
+                </a:path>
+              </a:pathLst>
+            </a:custGeom>
+            <a:solidFill>
+              <a:schemeClr val="accent4">
+                <a:lumMod val="40000"/>
+                <a:lumOff val="60000"/>
+              </a:schemeClr>
+            </a:solidFill>
+            <a:ln w="25400">
+              <a:solidFill>
+                <a:srgbClr val="5E5E5E"/>
+              </a:solidFill>
+              <a:miter lim="400000"/>
+            </a:ln>
+            <a:effectLst>
+              <a:outerShdw blurRad="63500" dist="129819" dir="5400000" rotWithShape="0">
+                <a:srgbClr val="000000">
+                  <a:alpha val="50000"/>
+                </a:srgbClr>
+              </a:outerShdw>
+            </a:effectLst>
+          </p:spPr>
+          <p:txBody>
+            <a:bodyPr lIns="50800" tIns="50800" rIns="50800" bIns="50800" anchor="ctr"/>
+            <a:lstStyle/>
+            <a:p>
+              <a:pPr>
+                <a:defRPr sz="2200">
+                  <a:solidFill>
+                    <a:srgbClr val="FFFFFF"/>
+                  </a:solidFill>
+                  <a:latin typeface="Helvetica Neue Medium"/>
+                  <a:ea typeface="Helvetica Neue Medium"/>
+                  <a:cs typeface="Helvetica Neue Medium"/>
+                  <a:sym typeface="Helvetica Neue Medium"/>
+                </a:defRPr>
+              </a:pPr>
+              <a:endParaRPr dirty="0"/>
+            </a:p>
+          </p:txBody>
+        </p:sp>
+        <p:sp>
+          <p:nvSpPr>
+            <p:cNvPr id="80" name="Subset">
+              <a:extLst>
+                <a:ext uri="{FF2B5EF4-FFF2-40B4-BE49-F238E27FC236}">
+                  <a16:creationId xmlns:a16="http://schemas.microsoft.com/office/drawing/2014/main" id="{4A78E210-F251-4DF4-B2E6-FBC89FA818D8}"/>
+                </a:ext>
+              </a:extLst>
+            </p:cNvPr>
+            <p:cNvSpPr txBox="1"/>
+            <p:nvPr/>
+          </p:nvSpPr>
+          <p:spPr>
+            <a:xfrm>
+              <a:off x="3534391" y="2846274"/>
+              <a:ext cx="2647127" cy="425758"/>
+            </a:xfrm>
+            <a:prstGeom prst="rect">
+              <a:avLst/>
+            </a:prstGeom>
+            <a:ln w="12700">
+              <a:miter lim="400000"/>
+            </a:ln>
+            <a:extLst>
+              <a:ext uri="{C572A759-6A51-4108-AA02-DFA0A04FC94B}">
+                <ma14:wrappingTextBoxFlag xmlns:ma14="http://schemas.microsoft.com/office/mac/drawingml/2011/main" xmlns:a14="http://schemas.microsoft.com/office/drawing/2010/main" xmlns:m="http://schemas.openxmlformats.org/officeDocument/2006/math" xmlns="" val="1"/>
+              </a:ext>
+            </a:extLst>
+          </p:spPr>
+          <p:txBody>
+            <a:bodyPr wrap="square" lIns="50800" tIns="50800" rIns="50800" bIns="50800" anchor="ctr">
+              <a:spAutoFit/>
+            </a:bodyPr>
+            <a:lstStyle>
+              <a:lvl1pPr>
+                <a:defRPr sz="2100" b="1" i="1">
+                  <a:solidFill>
+                    <a:srgbClr val="5E5E5E"/>
+                  </a:solidFill>
+                  <a:latin typeface="+mn-lt"/>
+                  <a:ea typeface="+mn-ea"/>
+                  <a:cs typeface="+mn-cs"/>
+                  <a:sym typeface="Helvetica Neue"/>
+                </a:defRPr>
+              </a:lvl1pPr>
+            </a:lstStyle>
+            <a:p>
+              <a:r>
+                <a:rPr lang="en-CA" dirty="0"/>
+                <a:t>Subset</a:t>
+              </a:r>
+              <a:endParaRPr dirty="0"/>
+            </a:p>
+          </p:txBody>
+        </p:sp>
+        <p:sp>
+          <p:nvSpPr>
+            <p:cNvPr id="81" name="Oval">
+              <a:extLst>
+                <a:ext uri="{FF2B5EF4-FFF2-40B4-BE49-F238E27FC236}">
+                  <a16:creationId xmlns:a16="http://schemas.microsoft.com/office/drawing/2014/main" id="{6553DE6D-92EB-4FA0-8FA7-86B5E3010827}"/>
+                </a:ext>
+              </a:extLst>
+            </p:cNvPr>
+            <p:cNvSpPr/>
+            <p:nvPr/>
+          </p:nvSpPr>
+          <p:spPr>
+            <a:xfrm>
+              <a:off x="7928346" y="2163330"/>
+              <a:ext cx="272029" cy="96525"/>
+            </a:xfrm>
+            <a:prstGeom prst="ellipse">
+              <a:avLst/>
+            </a:prstGeom>
+            <a:solidFill>
+              <a:srgbClr val="FFFFFF"/>
+            </a:solidFill>
+            <a:ln w="25400">
+              <a:solidFill>
+                <a:srgbClr val="5E5E5E"/>
+              </a:solidFill>
+              <a:miter lim="400000"/>
+            </a:ln>
+          </p:spPr>
+          <p:txBody>
+            <a:bodyPr lIns="50800" tIns="50800" rIns="50800" bIns="50800" anchor="ctr"/>
+            <a:lstStyle/>
+            <a:p>
+              <a:pPr>
+                <a:defRPr sz="2200">
+                  <a:solidFill>
+                    <a:srgbClr val="FFFFFF"/>
+                  </a:solidFill>
+                  <a:latin typeface="Helvetica Neue Medium"/>
+                  <a:ea typeface="Helvetica Neue Medium"/>
+                  <a:cs typeface="Helvetica Neue Medium"/>
+                  <a:sym typeface="Helvetica Neue Medium"/>
+                </a:defRPr>
+              </a:pPr>
+              <a:endParaRPr dirty="0"/>
+            </a:p>
+          </p:txBody>
+        </p:sp>
+        <p:sp>
+          <p:nvSpPr>
+            <p:cNvPr id="82" name="&lt;encoding&gt;">
+              <a:extLst>
+                <a:ext uri="{FF2B5EF4-FFF2-40B4-BE49-F238E27FC236}">
+                  <a16:creationId xmlns:a16="http://schemas.microsoft.com/office/drawing/2014/main" id="{F0E7E975-43D9-4141-B821-91063279C412}"/>
+                </a:ext>
+              </a:extLst>
+            </p:cNvPr>
+            <p:cNvSpPr txBox="1"/>
+            <p:nvPr/>
+          </p:nvSpPr>
+          <p:spPr>
+            <a:xfrm rot="20160000">
+              <a:off x="5933847" y="2492010"/>
+              <a:ext cx="1824217" cy="348813"/>
+            </a:xfrm>
+            <a:prstGeom prst="rect">
+              <a:avLst/>
+            </a:prstGeom>
+            <a:ln w="12700">
+              <a:miter lim="400000"/>
+            </a:ln>
+            <a:extLst>
+              <a:ext uri="{C572A759-6A51-4108-AA02-DFA0A04FC94B}">
+                <ma14:wrappingTextBoxFlag xmlns:ma14="http://schemas.microsoft.com/office/mac/drawingml/2011/main" xmlns:a14="http://schemas.microsoft.com/office/drawing/2010/main" xmlns:m="http://schemas.openxmlformats.org/officeDocument/2006/math" xmlns="" val="1"/>
+              </a:ext>
+            </a:extLst>
+          </p:spPr>
+          <p:txBody>
+            <a:bodyPr wrap="none" lIns="50800" tIns="50800" rIns="50800" bIns="50800" anchor="ctr">
+              <a:spAutoFit/>
+            </a:bodyPr>
+            <a:lstStyle>
+              <a:lvl1pPr>
+                <a:defRPr sz="1600" b="1">
+                  <a:latin typeface="+mn-lt"/>
+                  <a:ea typeface="+mn-ea"/>
+                  <a:cs typeface="+mn-cs"/>
+                  <a:sym typeface="Helvetica Neue"/>
+                </a:defRPr>
+              </a:lvl1pPr>
+            </a:lstStyle>
+            <a:p>
+              <a:r>
+                <a:rPr dirty="0">
+                  <a:solidFill>
+                    <a:srgbClr val="5E5E5E"/>
+                  </a:solidFill>
+                </a:rPr>
+                <a:t>&lt;</a:t>
+              </a:r>
+              <a:r>
+                <a:rPr lang="en-CA" dirty="0">
+                  <a:solidFill>
+                    <a:srgbClr val="5E5E5E"/>
+                  </a:solidFill>
+                </a:rPr>
+                <a:t>schema subset</a:t>
+              </a:r>
+              <a:r>
+                <a:rPr dirty="0">
+                  <a:solidFill>
+                    <a:srgbClr val="5E5E5E"/>
+                  </a:solidFill>
+                </a:rPr>
+                <a:t>&gt;</a:t>
+              </a:r>
+            </a:p>
+          </p:txBody>
+        </p:sp>
+      </p:grpSp>
+      <p:grpSp>
+        <p:nvGrpSpPr>
+          <p:cNvPr id="83" name="Group 82">
+            <a:extLst>
+              <a:ext uri="{FF2B5EF4-FFF2-40B4-BE49-F238E27FC236}">
+                <a16:creationId xmlns:a16="http://schemas.microsoft.com/office/drawing/2014/main" id="{0A1463FD-43FB-429B-AE5D-D4F74C08CABA}"/>
+              </a:ext>
+            </a:extLst>
+          </p:cNvPr>
+          <p:cNvGrpSpPr/>
+          <p:nvPr/>
+        </p:nvGrpSpPr>
+        <p:grpSpPr>
+          <a:xfrm>
+            <a:off x="4177599" y="853890"/>
+            <a:ext cx="5862244" cy="1197475"/>
+            <a:chOff x="2858201" y="2101616"/>
+            <a:chExt cx="5862244" cy="1197475"/>
+          </a:xfrm>
+        </p:grpSpPr>
+        <p:sp>
+          <p:nvSpPr>
+            <p:cNvPr id="84" name="Shape">
+              <a:extLst>
+                <a:ext uri="{FF2B5EF4-FFF2-40B4-BE49-F238E27FC236}">
+                  <a16:creationId xmlns:a16="http://schemas.microsoft.com/office/drawing/2014/main" id="{EABCF258-9112-40D1-BBF0-2AC74705908D}"/>
+                </a:ext>
+              </a:extLst>
+            </p:cNvPr>
+            <p:cNvSpPr/>
+            <p:nvPr/>
+          </p:nvSpPr>
+          <p:spPr>
+            <a:xfrm rot="20874979">
+              <a:off x="2858201" y="2101616"/>
+              <a:ext cx="5862244" cy="1197475"/>
+            </a:xfrm>
+            <a:custGeom>
+              <a:avLst/>
+              <a:gdLst/>
+              <a:ahLst/>
+              <a:cxnLst>
+                <a:cxn ang="0">
+                  <a:pos x="wd2" y="hd2"/>
+                </a:cxn>
+                <a:cxn ang="5400000">
+                  <a:pos x="wd2" y="hd2"/>
+                </a:cxn>
+                <a:cxn ang="10800000">
+                  <a:pos x="wd2" y="hd2"/>
+                </a:cxn>
+                <a:cxn ang="16200000">
+                  <a:pos x="wd2" y="hd2"/>
+                </a:cxn>
+              </a:cxnLst>
+              <a:rect l="0" t="0" r="r" b="b"/>
+              <a:pathLst>
+                <a:path w="21600" h="21600" extrusionOk="0">
+                  <a:moveTo>
+                    <a:pt x="0" y="10800"/>
+                  </a:moveTo>
+                  <a:lnTo>
+                    <a:pt x="10800" y="21600"/>
+                  </a:lnTo>
+                  <a:lnTo>
+                    <a:pt x="21600" y="10800"/>
+                  </a:lnTo>
+                  <a:lnTo>
+                    <a:pt x="10800" y="0"/>
+                  </a:lnTo>
+                  <a:close/>
+                </a:path>
+              </a:pathLst>
+            </a:custGeom>
+            <a:solidFill>
+              <a:schemeClr val="accent4">
+                <a:lumMod val="20000"/>
+                <a:lumOff val="80000"/>
+              </a:schemeClr>
+            </a:solidFill>
+            <a:ln w="25400">
+              <a:solidFill>
+                <a:srgbClr val="5E5E5E"/>
+              </a:solidFill>
+              <a:miter lim="400000"/>
+            </a:ln>
+            <a:effectLst>
+              <a:outerShdw blurRad="63500" dist="129819" dir="5400000" rotWithShape="0">
+                <a:srgbClr val="000000">
+                  <a:alpha val="50000"/>
+                </a:srgbClr>
+              </a:outerShdw>
+            </a:effectLst>
+          </p:spPr>
+          <p:txBody>
+            <a:bodyPr lIns="50800" tIns="50800" rIns="50800" bIns="50800" anchor="ctr"/>
+            <a:lstStyle/>
+            <a:p>
+              <a:pPr>
+                <a:defRPr sz="2200">
+                  <a:solidFill>
+                    <a:srgbClr val="FFFFFF"/>
+                  </a:solidFill>
+                  <a:latin typeface="Helvetica Neue Medium"/>
+                  <a:ea typeface="Helvetica Neue Medium"/>
+                  <a:cs typeface="Helvetica Neue Medium"/>
+                  <a:sym typeface="Helvetica Neue Medium"/>
+                </a:defRPr>
+              </a:pPr>
+              <a:endParaRPr dirty="0"/>
+            </a:p>
+          </p:txBody>
+        </p:sp>
+        <p:sp>
+          <p:nvSpPr>
+            <p:cNvPr id="85" name="Subset">
+              <a:extLst>
+                <a:ext uri="{FF2B5EF4-FFF2-40B4-BE49-F238E27FC236}">
+                  <a16:creationId xmlns:a16="http://schemas.microsoft.com/office/drawing/2014/main" id="{57A638AB-AD5A-474F-BCCC-522D85FB1DAC}"/>
+                </a:ext>
+              </a:extLst>
+            </p:cNvPr>
+            <p:cNvSpPr txBox="1"/>
+            <p:nvPr/>
+          </p:nvSpPr>
+          <p:spPr>
+            <a:xfrm>
+              <a:off x="3534391" y="2846274"/>
+              <a:ext cx="2647127" cy="425758"/>
+            </a:xfrm>
+            <a:prstGeom prst="rect">
+              <a:avLst/>
+            </a:prstGeom>
+            <a:ln w="12700">
+              <a:miter lim="400000"/>
+            </a:ln>
+            <a:extLst>
+              <a:ext uri="{C572A759-6A51-4108-AA02-DFA0A04FC94B}">
+                <ma14:wrappingTextBoxFlag xmlns:ma14="http://schemas.microsoft.com/office/mac/drawingml/2011/main" xmlns:a14="http://schemas.microsoft.com/office/drawing/2010/main" xmlns:m="http://schemas.openxmlformats.org/officeDocument/2006/math" xmlns="" val="1"/>
+              </a:ext>
+            </a:extLst>
+          </p:spPr>
+          <p:txBody>
+            <a:bodyPr wrap="square" lIns="50800" tIns="50800" rIns="50800" bIns="50800" anchor="ctr">
+              <a:spAutoFit/>
+            </a:bodyPr>
+            <a:lstStyle>
+              <a:lvl1pPr>
+                <a:defRPr sz="2100" b="1" i="1">
+                  <a:solidFill>
+                    <a:srgbClr val="5E5E5E"/>
+                  </a:solidFill>
+                  <a:latin typeface="+mn-lt"/>
+                  <a:ea typeface="+mn-ea"/>
+                  <a:cs typeface="+mn-cs"/>
+                  <a:sym typeface="Helvetica Neue"/>
+                </a:defRPr>
+              </a:lvl1pPr>
+            </a:lstStyle>
+            <a:p>
+              <a:r>
+                <a:rPr lang="en-CA" dirty="0"/>
+                <a:t>Sensitive</a:t>
+              </a:r>
+              <a:endParaRPr dirty="0"/>
+            </a:p>
+          </p:txBody>
+        </p:sp>
+        <p:sp>
+          <p:nvSpPr>
+            <p:cNvPr id="86" name="Oval">
+              <a:extLst>
+                <a:ext uri="{FF2B5EF4-FFF2-40B4-BE49-F238E27FC236}">
+                  <a16:creationId xmlns:a16="http://schemas.microsoft.com/office/drawing/2014/main" id="{F491C85F-A0B2-46D5-B99F-E8D3C3A0CC40}"/>
+                </a:ext>
+              </a:extLst>
+            </p:cNvPr>
+            <p:cNvSpPr/>
+            <p:nvPr/>
+          </p:nvSpPr>
+          <p:spPr>
+            <a:xfrm>
+              <a:off x="7928346" y="2163330"/>
+              <a:ext cx="272029" cy="96525"/>
+            </a:xfrm>
+            <a:prstGeom prst="ellipse">
+              <a:avLst/>
+            </a:prstGeom>
+            <a:solidFill>
+              <a:srgbClr val="FFFFFF"/>
+            </a:solidFill>
+            <a:ln w="25400">
+              <a:solidFill>
+                <a:srgbClr val="5E5E5E"/>
+              </a:solidFill>
+              <a:miter lim="400000"/>
+            </a:ln>
+          </p:spPr>
+          <p:txBody>
+            <a:bodyPr lIns="50800" tIns="50800" rIns="50800" bIns="50800" anchor="ctr"/>
+            <a:lstStyle/>
+            <a:p>
+              <a:pPr>
+                <a:defRPr sz="2200">
+                  <a:solidFill>
+                    <a:srgbClr val="FFFFFF"/>
+                  </a:solidFill>
+                  <a:latin typeface="Helvetica Neue Medium"/>
+                  <a:ea typeface="Helvetica Neue Medium"/>
+                  <a:cs typeface="Helvetica Neue Medium"/>
+                  <a:sym typeface="Helvetica Neue Medium"/>
+                </a:defRPr>
+              </a:pPr>
+              <a:endParaRPr dirty="0"/>
+            </a:p>
+          </p:txBody>
+        </p:sp>
+        <p:sp>
+          <p:nvSpPr>
+            <p:cNvPr id="87" name="&lt;encoding&gt;">
+              <a:extLst>
+                <a:ext uri="{FF2B5EF4-FFF2-40B4-BE49-F238E27FC236}">
+                  <a16:creationId xmlns:a16="http://schemas.microsoft.com/office/drawing/2014/main" id="{90479D69-C65C-40D7-A918-C34B2BA72FE1}"/>
+                </a:ext>
+              </a:extLst>
+            </p:cNvPr>
+            <p:cNvSpPr txBox="1"/>
+            <p:nvPr/>
+          </p:nvSpPr>
+          <p:spPr>
+            <a:xfrm rot="20160000">
+              <a:off x="5731864" y="2492010"/>
+              <a:ext cx="2228175" cy="348813"/>
+            </a:xfrm>
+            <a:prstGeom prst="rect">
+              <a:avLst/>
+            </a:prstGeom>
+            <a:ln w="12700">
+              <a:miter lim="400000"/>
+            </a:ln>
+            <a:extLst>
+              <a:ext uri="{C572A759-6A51-4108-AA02-DFA0A04FC94B}">
+                <ma14:wrappingTextBoxFlag xmlns:ma14="http://schemas.microsoft.com/office/mac/drawingml/2011/main" xmlns:a14="http://schemas.microsoft.com/office/drawing/2010/main" xmlns:m="http://schemas.openxmlformats.org/officeDocument/2006/math" xmlns="" val="1"/>
+              </a:ext>
+            </a:extLst>
+          </p:spPr>
+          <p:txBody>
+            <a:bodyPr wrap="none" lIns="50800" tIns="50800" rIns="50800" bIns="50800" anchor="ctr">
+              <a:spAutoFit/>
+            </a:bodyPr>
+            <a:lstStyle>
+              <a:lvl1pPr>
+                <a:defRPr sz="1600" b="1">
+                  <a:latin typeface="+mn-lt"/>
+                  <a:ea typeface="+mn-ea"/>
+                  <a:cs typeface="+mn-cs"/>
+                  <a:sym typeface="Helvetica Neue"/>
+                </a:defRPr>
+              </a:lvl1pPr>
+            </a:lstStyle>
+            <a:p>
+              <a:r>
+                <a:rPr dirty="0">
+                  <a:solidFill>
+                    <a:srgbClr val="5E5E5E"/>
+                  </a:solidFill>
+                </a:rPr>
+                <a:t>&lt;</a:t>
+              </a:r>
+              <a:r>
+                <a:rPr lang="en-CA" dirty="0">
+                  <a:solidFill>
+                    <a:srgbClr val="5E5E5E"/>
+                  </a:solidFill>
+                </a:rPr>
+                <a:t>attribute sensitivity</a:t>
+              </a:r>
+              <a:r>
+                <a:rPr dirty="0">
+                  <a:solidFill>
+                    <a:srgbClr val="5E5E5E"/>
+                  </a:solidFill>
+                </a:rPr>
+                <a:t>&gt;</a:t>
+              </a:r>
+            </a:p>
+          </p:txBody>
+        </p:sp>
+      </p:grpSp>
+      <p:sp>
+        <p:nvSpPr>
+          <p:cNvPr id="197" name="Line"/>
+          <p:cNvSpPr/>
+          <p:nvPr/>
+        </p:nvSpPr>
+        <p:spPr>
+          <a:xfrm flipV="1">
+            <a:off x="6855734" y="0"/>
+            <a:ext cx="2790916" cy="10036246"/>
+          </a:xfrm>
+          <a:prstGeom prst="line">
+            <a:avLst/>
+          </a:prstGeom>
+          <a:ln w="25400">
+            <a:solidFill>
+              <a:schemeClr val="accent5"/>
+            </a:solidFill>
+            <a:prstDash val="sysDot"/>
+            <a:miter lim="400000"/>
+          </a:ln>
+        </p:spPr>
+        <p:txBody>
+          <a:bodyPr lIns="45718" tIns="45718" rIns="45718" bIns="45718"/>
+          <a:lstStyle/>
+          <a:p>
+            <a:endParaRPr dirty="0"/>
+          </a:p>
+        </p:txBody>
+      </p:sp>
+    </p:spTree>
+    <p:extLst>
+      <p:ext uri="{BB962C8B-B14F-4D97-AF65-F5344CB8AC3E}">
+        <p14:creationId xmlns:p14="http://schemas.microsoft.com/office/powerpoint/2010/main" val="1269565322"/>
+      </p:ext>
+    </p:extLst>
+  </p:cSld>
+  <p:clrMapOvr>
+    <a:masterClrMapping/>
+  </p:clrMapOvr>
+  <p:transition spd="med"/>
+</p:sld>
+</file>
+
+<file path=ppt/slides/slide3.xml><?xml version="1.0" encoding="utf-8"?>
+<p:sld xmlns:a="http://schemas.openxmlformats.org/drawingml/2006/main" xmlns:r="http://schemas.openxmlformats.org/officeDocument/2006/relationships" xmlns:p="http://schemas.openxmlformats.org/presentationml/2006/main">
+  <p:cSld>
+    <p:spTree>
+      <p:nvGrpSpPr>
+        <p:cNvPr id="1" name=""/>
+        <p:cNvGrpSpPr/>
+        <p:nvPr/>
+      </p:nvGrpSpPr>
+      <p:grpSpPr>
+        <a:xfrm>
+          <a:off x="0" y="0"/>
+          <a:ext cx="0" cy="0"/>
+          <a:chOff x="0" y="0"/>
+          <a:chExt cx="0" cy="0"/>
+        </a:xfrm>
+      </p:grpSpPr>
+      <p:grpSp>
+        <p:nvGrpSpPr>
+          <p:cNvPr id="12" name="Group 11">
+            <a:extLst>
+              <a:ext uri="{FF2B5EF4-FFF2-40B4-BE49-F238E27FC236}">
+                <a16:creationId xmlns:a16="http://schemas.microsoft.com/office/drawing/2014/main" id="{39892311-6210-492A-8744-CB320427683C}"/>
+              </a:ext>
+            </a:extLst>
+          </p:cNvPr>
+          <p:cNvGrpSpPr/>
+          <p:nvPr/>
+        </p:nvGrpSpPr>
+        <p:grpSpPr>
+          <a:xfrm>
+            <a:off x="109184" y="104633"/>
+            <a:ext cx="5622877" cy="7483522"/>
+            <a:chOff x="1910687" y="1278341"/>
+            <a:chExt cx="5622877" cy="7483522"/>
+          </a:xfrm>
+        </p:grpSpPr>
+        <p:sp>
+          <p:nvSpPr>
+            <p:cNvPr id="11" name="Rectangle: Rounded Corners 10">
+              <a:extLst>
+                <a:ext uri="{FF2B5EF4-FFF2-40B4-BE49-F238E27FC236}">
+                  <a16:creationId xmlns:a16="http://schemas.microsoft.com/office/drawing/2014/main" id="{F2DAE974-5900-4CFF-99C3-C0583E83F032}"/>
+                </a:ext>
+              </a:extLst>
+            </p:cNvPr>
+            <p:cNvSpPr/>
+            <p:nvPr/>
+          </p:nvSpPr>
+          <p:spPr>
+            <a:xfrm>
+              <a:off x="1910687" y="1278341"/>
+              <a:ext cx="5622877" cy="7483522"/>
+            </a:xfrm>
+            <a:prstGeom prst="roundRect">
+              <a:avLst/>
+            </a:prstGeom>
+            <a:solidFill>
+              <a:srgbClr val="FFFFFF"/>
+            </a:solidFill>
+            <a:ln w="25400" cap="flat">
+              <a:solidFill>
+                <a:schemeClr val="accent1"/>
+              </a:solidFill>
+              <a:prstDash val="solid"/>
+              <a:round/>
+            </a:ln>
+            <a:effectLst/>
+            <a:sp3d/>
+          </p:spPr>
+          <p:style>
+            <a:lnRef idx="0">
+              <a:scrgbClr r="0" g="0" b="0"/>
+            </a:lnRef>
+            <a:fillRef idx="0">
+              <a:scrgbClr r="0" g="0" b="0"/>
+            </a:fillRef>
+            <a:effectRef idx="0">
+              <a:scrgbClr r="0" g="0" b="0"/>
+            </a:effectRef>
+            <a:fontRef idx="none"/>
+          </p:style>
+          <p:txBody>
+            <a:bodyPr rot="0" spcFirstLastPara="1" vertOverflow="overflow" horzOverflow="overflow" vert="horz" wrap="square" lIns="50800" tIns="50800" rIns="50800" bIns="50800" numCol="1" spcCol="38100" rtlCol="0" anchor="t">
+              <a:noAutofit/>
+            </a:bodyPr>
+            <a:lstStyle/>
+            <a:p>
+              <a:pPr marL="0" marR="0" indent="0" algn="ctr" defTabSz="584200" rtl="0" fontAlgn="auto" latinLnBrk="0" hangingPunct="0">
+                <a:lnSpc>
+                  <a:spcPct val="100000"/>
+                </a:lnSpc>
+                <a:spcBef>
+                  <a:spcPts val="0"/>
+                </a:spcBef>
+                <a:spcAft>
+                  <a:spcPts val="0"/>
+                </a:spcAft>
+                <a:buClrTx/>
+                <a:buSzTx/>
+                <a:buFontTx/>
+                <a:buNone/>
+                <a:tabLst/>
+              </a:pPr>
+              <a:r>
+                <a:rPr kumimoji="0" lang="en-CA" sz="2400" b="0" i="0" u="none" strike="noStrike" cap="none" spc="0" normalizeH="0" baseline="0" dirty="0">
+                  <a:ln>
+                    <a:noFill/>
+                  </a:ln>
+                  <a:solidFill>
+                    <a:srgbClr val="000000"/>
+                  </a:solidFill>
+                  <a:effectLst/>
+                  <a:uFillTx/>
+                  <a:latin typeface="+mj-lt"/>
+                  <a:ea typeface="+mj-ea"/>
+                  <a:cs typeface="+mj-cs"/>
+                  <a:sym typeface="Helvetica"/>
+                </a:rPr>
+                <a:t>Schema Family</a:t>
+              </a:r>
+            </a:p>
+          </p:txBody>
+        </p:sp>
+        <p:pic>
+          <p:nvPicPr>
+            <p:cNvPr id="3" name="Picture 2">
+              <a:extLst>
+                <a:ext uri="{FF2B5EF4-FFF2-40B4-BE49-F238E27FC236}">
+                  <a16:creationId xmlns:a16="http://schemas.microsoft.com/office/drawing/2014/main" id="{BF842D12-B56F-4519-849F-0C5AA9C3AF53}"/>
+                </a:ext>
+              </a:extLst>
+            </p:cNvPr>
+            <p:cNvPicPr>
+              <a:picLocks noChangeAspect="1"/>
+            </p:cNvPicPr>
+            <p:nvPr/>
+          </p:nvPicPr>
+          <p:blipFill>
+            <a:blip r:embed="rId2"/>
+            <a:stretch>
+              <a:fillRect/>
+            </a:stretch>
+          </p:blipFill>
+          <p:spPr>
+            <a:xfrm>
+              <a:off x="2191289" y="6332561"/>
+              <a:ext cx="2169985" cy="2142698"/>
+            </a:xfrm>
+            <a:prstGeom prst="rect">
+              <a:avLst/>
+            </a:prstGeom>
+          </p:spPr>
+        </p:pic>
+        <p:pic>
+          <p:nvPicPr>
+            <p:cNvPr id="8" name="Picture 7">
+              <a:extLst>
+                <a:ext uri="{FF2B5EF4-FFF2-40B4-BE49-F238E27FC236}">
+                  <a16:creationId xmlns:a16="http://schemas.microsoft.com/office/drawing/2014/main" id="{23ACCED7-3AAD-4D2C-A463-8774FC145D86}"/>
+                </a:ext>
+              </a:extLst>
+            </p:cNvPr>
+            <p:cNvPicPr>
+              <a:picLocks noChangeAspect="1"/>
+            </p:cNvPicPr>
+            <p:nvPr/>
+          </p:nvPicPr>
+          <p:blipFill>
+            <a:blip r:embed="rId2"/>
+            <a:stretch>
+              <a:fillRect/>
+            </a:stretch>
+          </p:blipFill>
+          <p:spPr>
+            <a:xfrm>
+              <a:off x="3626578" y="4173943"/>
+              <a:ext cx="2169985" cy="2142698"/>
+            </a:xfrm>
+            <a:prstGeom prst="rect">
+              <a:avLst/>
+            </a:prstGeom>
+          </p:spPr>
+        </p:pic>
+        <p:pic>
+          <p:nvPicPr>
+            <p:cNvPr id="9" name="Picture 8">
+              <a:extLst>
+                <a:ext uri="{FF2B5EF4-FFF2-40B4-BE49-F238E27FC236}">
+                  <a16:creationId xmlns:a16="http://schemas.microsoft.com/office/drawing/2014/main" id="{C526DDE9-7DE8-42B5-80F5-7A16B3289842}"/>
+                </a:ext>
+              </a:extLst>
+            </p:cNvPr>
+            <p:cNvPicPr>
+              <a:picLocks noChangeAspect="1"/>
+            </p:cNvPicPr>
+            <p:nvPr/>
+          </p:nvPicPr>
+          <p:blipFill>
+            <a:blip r:embed="rId2"/>
+            <a:stretch>
+              <a:fillRect/>
+            </a:stretch>
+          </p:blipFill>
+          <p:spPr>
+            <a:xfrm>
+              <a:off x="5079198" y="2017597"/>
+              <a:ext cx="2169985" cy="2142698"/>
+            </a:xfrm>
+            <a:prstGeom prst="rect">
+              <a:avLst/>
+            </a:prstGeom>
+          </p:spPr>
+        </p:pic>
+      </p:grpSp>
+      <p:sp>
+        <p:nvSpPr>
+          <p:cNvPr id="13" name="Text Placeholder 12">
+            <a:extLst>
+              <a:ext uri="{FF2B5EF4-FFF2-40B4-BE49-F238E27FC236}">
+                <a16:creationId xmlns:a16="http://schemas.microsoft.com/office/drawing/2014/main" id="{E351B329-7594-4593-BE8E-2C8D39F91E15}"/>
+              </a:ext>
+            </a:extLst>
+          </p:cNvPr>
+          <p:cNvSpPr>
+            <a:spLocks noGrp="1"/>
+          </p:cNvSpPr>
+          <p:nvPr>
+            <p:ph type="body" idx="1"/>
+          </p:nvPr>
+        </p:nvSpPr>
+        <p:spPr>
+          <a:xfrm>
+            <a:off x="6237027" y="104634"/>
+            <a:ext cx="5295332" cy="7483522"/>
+          </a:xfrm>
+        </p:spPr>
+        <p:txBody>
+          <a:bodyPr anchor="t">
+            <a:normAutofit fontScale="92500" lnSpcReduction="10000"/>
+          </a:bodyPr>
+          <a:lstStyle/>
+          <a:p>
+            <a:pPr>
+              <a:spcBef>
+                <a:spcPts val="0"/>
+              </a:spcBef>
+            </a:pPr>
+            <a:r>
+              <a:rPr lang="en-CA" sz="2400" dirty="0"/>
+              <a:t>Schema Family</a:t>
+            </a:r>
+          </a:p>
+          <a:p>
+            <a:pPr lvl="1">
+              <a:spcBef>
+                <a:spcPts val="0"/>
+              </a:spcBef>
+            </a:pPr>
+            <a:r>
+              <a:rPr lang="en-CA" sz="2400" dirty="0"/>
+              <a:t>One or more Overlay Families</a:t>
+            </a:r>
+            <a:br>
+              <a:rPr lang="en-CA" sz="2400" dirty="0"/>
+            </a:br>
+            <a:endParaRPr lang="en-CA" sz="2400" dirty="0"/>
+          </a:p>
+          <a:p>
+            <a:pPr>
+              <a:spcBef>
+                <a:spcPts val="0"/>
+              </a:spcBef>
+            </a:pPr>
+            <a:r>
+              <a:rPr lang="en-CA" sz="2400" dirty="0"/>
+              <a:t>Overlay Family = Overlay Card Stack</a:t>
+            </a:r>
+            <a:br>
+              <a:rPr lang="en-CA" sz="2400" dirty="0"/>
+            </a:br>
+            <a:endParaRPr lang="en-CA" sz="2400" dirty="0"/>
+          </a:p>
+          <a:p>
+            <a:pPr>
+              <a:spcBef>
+                <a:spcPts val="0"/>
+              </a:spcBef>
+            </a:pPr>
+            <a:r>
+              <a:rPr lang="en-CA" sz="2400" dirty="0"/>
+              <a:t>Overlay Card Stack</a:t>
+            </a:r>
+          </a:p>
+          <a:p>
+            <a:pPr lvl="1">
+              <a:spcBef>
+                <a:spcPts val="0"/>
+              </a:spcBef>
+            </a:pPr>
+            <a:r>
+              <a:rPr lang="en-CA" sz="2400" dirty="0"/>
+              <a:t>One or more Overlay Cards</a:t>
+            </a:r>
+            <a:br>
+              <a:rPr lang="en-CA" sz="2400" dirty="0"/>
+            </a:br>
+            <a:endParaRPr lang="en-CA" sz="2400" dirty="0"/>
+          </a:p>
+          <a:p>
+            <a:pPr>
+              <a:spcBef>
+                <a:spcPts val="0"/>
+              </a:spcBef>
+            </a:pPr>
+            <a:r>
+              <a:rPr lang="en-CA" sz="2400" dirty="0"/>
+              <a:t>Overlay Card – Business Layer</a:t>
+            </a:r>
+          </a:p>
+          <a:p>
+            <a:pPr lvl="1">
+              <a:spcBef>
+                <a:spcPts val="0"/>
+              </a:spcBef>
+            </a:pPr>
+            <a:r>
+              <a:rPr lang="en-CA" sz="2400" dirty="0"/>
+              <a:t>Sensitive</a:t>
+            </a:r>
+          </a:p>
+          <a:p>
+            <a:pPr lvl="1">
+              <a:spcBef>
+                <a:spcPts val="0"/>
+              </a:spcBef>
+            </a:pPr>
+            <a:r>
+              <a:rPr lang="en-CA" sz="2400" dirty="0"/>
+              <a:t>Subset</a:t>
+            </a:r>
+          </a:p>
+          <a:p>
+            <a:pPr lvl="1">
+              <a:spcBef>
+                <a:spcPts val="0"/>
+              </a:spcBef>
+            </a:pPr>
+            <a:r>
+              <a:rPr lang="en-CA" sz="2400" dirty="0"/>
+              <a:t>Source</a:t>
+            </a:r>
+          </a:p>
+          <a:p>
+            <a:pPr lvl="1">
+              <a:spcBef>
+                <a:spcPts val="0"/>
+              </a:spcBef>
+            </a:pPr>
+            <a:r>
+              <a:rPr lang="en-CA" sz="2400" dirty="0"/>
+              <a:t>Schema Base</a:t>
+            </a:r>
+          </a:p>
+          <a:p>
+            <a:pPr>
+              <a:spcBef>
+                <a:spcPts val="0"/>
+              </a:spcBef>
+            </a:pPr>
+            <a:endParaRPr lang="en-CA" sz="2400" dirty="0"/>
+          </a:p>
+          <a:p>
+            <a:pPr>
+              <a:spcBef>
+                <a:spcPts val="0"/>
+              </a:spcBef>
+            </a:pPr>
+            <a:r>
+              <a:rPr lang="en-CA" sz="2400" dirty="0"/>
+              <a:t>Overlay Card – Application Layer</a:t>
+            </a:r>
+          </a:p>
+          <a:p>
+            <a:pPr lvl="1">
+              <a:spcBef>
+                <a:spcPts val="0"/>
+              </a:spcBef>
+            </a:pPr>
+            <a:r>
+              <a:rPr lang="en-CA" sz="2400" dirty="0"/>
+              <a:t>Conditional</a:t>
+            </a:r>
+          </a:p>
+          <a:p>
+            <a:pPr lvl="1">
+              <a:spcBef>
+                <a:spcPts val="0"/>
+              </a:spcBef>
+            </a:pPr>
+            <a:r>
+              <a:rPr lang="en-CA" sz="2400" dirty="0"/>
+              <a:t>Entry</a:t>
+            </a:r>
+          </a:p>
+          <a:p>
+            <a:pPr lvl="1">
+              <a:spcBef>
+                <a:spcPts val="0"/>
+              </a:spcBef>
+            </a:pPr>
+            <a:r>
+              <a:rPr lang="en-CA" sz="2400" dirty="0"/>
+              <a:t>Format</a:t>
+            </a:r>
+          </a:p>
+          <a:p>
+            <a:pPr lvl="1">
+              <a:spcBef>
+                <a:spcPts val="0"/>
+              </a:spcBef>
+            </a:pPr>
+            <a:r>
+              <a:rPr lang="en-CA" sz="2400" dirty="0"/>
+              <a:t>Label</a:t>
+            </a:r>
+          </a:p>
+          <a:p>
+            <a:pPr lvl="1">
+              <a:spcBef>
+                <a:spcPts val="0"/>
+              </a:spcBef>
+            </a:pPr>
+            <a:r>
+              <a:rPr lang="en-CA" sz="2400" dirty="0"/>
+              <a:t>Datatype</a:t>
+            </a:r>
+          </a:p>
+          <a:p>
+            <a:pPr lvl="1">
+              <a:spcBef>
+                <a:spcPts val="0"/>
+              </a:spcBef>
+            </a:pPr>
+            <a:endParaRPr lang="en-CA" sz="2400" dirty="0"/>
+          </a:p>
+          <a:p>
+            <a:pPr>
+              <a:spcBef>
+                <a:spcPts val="0"/>
+              </a:spcBef>
+            </a:pPr>
+            <a:endParaRPr lang="en-CA" sz="2400" dirty="0"/>
+          </a:p>
+          <a:p>
+            <a:pPr>
+              <a:spcBef>
+                <a:spcPts val="0"/>
+              </a:spcBef>
+            </a:pPr>
+            <a:r>
+              <a:rPr lang="en-CA" sz="2400" dirty="0"/>
+              <a:t>Overlay Card – Technology Layer</a:t>
+            </a:r>
+          </a:p>
+          <a:p>
+            <a:pPr lvl="1">
+              <a:spcBef>
+                <a:spcPts val="0"/>
+              </a:spcBef>
+            </a:pPr>
+            <a:r>
+              <a:rPr lang="en-CA" sz="2400" dirty="0"/>
+              <a:t>Encoding</a:t>
+            </a:r>
+          </a:p>
+        </p:txBody>
+      </p:sp>
+    </p:spTree>
+    <p:extLst>
+      <p:ext uri="{BB962C8B-B14F-4D97-AF65-F5344CB8AC3E}">
+        <p14:creationId xmlns:p14="http://schemas.microsoft.com/office/powerpoint/2010/main" val="877913445"/>
       </p:ext>
     </p:extLst>
   </p:cSld>

</xml_diff>